<commit_message>
Se adicionó la validación con respecto a las ofertas del OIC que incluyen valores de venta y arriendo, de manera simultánea
</commit_message>
<xml_diff>
--- a/reports/PRESENTACION_ESTUDIO_TASA_RENTA.pptx
+++ b/reports/PRESENTACION_ESTUDIO_TASA_RENTA.pptx
@@ -3719,10 +3719,10 @@
             <a:tbl>
               <a:tblPr/>
               <a:tblGrid>
-                <a:gridCol w="1965227"/>
-                <a:gridCol w="1206092"/>
+                <a:gridCol w="1785517"/>
+                <a:gridCol w="1087104"/>
               </a:tblGrid>
-              <a:tr h="457183">
+              <a:tr h="437271">
                 <a:tc>
                   <a:txBody>
                     <a:bodyPr/>
@@ -3860,7 +3860,7 @@
                   </a:tcPr>
                 </a:tc>
               </a:tr>
-              <a:tr h="437693">
+              <a:tr h="427982">
                 <a:tc>
                   <a:txBody>
                     <a:bodyPr/>
@@ -3885,10 +3885,10 @@
                               <a:alpha val="100000"/>
                             </a:srgbClr>
                           </a:solidFill>
-                          <a:latin typeface="DejaVu Sans"/>
-                          <a:cs typeface="DejaVu Sans"/>
-                          <a:ea typeface="DejaVu Sans"/>
-                          <a:sym typeface="DejaVu Sans"/>
+                          <a:latin typeface="Arial"/>
+                          <a:cs typeface="Arial"/>
+                          <a:ea typeface="Arial"/>
+                          <a:sym typeface="Arial"/>
                         </a:rPr>
                         <a:t>Rurales</a:t>
                       </a:r>
@@ -3953,10 +3953,10 @@
                               <a:alpha val="100000"/>
                             </a:srgbClr>
                           </a:solidFill>
-                          <a:latin typeface="DejaVu Sans"/>
-                          <a:cs typeface="DejaVu Sans"/>
-                          <a:ea typeface="DejaVu Sans"/>
-                          <a:sym typeface="DejaVu Sans"/>
+                          <a:latin typeface="Arial"/>
+                          <a:cs typeface="Arial"/>
+                          <a:ea typeface="Arial"/>
+                          <a:sym typeface="Arial"/>
                         </a:rPr>
                         <a:t> 97.321</a:t>
                       </a:r>
@@ -3998,7 +3998,7 @@
                   </a:tcPr>
                 </a:tc>
               </a:tr>
-              <a:tr h="446846">
+              <a:tr h="429991">
                 <a:tc>
                   <a:txBody>
                     <a:bodyPr/>
@@ -4023,10 +4023,10 @@
                               <a:alpha val="100000"/>
                             </a:srgbClr>
                           </a:solidFill>
-                          <a:latin typeface="DejaVu Sans"/>
-                          <a:cs typeface="DejaVu Sans"/>
-                          <a:ea typeface="DejaVu Sans"/>
-                          <a:sym typeface="DejaVu Sans"/>
+                          <a:latin typeface="Arial"/>
+                          <a:cs typeface="Arial"/>
+                          <a:ea typeface="Arial"/>
+                          <a:sym typeface="Arial"/>
                         </a:rPr>
                         <a:t>Sin área</a:t>
                       </a:r>
@@ -4091,10 +4091,10 @@
                               <a:alpha val="100000"/>
                             </a:srgbClr>
                           </a:solidFill>
-                          <a:latin typeface="DejaVu Sans"/>
-                          <a:cs typeface="DejaVu Sans"/>
-                          <a:ea typeface="DejaVu Sans"/>
-                          <a:sym typeface="DejaVu Sans"/>
+                          <a:latin typeface="Arial"/>
+                          <a:cs typeface="Arial"/>
+                          <a:ea typeface="Arial"/>
+                          <a:sym typeface="Arial"/>
                         </a:rPr>
                         <a:t>254.640</a:t>
                       </a:r>
@@ -4136,7 +4136,7 @@
                   </a:tcPr>
                 </a:tc>
               </a:tr>
-              <a:tr h="482006">
+              <a:tr h="472630">
                 <a:tc>
                   <a:txBody>
                     <a:bodyPr/>
@@ -4161,10 +4161,10 @@
                               <a:alpha val="100000"/>
                             </a:srgbClr>
                           </a:solidFill>
-                          <a:latin typeface="DejaVu Sans"/>
-                          <a:cs typeface="DejaVu Sans"/>
-                          <a:ea typeface="DejaVu Sans"/>
-                          <a:sym typeface="DejaVu Sans"/>
+                          <a:latin typeface="Arial"/>
+                          <a:cs typeface="Arial"/>
+                          <a:ea typeface="Arial"/>
+                          <a:sym typeface="Arial"/>
                         </a:rPr>
                         <a:t>Sin Barmanpre</a:t>
                       </a:r>
@@ -4229,10 +4229,10 @@
                               <a:alpha val="100000"/>
                             </a:srgbClr>
                           </a:solidFill>
-                          <a:latin typeface="DejaVu Sans"/>
-                          <a:cs typeface="DejaVu Sans"/>
-                          <a:ea typeface="DejaVu Sans"/>
-                          <a:sym typeface="DejaVu Sans"/>
+                          <a:latin typeface="Arial"/>
+                          <a:cs typeface="Arial"/>
+                          <a:ea typeface="Arial"/>
+                          <a:sym typeface="Arial"/>
                         </a:rPr>
                         <a:t> 81.918</a:t>
                       </a:r>
@@ -4274,7 +4274,7 @@
                   </a:tcPr>
                 </a:tc>
               </a:tr>
-              <a:tr h="437693">
+              <a:tr h="429991">
                 <a:tc>
                   <a:txBody>
                     <a:bodyPr/>
@@ -4299,10 +4299,10 @@
                               <a:alpha val="100000"/>
                             </a:srgbClr>
                           </a:solidFill>
-                          <a:latin typeface="DejaVu Sans"/>
-                          <a:cs typeface="DejaVu Sans"/>
-                          <a:ea typeface="DejaVu Sans"/>
-                          <a:sym typeface="DejaVu Sans"/>
+                          <a:latin typeface="Arial"/>
+                          <a:cs typeface="Arial"/>
+                          <a:ea typeface="Arial"/>
+                          <a:sym typeface="Arial"/>
                         </a:rPr>
                         <a:t>Sin estrato</a:t>
                       </a:r>
@@ -4367,10 +4367,10 @@
                               <a:alpha val="100000"/>
                             </a:srgbClr>
                           </a:solidFill>
-                          <a:latin typeface="DejaVu Sans"/>
-                          <a:cs typeface="DejaVu Sans"/>
-                          <a:ea typeface="DejaVu Sans"/>
-                          <a:sym typeface="DejaVu Sans"/>
+                          <a:latin typeface="Arial"/>
+                          <a:cs typeface="Arial"/>
+                          <a:ea typeface="Arial"/>
+                          <a:sym typeface="Arial"/>
                         </a:rPr>
                         <a:t> 19.043</a:t>
                       </a:r>
@@ -6473,11 +6473,11 @@
             <a:tbl>
               <a:tblPr/>
               <a:tblGrid>
-                <a:gridCol w="616299"/>
-                <a:gridCol w="910979"/>
-                <a:gridCol w="1166504"/>
+                <a:gridCol w="571551"/>
+                <a:gridCol w="920528"/>
+                <a:gridCol w="1176804"/>
               </a:tblGrid>
-              <a:tr h="397404">
+              <a:tr h="390241">
                 <a:tc>
                   <a:txBody>
                     <a:bodyPr/>
@@ -6502,10 +6502,10 @@
                               <a:alpha val="100000"/>
                             </a:srgbClr>
                           </a:solidFill>
-                          <a:latin typeface="DejaVu Sans"/>
-                          <a:cs typeface="DejaVu Sans"/>
-                          <a:ea typeface="DejaVu Sans"/>
-                          <a:sym typeface="DejaVu Sans"/>
+                          <a:latin typeface="Arial"/>
+                          <a:cs typeface="Arial"/>
+                          <a:ea typeface="Arial"/>
+                          <a:sym typeface="Arial"/>
                         </a:rPr>
                         <a:t>AÑO</a:t>
                       </a:r>
@@ -6570,10 +6570,10 @@
                               <a:alpha val="100000"/>
                             </a:srgbClr>
                           </a:solidFill>
-                          <a:latin typeface="DejaVu Sans"/>
-                          <a:cs typeface="DejaVu Sans"/>
-                          <a:ea typeface="DejaVu Sans"/>
-                          <a:sym typeface="DejaVu Sans"/>
+                          <a:latin typeface="Arial"/>
+                          <a:cs typeface="Arial"/>
+                          <a:ea typeface="Arial"/>
+                          <a:sym typeface="Arial"/>
                         </a:rPr>
                         <a:t>ESTRATO</a:t>
                       </a:r>
@@ -6638,10 +6638,10 @@
                               <a:alpha val="100000"/>
                             </a:srgbClr>
                           </a:solidFill>
-                          <a:latin typeface="DejaVu Sans"/>
-                          <a:cs typeface="DejaVu Sans"/>
-                          <a:ea typeface="DejaVu Sans"/>
-                          <a:sym typeface="DejaVu Sans"/>
+                          <a:latin typeface="Arial"/>
+                          <a:cs typeface="Arial"/>
+                          <a:ea typeface="Arial"/>
+                          <a:sym typeface="Arial"/>
                         </a:rPr>
                         <a:t>TASA_RENTA</a:t>
                       </a:r>
@@ -6683,7 +6683,7 @@
                   </a:tcPr>
                 </a:tc>
               </a:tr>
-              <a:tr h="366435">
+              <a:tr h="362888">
                 <a:tc>
                   <a:txBody>
                     <a:bodyPr/>
@@ -6708,10 +6708,10 @@
                               <a:alpha val="100000"/>
                             </a:srgbClr>
                           </a:solidFill>
-                          <a:latin typeface="DejaVu Sans"/>
-                          <a:cs typeface="DejaVu Sans"/>
-                          <a:ea typeface="DejaVu Sans"/>
-                          <a:sym typeface="DejaVu Sans"/>
+                          <a:latin typeface="Arial"/>
+                          <a:cs typeface="Arial"/>
+                          <a:ea typeface="Arial"/>
+                          <a:sym typeface="Arial"/>
                         </a:rPr>
                         <a:t>2017</a:t>
                       </a:r>
@@ -6776,10 +6776,10 @@
                               <a:alpha val="100000"/>
                             </a:srgbClr>
                           </a:solidFill>
-                          <a:latin typeface="DejaVu Sans"/>
-                          <a:cs typeface="DejaVu Sans"/>
-                          <a:ea typeface="DejaVu Sans"/>
-                          <a:sym typeface="DejaVu Sans"/>
+                          <a:latin typeface="Arial"/>
+                          <a:cs typeface="Arial"/>
+                          <a:ea typeface="Arial"/>
+                          <a:sym typeface="Arial"/>
                         </a:rPr>
                         <a:t>1</a:t>
                       </a:r>
@@ -6844,10 +6844,10 @@
                               <a:alpha val="100000"/>
                             </a:srgbClr>
                           </a:solidFill>
-                          <a:latin typeface="DejaVu Sans"/>
-                          <a:cs typeface="DejaVu Sans"/>
-                          <a:ea typeface="DejaVu Sans"/>
-                          <a:sym typeface="DejaVu Sans"/>
+                          <a:latin typeface="Arial"/>
+                          <a:cs typeface="Arial"/>
+                          <a:ea typeface="Arial"/>
+                          <a:sym typeface="Arial"/>
                         </a:rPr>
                         <a:t>0.00540</a:t>
                       </a:r>
@@ -6889,7 +6889,7 @@
                   </a:tcPr>
                 </a:tc>
               </a:tr>
-              <a:tr h="366435">
+              <a:tr h="362956">
                 <a:tc>
                   <a:txBody>
                     <a:bodyPr/>
@@ -6914,10 +6914,10 @@
                               <a:alpha val="100000"/>
                             </a:srgbClr>
                           </a:solidFill>
-                          <a:latin typeface="DejaVu Sans"/>
-                          <a:cs typeface="DejaVu Sans"/>
-                          <a:ea typeface="DejaVu Sans"/>
-                          <a:sym typeface="DejaVu Sans"/>
+                          <a:latin typeface="Arial"/>
+                          <a:cs typeface="Arial"/>
+                          <a:ea typeface="Arial"/>
+                          <a:sym typeface="Arial"/>
                         </a:rPr>
                         <a:t>2018</a:t>
                       </a:r>
@@ -6982,10 +6982,10 @@
                               <a:alpha val="100000"/>
                             </a:srgbClr>
                           </a:solidFill>
-                          <a:latin typeface="DejaVu Sans"/>
-                          <a:cs typeface="DejaVu Sans"/>
-                          <a:ea typeface="DejaVu Sans"/>
-                          <a:sym typeface="DejaVu Sans"/>
+                          <a:latin typeface="Arial"/>
+                          <a:cs typeface="Arial"/>
+                          <a:ea typeface="Arial"/>
+                          <a:sym typeface="Arial"/>
                         </a:rPr>
                         <a:t>1</a:t>
                       </a:r>
@@ -7050,10 +7050,10 @@
                               <a:alpha val="100000"/>
                             </a:srgbClr>
                           </a:solidFill>
-                          <a:latin typeface="DejaVu Sans"/>
-                          <a:cs typeface="DejaVu Sans"/>
-                          <a:ea typeface="DejaVu Sans"/>
-                          <a:sym typeface="DejaVu Sans"/>
+                          <a:latin typeface="Arial"/>
+                          <a:cs typeface="Arial"/>
+                          <a:ea typeface="Arial"/>
+                          <a:sym typeface="Arial"/>
                         </a:rPr>
                         <a:t>0.00538</a:t>
                       </a:r>
@@ -7095,7 +7095,7 @@
                   </a:tcPr>
                 </a:tc>
               </a:tr>
-              <a:tr h="366435">
+              <a:tr h="362888">
                 <a:tc>
                   <a:txBody>
                     <a:bodyPr/>
@@ -7120,10 +7120,10 @@
                               <a:alpha val="100000"/>
                             </a:srgbClr>
                           </a:solidFill>
-                          <a:latin typeface="DejaVu Sans"/>
-                          <a:cs typeface="DejaVu Sans"/>
-                          <a:ea typeface="DejaVu Sans"/>
-                          <a:sym typeface="DejaVu Sans"/>
+                          <a:latin typeface="Arial"/>
+                          <a:cs typeface="Arial"/>
+                          <a:ea typeface="Arial"/>
+                          <a:sym typeface="Arial"/>
                         </a:rPr>
                         <a:t>2019</a:t>
                       </a:r>
@@ -7188,10 +7188,10 @@
                               <a:alpha val="100000"/>
                             </a:srgbClr>
                           </a:solidFill>
-                          <a:latin typeface="DejaVu Sans"/>
-                          <a:cs typeface="DejaVu Sans"/>
-                          <a:ea typeface="DejaVu Sans"/>
-                          <a:sym typeface="DejaVu Sans"/>
+                          <a:latin typeface="Arial"/>
+                          <a:cs typeface="Arial"/>
+                          <a:ea typeface="Arial"/>
+                          <a:sym typeface="Arial"/>
                         </a:rPr>
                         <a:t>1</a:t>
                       </a:r>
@@ -7256,10 +7256,10 @@
                               <a:alpha val="100000"/>
                             </a:srgbClr>
                           </a:solidFill>
-                          <a:latin typeface="DejaVu Sans"/>
-                          <a:cs typeface="DejaVu Sans"/>
-                          <a:ea typeface="DejaVu Sans"/>
-                          <a:sym typeface="DejaVu Sans"/>
+                          <a:latin typeface="Arial"/>
+                          <a:cs typeface="Arial"/>
+                          <a:ea typeface="Arial"/>
+                          <a:sym typeface="Arial"/>
                         </a:rPr>
                         <a:t>0.00546</a:t>
                       </a:r>
@@ -7301,7 +7301,7 @@
                   </a:tcPr>
                 </a:tc>
               </a:tr>
-              <a:tr h="366435">
+              <a:tr h="362888">
                 <a:tc>
                   <a:txBody>
                     <a:bodyPr/>
@@ -7326,10 +7326,10 @@
                               <a:alpha val="100000"/>
                             </a:srgbClr>
                           </a:solidFill>
-                          <a:latin typeface="DejaVu Sans"/>
-                          <a:cs typeface="DejaVu Sans"/>
-                          <a:ea typeface="DejaVu Sans"/>
-                          <a:sym typeface="DejaVu Sans"/>
+                          <a:latin typeface="Arial"/>
+                          <a:cs typeface="Arial"/>
+                          <a:ea typeface="Arial"/>
+                          <a:sym typeface="Arial"/>
                         </a:rPr>
                         <a:t>2020</a:t>
                       </a:r>
@@ -7394,10 +7394,10 @@
                               <a:alpha val="100000"/>
                             </a:srgbClr>
                           </a:solidFill>
-                          <a:latin typeface="DejaVu Sans"/>
-                          <a:cs typeface="DejaVu Sans"/>
-                          <a:ea typeface="DejaVu Sans"/>
-                          <a:sym typeface="DejaVu Sans"/>
+                          <a:latin typeface="Arial"/>
+                          <a:cs typeface="Arial"/>
+                          <a:ea typeface="Arial"/>
+                          <a:sym typeface="Arial"/>
                         </a:rPr>
                         <a:t>1</a:t>
                       </a:r>
@@ -7462,10 +7462,10 @@
                               <a:alpha val="100000"/>
                             </a:srgbClr>
                           </a:solidFill>
-                          <a:latin typeface="DejaVu Sans"/>
-                          <a:cs typeface="DejaVu Sans"/>
-                          <a:ea typeface="DejaVu Sans"/>
-                          <a:sym typeface="DejaVu Sans"/>
+                          <a:latin typeface="Arial"/>
+                          <a:cs typeface="Arial"/>
+                          <a:ea typeface="Arial"/>
+                          <a:sym typeface="Arial"/>
                         </a:rPr>
                         <a:t>0.00540</a:t>
                       </a:r>
@@ -7507,7 +7507,7 @@
                   </a:tcPr>
                 </a:tc>
               </a:tr>
-              <a:tr h="366435">
+              <a:tr h="362956">
                 <a:tc>
                   <a:txBody>
                     <a:bodyPr/>
@@ -7532,10 +7532,10 @@
                               <a:alpha val="100000"/>
                             </a:srgbClr>
                           </a:solidFill>
-                          <a:latin typeface="DejaVu Sans"/>
-                          <a:cs typeface="DejaVu Sans"/>
-                          <a:ea typeface="DejaVu Sans"/>
-                          <a:sym typeface="DejaVu Sans"/>
+                          <a:latin typeface="Arial"/>
+                          <a:cs typeface="Arial"/>
+                          <a:ea typeface="Arial"/>
+                          <a:sym typeface="Arial"/>
                         </a:rPr>
                         <a:t>2017</a:t>
                       </a:r>
@@ -7600,10 +7600,10 @@
                               <a:alpha val="100000"/>
                             </a:srgbClr>
                           </a:solidFill>
-                          <a:latin typeface="DejaVu Sans"/>
-                          <a:cs typeface="DejaVu Sans"/>
-                          <a:ea typeface="DejaVu Sans"/>
-                          <a:sym typeface="DejaVu Sans"/>
+                          <a:latin typeface="Arial"/>
+                          <a:cs typeface="Arial"/>
+                          <a:ea typeface="Arial"/>
+                          <a:sym typeface="Arial"/>
                         </a:rPr>
                         <a:t>2</a:t>
                       </a:r>
@@ -7668,10 +7668,10 @@
                               <a:alpha val="100000"/>
                             </a:srgbClr>
                           </a:solidFill>
-                          <a:latin typeface="DejaVu Sans"/>
-                          <a:cs typeface="DejaVu Sans"/>
-                          <a:ea typeface="DejaVu Sans"/>
-                          <a:sym typeface="DejaVu Sans"/>
+                          <a:latin typeface="Arial"/>
+                          <a:cs typeface="Arial"/>
+                          <a:ea typeface="Arial"/>
+                          <a:sym typeface="Arial"/>
                         </a:rPr>
                         <a:t>0.00553</a:t>
                       </a:r>
@@ -7713,7 +7713,7 @@
                   </a:tcPr>
                 </a:tc>
               </a:tr>
-              <a:tr h="366435">
+              <a:tr h="362888">
                 <a:tc>
                   <a:txBody>
                     <a:bodyPr/>
@@ -7738,10 +7738,10 @@
                               <a:alpha val="100000"/>
                             </a:srgbClr>
                           </a:solidFill>
-                          <a:latin typeface="DejaVu Sans"/>
-                          <a:cs typeface="DejaVu Sans"/>
-                          <a:ea typeface="DejaVu Sans"/>
-                          <a:sym typeface="DejaVu Sans"/>
+                          <a:latin typeface="Arial"/>
+                          <a:cs typeface="Arial"/>
+                          <a:ea typeface="Arial"/>
+                          <a:sym typeface="Arial"/>
                         </a:rPr>
                         <a:t>2018</a:t>
                       </a:r>
@@ -7806,10 +7806,10 @@
                               <a:alpha val="100000"/>
                             </a:srgbClr>
                           </a:solidFill>
-                          <a:latin typeface="DejaVu Sans"/>
-                          <a:cs typeface="DejaVu Sans"/>
-                          <a:ea typeface="DejaVu Sans"/>
-                          <a:sym typeface="DejaVu Sans"/>
+                          <a:latin typeface="Arial"/>
+                          <a:cs typeface="Arial"/>
+                          <a:ea typeface="Arial"/>
+                          <a:sym typeface="Arial"/>
                         </a:rPr>
                         <a:t>2</a:t>
                       </a:r>
@@ -7874,10 +7874,10 @@
                               <a:alpha val="100000"/>
                             </a:srgbClr>
                           </a:solidFill>
-                          <a:latin typeface="DejaVu Sans"/>
-                          <a:cs typeface="DejaVu Sans"/>
-                          <a:ea typeface="DejaVu Sans"/>
-                          <a:sym typeface="DejaVu Sans"/>
+                          <a:latin typeface="Arial"/>
+                          <a:cs typeface="Arial"/>
+                          <a:ea typeface="Arial"/>
+                          <a:sym typeface="Arial"/>
                         </a:rPr>
                         <a:t>0.00550</a:t>
                       </a:r>
@@ -7919,7 +7919,7 @@
                   </a:tcPr>
                 </a:tc>
               </a:tr>
-              <a:tr h="366435">
+              <a:tr h="362888">
                 <a:tc>
                   <a:txBody>
                     <a:bodyPr/>
@@ -7944,10 +7944,10 @@
                               <a:alpha val="100000"/>
                             </a:srgbClr>
                           </a:solidFill>
-                          <a:latin typeface="DejaVu Sans"/>
-                          <a:cs typeface="DejaVu Sans"/>
-                          <a:ea typeface="DejaVu Sans"/>
-                          <a:sym typeface="DejaVu Sans"/>
+                          <a:latin typeface="Arial"/>
+                          <a:cs typeface="Arial"/>
+                          <a:ea typeface="Arial"/>
+                          <a:sym typeface="Arial"/>
                         </a:rPr>
                         <a:t>2019</a:t>
                       </a:r>
@@ -8012,10 +8012,10 @@
                               <a:alpha val="100000"/>
                             </a:srgbClr>
                           </a:solidFill>
-                          <a:latin typeface="DejaVu Sans"/>
-                          <a:cs typeface="DejaVu Sans"/>
-                          <a:ea typeface="DejaVu Sans"/>
-                          <a:sym typeface="DejaVu Sans"/>
+                          <a:latin typeface="Arial"/>
+                          <a:cs typeface="Arial"/>
+                          <a:ea typeface="Arial"/>
+                          <a:sym typeface="Arial"/>
                         </a:rPr>
                         <a:t>2</a:t>
                       </a:r>
@@ -8080,10 +8080,10 @@
                               <a:alpha val="100000"/>
                             </a:srgbClr>
                           </a:solidFill>
-                          <a:latin typeface="DejaVu Sans"/>
-                          <a:cs typeface="DejaVu Sans"/>
-                          <a:ea typeface="DejaVu Sans"/>
-                          <a:sym typeface="DejaVu Sans"/>
+                          <a:latin typeface="Arial"/>
+                          <a:cs typeface="Arial"/>
+                          <a:ea typeface="Arial"/>
+                          <a:sym typeface="Arial"/>
                         </a:rPr>
                         <a:t>0.00559</a:t>
                       </a:r>
@@ -8125,7 +8125,7 @@
                   </a:tcPr>
                 </a:tc>
               </a:tr>
-              <a:tr h="366435">
+              <a:tr h="362956">
                 <a:tc>
                   <a:txBody>
                     <a:bodyPr/>
@@ -8150,10 +8150,10 @@
                               <a:alpha val="100000"/>
                             </a:srgbClr>
                           </a:solidFill>
-                          <a:latin typeface="DejaVu Sans"/>
-                          <a:cs typeface="DejaVu Sans"/>
-                          <a:ea typeface="DejaVu Sans"/>
-                          <a:sym typeface="DejaVu Sans"/>
+                          <a:latin typeface="Arial"/>
+                          <a:cs typeface="Arial"/>
+                          <a:ea typeface="Arial"/>
+                          <a:sym typeface="Arial"/>
                         </a:rPr>
                         <a:t>2020</a:t>
                       </a:r>
@@ -8218,10 +8218,10 @@
                               <a:alpha val="100000"/>
                             </a:srgbClr>
                           </a:solidFill>
-                          <a:latin typeface="DejaVu Sans"/>
-                          <a:cs typeface="DejaVu Sans"/>
-                          <a:ea typeface="DejaVu Sans"/>
-                          <a:sym typeface="DejaVu Sans"/>
+                          <a:latin typeface="Arial"/>
+                          <a:cs typeface="Arial"/>
+                          <a:ea typeface="Arial"/>
+                          <a:sym typeface="Arial"/>
                         </a:rPr>
                         <a:t>2</a:t>
                       </a:r>
@@ -8286,10 +8286,10 @@
                               <a:alpha val="100000"/>
                             </a:srgbClr>
                           </a:solidFill>
-                          <a:latin typeface="DejaVu Sans"/>
-                          <a:cs typeface="DejaVu Sans"/>
-                          <a:ea typeface="DejaVu Sans"/>
-                          <a:sym typeface="DejaVu Sans"/>
+                          <a:latin typeface="Arial"/>
+                          <a:cs typeface="Arial"/>
+                          <a:ea typeface="Arial"/>
+                          <a:sym typeface="Arial"/>
                         </a:rPr>
                         <a:t>0.00553</a:t>
                       </a:r>
@@ -8331,7 +8331,7 @@
                   </a:tcPr>
                 </a:tc>
               </a:tr>
-              <a:tr h="366435">
+              <a:tr h="362956">
                 <a:tc>
                   <a:txBody>
                     <a:bodyPr/>
@@ -8356,10 +8356,10 @@
                               <a:alpha val="100000"/>
                             </a:srgbClr>
                           </a:solidFill>
-                          <a:latin typeface="DejaVu Sans"/>
-                          <a:cs typeface="DejaVu Sans"/>
-                          <a:ea typeface="DejaVu Sans"/>
-                          <a:sym typeface="DejaVu Sans"/>
+                          <a:latin typeface="Arial"/>
+                          <a:cs typeface="Arial"/>
+                          <a:ea typeface="Arial"/>
+                          <a:sym typeface="Arial"/>
                         </a:rPr>
                         <a:t>2017</a:t>
                       </a:r>
@@ -8424,10 +8424,10 @@
                               <a:alpha val="100000"/>
                             </a:srgbClr>
                           </a:solidFill>
-                          <a:latin typeface="DejaVu Sans"/>
-                          <a:cs typeface="DejaVu Sans"/>
-                          <a:ea typeface="DejaVu Sans"/>
-                          <a:sym typeface="DejaVu Sans"/>
+                          <a:latin typeface="Arial"/>
+                          <a:cs typeface="Arial"/>
+                          <a:ea typeface="Arial"/>
+                          <a:sym typeface="Arial"/>
                         </a:rPr>
                         <a:t>3</a:t>
                       </a:r>
@@ -8492,10 +8492,10 @@
                               <a:alpha val="100000"/>
                             </a:srgbClr>
                           </a:solidFill>
-                          <a:latin typeface="DejaVu Sans"/>
-                          <a:cs typeface="DejaVu Sans"/>
-                          <a:ea typeface="DejaVu Sans"/>
-                          <a:sym typeface="DejaVu Sans"/>
+                          <a:latin typeface="Arial"/>
+                          <a:cs typeface="Arial"/>
+                          <a:ea typeface="Arial"/>
+                          <a:sym typeface="Arial"/>
                         </a:rPr>
                         <a:t>0.00516</a:t>
                       </a:r>
@@ -8537,7 +8537,7 @@
                   </a:tcPr>
                 </a:tc>
               </a:tr>
-              <a:tr h="366435">
+              <a:tr h="362956">
                 <a:tc>
                   <a:txBody>
                     <a:bodyPr/>
@@ -8562,10 +8562,10 @@
                               <a:alpha val="100000"/>
                             </a:srgbClr>
                           </a:solidFill>
-                          <a:latin typeface="DejaVu Sans"/>
-                          <a:cs typeface="DejaVu Sans"/>
-                          <a:ea typeface="DejaVu Sans"/>
-                          <a:sym typeface="DejaVu Sans"/>
+                          <a:latin typeface="Arial"/>
+                          <a:cs typeface="Arial"/>
+                          <a:ea typeface="Arial"/>
+                          <a:sym typeface="Arial"/>
                         </a:rPr>
                         <a:t>2018</a:t>
                       </a:r>
@@ -8630,10 +8630,10 @@
                               <a:alpha val="100000"/>
                             </a:srgbClr>
                           </a:solidFill>
-                          <a:latin typeface="DejaVu Sans"/>
-                          <a:cs typeface="DejaVu Sans"/>
-                          <a:ea typeface="DejaVu Sans"/>
-                          <a:sym typeface="DejaVu Sans"/>
+                          <a:latin typeface="Arial"/>
+                          <a:cs typeface="Arial"/>
+                          <a:ea typeface="Arial"/>
+                          <a:sym typeface="Arial"/>
                         </a:rPr>
                         <a:t>3</a:t>
                       </a:r>
@@ -8698,10 +8698,10 @@
                               <a:alpha val="100000"/>
                             </a:srgbClr>
                           </a:solidFill>
-                          <a:latin typeface="DejaVu Sans"/>
-                          <a:cs typeface="DejaVu Sans"/>
-                          <a:ea typeface="DejaVu Sans"/>
-                          <a:sym typeface="DejaVu Sans"/>
+                          <a:latin typeface="Arial"/>
+                          <a:cs typeface="Arial"/>
+                          <a:ea typeface="Arial"/>
+                          <a:sym typeface="Arial"/>
                         </a:rPr>
                         <a:t>0.00514</a:t>
                       </a:r>
@@ -8743,7 +8743,7 @@
                   </a:tcPr>
                 </a:tc>
               </a:tr>
-              <a:tr h="366435">
+              <a:tr h="362956">
                 <a:tc>
                   <a:txBody>
                     <a:bodyPr/>
@@ -8768,10 +8768,10 @@
                               <a:alpha val="100000"/>
                             </a:srgbClr>
                           </a:solidFill>
-                          <a:latin typeface="DejaVu Sans"/>
-                          <a:cs typeface="DejaVu Sans"/>
-                          <a:ea typeface="DejaVu Sans"/>
-                          <a:sym typeface="DejaVu Sans"/>
+                          <a:latin typeface="Arial"/>
+                          <a:cs typeface="Arial"/>
+                          <a:ea typeface="Arial"/>
+                          <a:sym typeface="Arial"/>
                         </a:rPr>
                         <a:t>2019</a:t>
                       </a:r>
@@ -8836,10 +8836,10 @@
                               <a:alpha val="100000"/>
                             </a:srgbClr>
                           </a:solidFill>
-                          <a:latin typeface="DejaVu Sans"/>
-                          <a:cs typeface="DejaVu Sans"/>
-                          <a:ea typeface="DejaVu Sans"/>
-                          <a:sym typeface="DejaVu Sans"/>
+                          <a:latin typeface="Arial"/>
+                          <a:cs typeface="Arial"/>
+                          <a:ea typeface="Arial"/>
+                          <a:sym typeface="Arial"/>
                         </a:rPr>
                         <a:t>3</a:t>
                       </a:r>
@@ -8904,10 +8904,10 @@
                               <a:alpha val="100000"/>
                             </a:srgbClr>
                           </a:solidFill>
-                          <a:latin typeface="DejaVu Sans"/>
-                          <a:cs typeface="DejaVu Sans"/>
-                          <a:ea typeface="DejaVu Sans"/>
-                          <a:sym typeface="DejaVu Sans"/>
+                          <a:latin typeface="Arial"/>
+                          <a:cs typeface="Arial"/>
+                          <a:ea typeface="Arial"/>
+                          <a:sym typeface="Arial"/>
                         </a:rPr>
                         <a:t>0.00521</a:t>
                       </a:r>
@@ -8949,7 +8949,7 @@
                   </a:tcPr>
                 </a:tc>
               </a:tr>
-              <a:tr h="366435">
+              <a:tr h="362956">
                 <a:tc>
                   <a:txBody>
                     <a:bodyPr/>
@@ -8974,10 +8974,10 @@
                               <a:alpha val="100000"/>
                             </a:srgbClr>
                           </a:solidFill>
-                          <a:latin typeface="DejaVu Sans"/>
-                          <a:cs typeface="DejaVu Sans"/>
-                          <a:ea typeface="DejaVu Sans"/>
-                          <a:sym typeface="DejaVu Sans"/>
+                          <a:latin typeface="Arial"/>
+                          <a:cs typeface="Arial"/>
+                          <a:ea typeface="Arial"/>
+                          <a:sym typeface="Arial"/>
                         </a:rPr>
                         <a:t>2020</a:t>
                       </a:r>
@@ -9042,10 +9042,10 @@
                               <a:alpha val="100000"/>
                             </a:srgbClr>
                           </a:solidFill>
-                          <a:latin typeface="DejaVu Sans"/>
-                          <a:cs typeface="DejaVu Sans"/>
-                          <a:ea typeface="DejaVu Sans"/>
-                          <a:sym typeface="DejaVu Sans"/>
+                          <a:latin typeface="Arial"/>
+                          <a:cs typeface="Arial"/>
+                          <a:ea typeface="Arial"/>
+                          <a:sym typeface="Arial"/>
                         </a:rPr>
                         <a:t>3</a:t>
                       </a:r>
@@ -9110,10 +9110,10 @@
                               <a:alpha val="100000"/>
                             </a:srgbClr>
                           </a:solidFill>
-                          <a:latin typeface="DejaVu Sans"/>
-                          <a:cs typeface="DejaVu Sans"/>
-                          <a:ea typeface="DejaVu Sans"/>
-                          <a:sym typeface="DejaVu Sans"/>
+                          <a:latin typeface="Arial"/>
+                          <a:cs typeface="Arial"/>
+                          <a:ea typeface="Arial"/>
+                          <a:sym typeface="Arial"/>
                         </a:rPr>
                         <a:t>0.00516</a:t>
                       </a:r>
@@ -9201,11 +9201,11 @@
             <a:tbl>
               <a:tblPr/>
               <a:tblGrid>
-                <a:gridCol w="616299"/>
-                <a:gridCol w="970088"/>
-                <a:gridCol w="1248843"/>
+                <a:gridCol w="591023"/>
+                <a:gridCol w="980506"/>
+                <a:gridCol w="1260080"/>
               </a:tblGrid>
-              <a:tr h="409825">
+              <a:tr h="402011">
                 <a:tc>
                   <a:txBody>
                     <a:bodyPr/>
@@ -9230,10 +9230,10 @@
                               <a:alpha val="100000"/>
                             </a:srgbClr>
                           </a:solidFill>
-                          <a:latin typeface="DejaVu Sans"/>
-                          <a:cs typeface="DejaVu Sans"/>
-                          <a:ea typeface="DejaVu Sans"/>
-                          <a:sym typeface="DejaVu Sans"/>
+                          <a:latin typeface="Arial"/>
+                          <a:cs typeface="Arial"/>
+                          <a:ea typeface="Arial"/>
+                          <a:sym typeface="Arial"/>
                         </a:rPr>
                         <a:t>AÑO</a:t>
                       </a:r>
@@ -9298,10 +9298,10 @@
                               <a:alpha val="100000"/>
                             </a:srgbClr>
                           </a:solidFill>
-                          <a:latin typeface="DejaVu Sans"/>
-                          <a:cs typeface="DejaVu Sans"/>
-                          <a:ea typeface="DejaVu Sans"/>
-                          <a:sym typeface="DejaVu Sans"/>
+                          <a:latin typeface="Arial"/>
+                          <a:cs typeface="Arial"/>
+                          <a:ea typeface="Arial"/>
+                          <a:sym typeface="Arial"/>
                         </a:rPr>
                         <a:t>ESTRATO</a:t>
                       </a:r>
@@ -9366,10 +9366,10 @@
                               <a:alpha val="100000"/>
                             </a:srgbClr>
                           </a:solidFill>
-                          <a:latin typeface="DejaVu Sans"/>
-                          <a:cs typeface="DejaVu Sans"/>
-                          <a:ea typeface="DejaVu Sans"/>
-                          <a:sym typeface="DejaVu Sans"/>
+                          <a:latin typeface="Arial"/>
+                          <a:cs typeface="Arial"/>
+                          <a:ea typeface="Arial"/>
+                          <a:sym typeface="Arial"/>
                         </a:rPr>
                         <a:t>TASA_RENTA</a:t>
                       </a:r>
@@ -9411,7 +9411,7 @@
                   </a:tcPr>
                 </a:tc>
               </a:tr>
-              <a:tr h="366435">
+              <a:tr h="362888">
                 <a:tc>
                   <a:txBody>
                     <a:bodyPr/>
@@ -9436,10 +9436,10 @@
                               <a:alpha val="100000"/>
                             </a:srgbClr>
                           </a:solidFill>
-                          <a:latin typeface="DejaVu Sans"/>
-                          <a:cs typeface="DejaVu Sans"/>
-                          <a:ea typeface="DejaVu Sans"/>
-                          <a:sym typeface="DejaVu Sans"/>
+                          <a:latin typeface="Arial"/>
+                          <a:cs typeface="Arial"/>
+                          <a:ea typeface="Arial"/>
+                          <a:sym typeface="Arial"/>
                         </a:rPr>
                         <a:t>2017</a:t>
                       </a:r>
@@ -9504,10 +9504,10 @@
                               <a:alpha val="100000"/>
                             </a:srgbClr>
                           </a:solidFill>
-                          <a:latin typeface="DejaVu Sans"/>
-                          <a:cs typeface="DejaVu Sans"/>
-                          <a:ea typeface="DejaVu Sans"/>
-                          <a:sym typeface="DejaVu Sans"/>
+                          <a:latin typeface="Arial"/>
+                          <a:cs typeface="Arial"/>
+                          <a:ea typeface="Arial"/>
+                          <a:sym typeface="Arial"/>
                         </a:rPr>
                         <a:t>4</a:t>
                       </a:r>
@@ -9572,10 +9572,10 @@
                               <a:alpha val="100000"/>
                             </a:srgbClr>
                           </a:solidFill>
-                          <a:latin typeface="DejaVu Sans"/>
-                          <a:cs typeface="DejaVu Sans"/>
-                          <a:ea typeface="DejaVu Sans"/>
-                          <a:sym typeface="DejaVu Sans"/>
+                          <a:latin typeface="Arial"/>
+                          <a:cs typeface="Arial"/>
+                          <a:ea typeface="Arial"/>
+                          <a:sym typeface="Arial"/>
                         </a:rPr>
                         <a:t>0.00491</a:t>
                       </a:r>
@@ -9617,7 +9617,7 @@
                   </a:tcPr>
                 </a:tc>
               </a:tr>
-              <a:tr h="366435">
+              <a:tr h="362888">
                 <a:tc>
                   <a:txBody>
                     <a:bodyPr/>
@@ -9642,10 +9642,10 @@
                               <a:alpha val="100000"/>
                             </a:srgbClr>
                           </a:solidFill>
-                          <a:latin typeface="DejaVu Sans"/>
-                          <a:cs typeface="DejaVu Sans"/>
-                          <a:ea typeface="DejaVu Sans"/>
-                          <a:sym typeface="DejaVu Sans"/>
+                          <a:latin typeface="Arial"/>
+                          <a:cs typeface="Arial"/>
+                          <a:ea typeface="Arial"/>
+                          <a:sym typeface="Arial"/>
                         </a:rPr>
                         <a:t>2018</a:t>
                       </a:r>
@@ -9710,10 +9710,10 @@
                               <a:alpha val="100000"/>
                             </a:srgbClr>
                           </a:solidFill>
-                          <a:latin typeface="DejaVu Sans"/>
-                          <a:cs typeface="DejaVu Sans"/>
-                          <a:ea typeface="DejaVu Sans"/>
-                          <a:sym typeface="DejaVu Sans"/>
+                          <a:latin typeface="Arial"/>
+                          <a:cs typeface="Arial"/>
+                          <a:ea typeface="Arial"/>
+                          <a:sym typeface="Arial"/>
                         </a:rPr>
                         <a:t>4</a:t>
                       </a:r>
@@ -9778,10 +9778,10 @@
                               <a:alpha val="100000"/>
                             </a:srgbClr>
                           </a:solidFill>
-                          <a:latin typeface="DejaVu Sans"/>
-                          <a:cs typeface="DejaVu Sans"/>
-                          <a:ea typeface="DejaVu Sans"/>
-                          <a:sym typeface="DejaVu Sans"/>
+                          <a:latin typeface="Arial"/>
+                          <a:cs typeface="Arial"/>
+                          <a:ea typeface="Arial"/>
+                          <a:sym typeface="Arial"/>
                         </a:rPr>
                         <a:t>0.00489</a:t>
                       </a:r>
@@ -9823,7 +9823,7 @@
                   </a:tcPr>
                 </a:tc>
               </a:tr>
-              <a:tr h="366435">
+              <a:tr h="362888">
                 <a:tc>
                   <a:txBody>
                     <a:bodyPr/>
@@ -9848,10 +9848,10 @@
                               <a:alpha val="100000"/>
                             </a:srgbClr>
                           </a:solidFill>
-                          <a:latin typeface="DejaVu Sans"/>
-                          <a:cs typeface="DejaVu Sans"/>
-                          <a:ea typeface="DejaVu Sans"/>
-                          <a:sym typeface="DejaVu Sans"/>
+                          <a:latin typeface="Arial"/>
+                          <a:cs typeface="Arial"/>
+                          <a:ea typeface="Arial"/>
+                          <a:sym typeface="Arial"/>
                         </a:rPr>
                         <a:t>2019</a:t>
                       </a:r>
@@ -9916,10 +9916,10 @@
                               <a:alpha val="100000"/>
                             </a:srgbClr>
                           </a:solidFill>
-                          <a:latin typeface="DejaVu Sans"/>
-                          <a:cs typeface="DejaVu Sans"/>
-                          <a:ea typeface="DejaVu Sans"/>
-                          <a:sym typeface="DejaVu Sans"/>
+                          <a:latin typeface="Arial"/>
+                          <a:cs typeface="Arial"/>
+                          <a:ea typeface="Arial"/>
+                          <a:sym typeface="Arial"/>
                         </a:rPr>
                         <a:t>4</a:t>
                       </a:r>
@@ -9984,10 +9984,10 @@
                               <a:alpha val="100000"/>
                             </a:srgbClr>
                           </a:solidFill>
-                          <a:latin typeface="DejaVu Sans"/>
-                          <a:cs typeface="DejaVu Sans"/>
-                          <a:ea typeface="DejaVu Sans"/>
-                          <a:sym typeface="DejaVu Sans"/>
+                          <a:latin typeface="Arial"/>
+                          <a:cs typeface="Arial"/>
+                          <a:ea typeface="Arial"/>
+                          <a:sym typeface="Arial"/>
                         </a:rPr>
                         <a:t>0.00496</a:t>
                       </a:r>
@@ -10029,7 +10029,7 @@
                   </a:tcPr>
                 </a:tc>
               </a:tr>
-              <a:tr h="366435">
+              <a:tr h="362888">
                 <a:tc>
                   <a:txBody>
                     <a:bodyPr/>
@@ -10054,10 +10054,10 @@
                               <a:alpha val="100000"/>
                             </a:srgbClr>
                           </a:solidFill>
-                          <a:latin typeface="DejaVu Sans"/>
-                          <a:cs typeface="DejaVu Sans"/>
-                          <a:ea typeface="DejaVu Sans"/>
-                          <a:sym typeface="DejaVu Sans"/>
+                          <a:latin typeface="Arial"/>
+                          <a:cs typeface="Arial"/>
+                          <a:ea typeface="Arial"/>
+                          <a:sym typeface="Arial"/>
                         </a:rPr>
                         <a:t>2020</a:t>
                       </a:r>
@@ -10122,10 +10122,10 @@
                               <a:alpha val="100000"/>
                             </a:srgbClr>
                           </a:solidFill>
-                          <a:latin typeface="DejaVu Sans"/>
-                          <a:cs typeface="DejaVu Sans"/>
-                          <a:ea typeface="DejaVu Sans"/>
-                          <a:sym typeface="DejaVu Sans"/>
+                          <a:latin typeface="Arial"/>
+                          <a:cs typeface="Arial"/>
+                          <a:ea typeface="Arial"/>
+                          <a:sym typeface="Arial"/>
                         </a:rPr>
                         <a:t>4</a:t>
                       </a:r>
@@ -10190,10 +10190,10 @@
                               <a:alpha val="100000"/>
                             </a:srgbClr>
                           </a:solidFill>
-                          <a:latin typeface="DejaVu Sans"/>
-                          <a:cs typeface="DejaVu Sans"/>
-                          <a:ea typeface="DejaVu Sans"/>
-                          <a:sym typeface="DejaVu Sans"/>
+                          <a:latin typeface="Arial"/>
+                          <a:cs typeface="Arial"/>
+                          <a:ea typeface="Arial"/>
+                          <a:sym typeface="Arial"/>
                         </a:rPr>
                         <a:t>0.00491</a:t>
                       </a:r>
@@ -10235,7 +10235,7 @@
                   </a:tcPr>
                 </a:tc>
               </a:tr>
-              <a:tr h="366435">
+              <a:tr h="362956">
                 <a:tc>
                   <a:txBody>
                     <a:bodyPr/>
@@ -10260,10 +10260,10 @@
                               <a:alpha val="100000"/>
                             </a:srgbClr>
                           </a:solidFill>
-                          <a:latin typeface="DejaVu Sans"/>
-                          <a:cs typeface="DejaVu Sans"/>
-                          <a:ea typeface="DejaVu Sans"/>
-                          <a:sym typeface="DejaVu Sans"/>
+                          <a:latin typeface="Arial"/>
+                          <a:cs typeface="Arial"/>
+                          <a:ea typeface="Arial"/>
+                          <a:sym typeface="Arial"/>
                         </a:rPr>
                         <a:t>2017</a:t>
                       </a:r>
@@ -10328,10 +10328,10 @@
                               <a:alpha val="100000"/>
                             </a:srgbClr>
                           </a:solidFill>
-                          <a:latin typeface="DejaVu Sans"/>
-                          <a:cs typeface="DejaVu Sans"/>
-                          <a:ea typeface="DejaVu Sans"/>
-                          <a:sym typeface="DejaVu Sans"/>
+                          <a:latin typeface="Arial"/>
+                          <a:cs typeface="Arial"/>
+                          <a:ea typeface="Arial"/>
+                          <a:sym typeface="Arial"/>
                         </a:rPr>
                         <a:t>5</a:t>
                       </a:r>
@@ -10396,10 +10396,10 @@
                               <a:alpha val="100000"/>
                             </a:srgbClr>
                           </a:solidFill>
-                          <a:latin typeface="DejaVu Sans"/>
-                          <a:cs typeface="DejaVu Sans"/>
-                          <a:ea typeface="DejaVu Sans"/>
-                          <a:sym typeface="DejaVu Sans"/>
+                          <a:latin typeface="Arial"/>
+                          <a:cs typeface="Arial"/>
+                          <a:ea typeface="Arial"/>
+                          <a:sym typeface="Arial"/>
                         </a:rPr>
                         <a:t>0.00483</a:t>
                       </a:r>
@@ -10441,7 +10441,7 @@
                   </a:tcPr>
                 </a:tc>
               </a:tr>
-              <a:tr h="366435">
+              <a:tr h="362888">
                 <a:tc>
                   <a:txBody>
                     <a:bodyPr/>
@@ -10466,10 +10466,10 @@
                               <a:alpha val="100000"/>
                             </a:srgbClr>
                           </a:solidFill>
-                          <a:latin typeface="DejaVu Sans"/>
-                          <a:cs typeface="DejaVu Sans"/>
-                          <a:ea typeface="DejaVu Sans"/>
-                          <a:sym typeface="DejaVu Sans"/>
+                          <a:latin typeface="Arial"/>
+                          <a:cs typeface="Arial"/>
+                          <a:ea typeface="Arial"/>
+                          <a:sym typeface="Arial"/>
                         </a:rPr>
                         <a:t>2018</a:t>
                       </a:r>
@@ -10534,10 +10534,10 @@
                               <a:alpha val="100000"/>
                             </a:srgbClr>
                           </a:solidFill>
-                          <a:latin typeface="DejaVu Sans"/>
-                          <a:cs typeface="DejaVu Sans"/>
-                          <a:ea typeface="DejaVu Sans"/>
-                          <a:sym typeface="DejaVu Sans"/>
+                          <a:latin typeface="Arial"/>
+                          <a:cs typeface="Arial"/>
+                          <a:ea typeface="Arial"/>
+                          <a:sym typeface="Arial"/>
                         </a:rPr>
                         <a:t>5</a:t>
                       </a:r>
@@ -10602,10 +10602,10 @@
                               <a:alpha val="100000"/>
                             </a:srgbClr>
                           </a:solidFill>
-                          <a:latin typeface="DejaVu Sans"/>
-                          <a:cs typeface="DejaVu Sans"/>
-                          <a:ea typeface="DejaVu Sans"/>
-                          <a:sym typeface="DejaVu Sans"/>
+                          <a:latin typeface="Arial"/>
+                          <a:cs typeface="Arial"/>
+                          <a:ea typeface="Arial"/>
+                          <a:sym typeface="Arial"/>
                         </a:rPr>
                         <a:t>0.00482</a:t>
                       </a:r>
@@ -10647,7 +10647,7 @@
                   </a:tcPr>
                 </a:tc>
               </a:tr>
-              <a:tr h="366435">
+              <a:tr h="362888">
                 <a:tc>
                   <a:txBody>
                     <a:bodyPr/>
@@ -10672,10 +10672,10 @@
                               <a:alpha val="100000"/>
                             </a:srgbClr>
                           </a:solidFill>
-                          <a:latin typeface="DejaVu Sans"/>
-                          <a:cs typeface="DejaVu Sans"/>
-                          <a:ea typeface="DejaVu Sans"/>
-                          <a:sym typeface="DejaVu Sans"/>
+                          <a:latin typeface="Arial"/>
+                          <a:cs typeface="Arial"/>
+                          <a:ea typeface="Arial"/>
+                          <a:sym typeface="Arial"/>
                         </a:rPr>
                         <a:t>2019</a:t>
                       </a:r>
@@ -10740,10 +10740,10 @@
                               <a:alpha val="100000"/>
                             </a:srgbClr>
                           </a:solidFill>
-                          <a:latin typeface="DejaVu Sans"/>
-                          <a:cs typeface="DejaVu Sans"/>
-                          <a:ea typeface="DejaVu Sans"/>
-                          <a:sym typeface="DejaVu Sans"/>
+                          <a:latin typeface="Arial"/>
+                          <a:cs typeface="Arial"/>
+                          <a:ea typeface="Arial"/>
+                          <a:sym typeface="Arial"/>
                         </a:rPr>
                         <a:t>5</a:t>
                       </a:r>
@@ -10808,10 +10808,10 @@
                               <a:alpha val="100000"/>
                             </a:srgbClr>
                           </a:solidFill>
-                          <a:latin typeface="DejaVu Sans"/>
-                          <a:cs typeface="DejaVu Sans"/>
-                          <a:ea typeface="DejaVu Sans"/>
-                          <a:sym typeface="DejaVu Sans"/>
+                          <a:latin typeface="Arial"/>
+                          <a:cs typeface="Arial"/>
+                          <a:ea typeface="Arial"/>
+                          <a:sym typeface="Arial"/>
                         </a:rPr>
                         <a:t>0.00488</a:t>
                       </a:r>
@@ -10853,7 +10853,7 @@
                   </a:tcPr>
                 </a:tc>
               </a:tr>
-              <a:tr h="366435">
+              <a:tr h="362956">
                 <a:tc>
                   <a:txBody>
                     <a:bodyPr/>
@@ -10878,10 +10878,10 @@
                               <a:alpha val="100000"/>
                             </a:srgbClr>
                           </a:solidFill>
-                          <a:latin typeface="DejaVu Sans"/>
-                          <a:cs typeface="DejaVu Sans"/>
-                          <a:ea typeface="DejaVu Sans"/>
-                          <a:sym typeface="DejaVu Sans"/>
+                          <a:latin typeface="Arial"/>
+                          <a:cs typeface="Arial"/>
+                          <a:ea typeface="Arial"/>
+                          <a:sym typeface="Arial"/>
                         </a:rPr>
                         <a:t>2020</a:t>
                       </a:r>
@@ -10946,10 +10946,10 @@
                               <a:alpha val="100000"/>
                             </a:srgbClr>
                           </a:solidFill>
-                          <a:latin typeface="DejaVu Sans"/>
-                          <a:cs typeface="DejaVu Sans"/>
-                          <a:ea typeface="DejaVu Sans"/>
-                          <a:sym typeface="DejaVu Sans"/>
+                          <a:latin typeface="Arial"/>
+                          <a:cs typeface="Arial"/>
+                          <a:ea typeface="Arial"/>
+                          <a:sym typeface="Arial"/>
                         </a:rPr>
                         <a:t>5</a:t>
                       </a:r>
@@ -11014,10 +11014,10 @@
                               <a:alpha val="100000"/>
                             </a:srgbClr>
                           </a:solidFill>
-                          <a:latin typeface="DejaVu Sans"/>
-                          <a:cs typeface="DejaVu Sans"/>
-                          <a:ea typeface="DejaVu Sans"/>
-                          <a:sym typeface="DejaVu Sans"/>
+                          <a:latin typeface="Arial"/>
+                          <a:cs typeface="Arial"/>
+                          <a:ea typeface="Arial"/>
+                          <a:sym typeface="Arial"/>
                         </a:rPr>
                         <a:t>0.00483</a:t>
                       </a:r>
@@ -11059,7 +11059,7 @@
                   </a:tcPr>
                 </a:tc>
               </a:tr>
-              <a:tr h="366435">
+              <a:tr h="362888">
                 <a:tc>
                   <a:txBody>
                     <a:bodyPr/>
@@ -11084,10 +11084,10 @@
                               <a:alpha val="100000"/>
                             </a:srgbClr>
                           </a:solidFill>
-                          <a:latin typeface="DejaVu Sans"/>
-                          <a:cs typeface="DejaVu Sans"/>
-                          <a:ea typeface="DejaVu Sans"/>
-                          <a:sym typeface="DejaVu Sans"/>
+                          <a:latin typeface="Arial"/>
+                          <a:cs typeface="Arial"/>
+                          <a:ea typeface="Arial"/>
+                          <a:sym typeface="Arial"/>
                         </a:rPr>
                         <a:t>2017</a:t>
                       </a:r>
@@ -11152,10 +11152,10 @@
                               <a:alpha val="100000"/>
                             </a:srgbClr>
                           </a:solidFill>
-                          <a:latin typeface="DejaVu Sans"/>
-                          <a:cs typeface="DejaVu Sans"/>
-                          <a:ea typeface="DejaVu Sans"/>
-                          <a:sym typeface="DejaVu Sans"/>
+                          <a:latin typeface="Arial"/>
+                          <a:cs typeface="Arial"/>
+                          <a:ea typeface="Arial"/>
+                          <a:sym typeface="Arial"/>
                         </a:rPr>
                         <a:t>6</a:t>
                       </a:r>
@@ -11220,10 +11220,10 @@
                               <a:alpha val="100000"/>
                             </a:srgbClr>
                           </a:solidFill>
-                          <a:latin typeface="DejaVu Sans"/>
-                          <a:cs typeface="DejaVu Sans"/>
-                          <a:ea typeface="DejaVu Sans"/>
-                          <a:sym typeface="DejaVu Sans"/>
+                          <a:latin typeface="Arial"/>
+                          <a:cs typeface="Arial"/>
+                          <a:ea typeface="Arial"/>
+                          <a:sym typeface="Arial"/>
                         </a:rPr>
                         <a:t>0.00459</a:t>
                       </a:r>
@@ -11265,7 +11265,7 @@
                   </a:tcPr>
                 </a:tc>
               </a:tr>
-              <a:tr h="366435">
+              <a:tr h="362888">
                 <a:tc>
                   <a:txBody>
                     <a:bodyPr/>
@@ -11290,10 +11290,10 @@
                               <a:alpha val="100000"/>
                             </a:srgbClr>
                           </a:solidFill>
-                          <a:latin typeface="DejaVu Sans"/>
-                          <a:cs typeface="DejaVu Sans"/>
-                          <a:ea typeface="DejaVu Sans"/>
-                          <a:sym typeface="DejaVu Sans"/>
+                          <a:latin typeface="Arial"/>
+                          <a:cs typeface="Arial"/>
+                          <a:ea typeface="Arial"/>
+                          <a:sym typeface="Arial"/>
                         </a:rPr>
                         <a:t>2018</a:t>
                       </a:r>
@@ -11358,10 +11358,10 @@
                               <a:alpha val="100000"/>
                             </a:srgbClr>
                           </a:solidFill>
-                          <a:latin typeface="DejaVu Sans"/>
-                          <a:cs typeface="DejaVu Sans"/>
-                          <a:ea typeface="DejaVu Sans"/>
-                          <a:sym typeface="DejaVu Sans"/>
+                          <a:latin typeface="Arial"/>
+                          <a:cs typeface="Arial"/>
+                          <a:ea typeface="Arial"/>
+                          <a:sym typeface="Arial"/>
                         </a:rPr>
                         <a:t>6</a:t>
                       </a:r>
@@ -11426,10 +11426,10 @@
                               <a:alpha val="100000"/>
                             </a:srgbClr>
                           </a:solidFill>
-                          <a:latin typeface="DejaVu Sans"/>
-                          <a:cs typeface="DejaVu Sans"/>
-                          <a:ea typeface="DejaVu Sans"/>
-                          <a:sym typeface="DejaVu Sans"/>
+                          <a:latin typeface="Arial"/>
+                          <a:cs typeface="Arial"/>
+                          <a:ea typeface="Arial"/>
+                          <a:sym typeface="Arial"/>
                         </a:rPr>
                         <a:t>0.00457</a:t>
                       </a:r>
@@ -11471,7 +11471,7 @@
                   </a:tcPr>
                 </a:tc>
               </a:tr>
-              <a:tr h="366435">
+              <a:tr h="362956">
                 <a:tc>
                   <a:txBody>
                     <a:bodyPr/>
@@ -11496,10 +11496,10 @@
                               <a:alpha val="100000"/>
                             </a:srgbClr>
                           </a:solidFill>
-                          <a:latin typeface="DejaVu Sans"/>
-                          <a:cs typeface="DejaVu Sans"/>
-                          <a:ea typeface="DejaVu Sans"/>
-                          <a:sym typeface="DejaVu Sans"/>
+                          <a:latin typeface="Arial"/>
+                          <a:cs typeface="Arial"/>
+                          <a:ea typeface="Arial"/>
+                          <a:sym typeface="Arial"/>
                         </a:rPr>
                         <a:t>2019</a:t>
                       </a:r>
@@ -11564,10 +11564,10 @@
                               <a:alpha val="100000"/>
                             </a:srgbClr>
                           </a:solidFill>
-                          <a:latin typeface="DejaVu Sans"/>
-                          <a:cs typeface="DejaVu Sans"/>
-                          <a:ea typeface="DejaVu Sans"/>
-                          <a:sym typeface="DejaVu Sans"/>
+                          <a:latin typeface="Arial"/>
+                          <a:cs typeface="Arial"/>
+                          <a:ea typeface="Arial"/>
+                          <a:sym typeface="Arial"/>
                         </a:rPr>
                         <a:t>6</a:t>
                       </a:r>
@@ -11632,10 +11632,10 @@
                               <a:alpha val="100000"/>
                             </a:srgbClr>
                           </a:solidFill>
-                          <a:latin typeface="DejaVu Sans"/>
-                          <a:cs typeface="DejaVu Sans"/>
-                          <a:ea typeface="DejaVu Sans"/>
-                          <a:sym typeface="DejaVu Sans"/>
+                          <a:latin typeface="Arial"/>
+                          <a:cs typeface="Arial"/>
+                          <a:ea typeface="Arial"/>
+                          <a:sym typeface="Arial"/>
                         </a:rPr>
                         <a:t>0.00463</a:t>
                       </a:r>
@@ -11677,7 +11677,7 @@
                   </a:tcPr>
                 </a:tc>
               </a:tr>
-              <a:tr h="366435">
+              <a:tr h="362888">
                 <a:tc>
                   <a:txBody>
                     <a:bodyPr/>
@@ -11702,10 +11702,10 @@
                               <a:alpha val="100000"/>
                             </a:srgbClr>
                           </a:solidFill>
-                          <a:latin typeface="DejaVu Sans"/>
-                          <a:cs typeface="DejaVu Sans"/>
-                          <a:ea typeface="DejaVu Sans"/>
-                          <a:sym typeface="DejaVu Sans"/>
+                          <a:latin typeface="Arial"/>
+                          <a:cs typeface="Arial"/>
+                          <a:ea typeface="Arial"/>
+                          <a:sym typeface="Arial"/>
                         </a:rPr>
                         <a:t>2020</a:t>
                       </a:r>
@@ -11770,10 +11770,10 @@
                               <a:alpha val="100000"/>
                             </a:srgbClr>
                           </a:solidFill>
-                          <a:latin typeface="DejaVu Sans"/>
-                          <a:cs typeface="DejaVu Sans"/>
-                          <a:ea typeface="DejaVu Sans"/>
-                          <a:sym typeface="DejaVu Sans"/>
+                          <a:latin typeface="Arial"/>
+                          <a:cs typeface="Arial"/>
+                          <a:ea typeface="Arial"/>
+                          <a:sym typeface="Arial"/>
                         </a:rPr>
                         <a:t>6</a:t>
                       </a:r>
@@ -11838,10 +11838,10 @@
                               <a:alpha val="100000"/>
                             </a:srgbClr>
                           </a:solidFill>
-                          <a:latin typeface="DejaVu Sans"/>
-                          <a:cs typeface="DejaVu Sans"/>
-                          <a:ea typeface="DejaVu Sans"/>
-                          <a:sym typeface="DejaVu Sans"/>
+                          <a:latin typeface="Arial"/>
+                          <a:cs typeface="Arial"/>
+                          <a:ea typeface="Arial"/>
+                          <a:sym typeface="Arial"/>
                         </a:rPr>
                         <a:t>0.00459</a:t>
                       </a:r>
@@ -12681,11 +12681,11 @@
             <a:tbl>
               <a:tblPr/>
               <a:tblGrid>
-                <a:gridCol w="616299"/>
-                <a:gridCol w="910979"/>
-                <a:gridCol w="1166504"/>
+                <a:gridCol w="571551"/>
+                <a:gridCol w="920528"/>
+                <a:gridCol w="1176804"/>
               </a:tblGrid>
-              <a:tr h="397404">
+              <a:tr h="390241">
                 <a:tc>
                   <a:txBody>
                     <a:bodyPr/>
@@ -12710,10 +12710,10 @@
                               <a:alpha val="100000"/>
                             </a:srgbClr>
                           </a:solidFill>
-                          <a:latin typeface="DejaVu Sans"/>
-                          <a:cs typeface="DejaVu Sans"/>
-                          <a:ea typeface="DejaVu Sans"/>
-                          <a:sym typeface="DejaVu Sans"/>
+                          <a:latin typeface="Arial"/>
+                          <a:cs typeface="Arial"/>
+                          <a:ea typeface="Arial"/>
+                          <a:sym typeface="Arial"/>
                         </a:rPr>
                         <a:t>AÑO</a:t>
                       </a:r>
@@ -12778,10 +12778,10 @@
                               <a:alpha val="100000"/>
                             </a:srgbClr>
                           </a:solidFill>
-                          <a:latin typeface="DejaVu Sans"/>
-                          <a:cs typeface="DejaVu Sans"/>
-                          <a:ea typeface="DejaVu Sans"/>
-                          <a:sym typeface="DejaVu Sans"/>
+                          <a:latin typeface="Arial"/>
+                          <a:cs typeface="Arial"/>
+                          <a:ea typeface="Arial"/>
+                          <a:sym typeface="Arial"/>
                         </a:rPr>
                         <a:t>ESTRATO</a:t>
                       </a:r>
@@ -12846,10 +12846,10 @@
                               <a:alpha val="100000"/>
                             </a:srgbClr>
                           </a:solidFill>
-                          <a:latin typeface="DejaVu Sans"/>
-                          <a:cs typeface="DejaVu Sans"/>
-                          <a:ea typeface="DejaVu Sans"/>
-                          <a:sym typeface="DejaVu Sans"/>
+                          <a:latin typeface="Arial"/>
+                          <a:cs typeface="Arial"/>
+                          <a:ea typeface="Arial"/>
+                          <a:sym typeface="Arial"/>
                         </a:rPr>
                         <a:t>TASA_RENTA</a:t>
                       </a:r>
@@ -12891,7 +12891,7 @@
                   </a:tcPr>
                 </a:tc>
               </a:tr>
-              <a:tr h="366435">
+              <a:tr h="362888">
                 <a:tc>
                   <a:txBody>
                     <a:bodyPr/>
@@ -12916,10 +12916,10 @@
                               <a:alpha val="100000"/>
                             </a:srgbClr>
                           </a:solidFill>
-                          <a:latin typeface="DejaVu Sans"/>
-                          <a:cs typeface="DejaVu Sans"/>
-                          <a:ea typeface="DejaVu Sans"/>
-                          <a:sym typeface="DejaVu Sans"/>
+                          <a:latin typeface="Arial"/>
+                          <a:cs typeface="Arial"/>
+                          <a:ea typeface="Arial"/>
+                          <a:sym typeface="Arial"/>
                         </a:rPr>
                         <a:t>2017</a:t>
                       </a:r>
@@ -12984,10 +12984,10 @@
                               <a:alpha val="100000"/>
                             </a:srgbClr>
                           </a:solidFill>
-                          <a:latin typeface="DejaVu Sans"/>
-                          <a:cs typeface="DejaVu Sans"/>
-                          <a:ea typeface="DejaVu Sans"/>
-                          <a:sym typeface="DejaVu Sans"/>
+                          <a:latin typeface="Arial"/>
+                          <a:cs typeface="Arial"/>
+                          <a:ea typeface="Arial"/>
+                          <a:sym typeface="Arial"/>
                         </a:rPr>
                         <a:t>1</a:t>
                       </a:r>
@@ -13052,10 +13052,10 @@
                               <a:alpha val="100000"/>
                             </a:srgbClr>
                           </a:solidFill>
-                          <a:latin typeface="DejaVu Sans"/>
-                          <a:cs typeface="DejaVu Sans"/>
-                          <a:ea typeface="DejaVu Sans"/>
-                          <a:sym typeface="DejaVu Sans"/>
+                          <a:latin typeface="Arial"/>
+                          <a:cs typeface="Arial"/>
+                          <a:ea typeface="Arial"/>
+                          <a:sym typeface="Arial"/>
                         </a:rPr>
                         <a:t>0.00590</a:t>
                       </a:r>
@@ -13097,7 +13097,7 @@
                   </a:tcPr>
                 </a:tc>
               </a:tr>
-              <a:tr h="366435">
+              <a:tr h="362888">
                 <a:tc>
                   <a:txBody>
                     <a:bodyPr/>
@@ -13122,10 +13122,10 @@
                               <a:alpha val="100000"/>
                             </a:srgbClr>
                           </a:solidFill>
-                          <a:latin typeface="DejaVu Sans"/>
-                          <a:cs typeface="DejaVu Sans"/>
-                          <a:ea typeface="DejaVu Sans"/>
-                          <a:sym typeface="DejaVu Sans"/>
+                          <a:latin typeface="Arial"/>
+                          <a:cs typeface="Arial"/>
+                          <a:ea typeface="Arial"/>
+                          <a:sym typeface="Arial"/>
                         </a:rPr>
                         <a:t>2018</a:t>
                       </a:r>
@@ -13190,10 +13190,10 @@
                               <a:alpha val="100000"/>
                             </a:srgbClr>
                           </a:solidFill>
-                          <a:latin typeface="DejaVu Sans"/>
-                          <a:cs typeface="DejaVu Sans"/>
-                          <a:ea typeface="DejaVu Sans"/>
-                          <a:sym typeface="DejaVu Sans"/>
+                          <a:latin typeface="Arial"/>
+                          <a:cs typeface="Arial"/>
+                          <a:ea typeface="Arial"/>
+                          <a:sym typeface="Arial"/>
                         </a:rPr>
                         <a:t>1</a:t>
                       </a:r>
@@ -13258,10 +13258,10 @@
                               <a:alpha val="100000"/>
                             </a:srgbClr>
                           </a:solidFill>
-                          <a:latin typeface="DejaVu Sans"/>
-                          <a:cs typeface="DejaVu Sans"/>
-                          <a:ea typeface="DejaVu Sans"/>
-                          <a:sym typeface="DejaVu Sans"/>
+                          <a:latin typeface="Arial"/>
+                          <a:cs typeface="Arial"/>
+                          <a:ea typeface="Arial"/>
+                          <a:sym typeface="Arial"/>
                         </a:rPr>
                         <a:t>0.00580</a:t>
                       </a:r>
@@ -13303,7 +13303,7 @@
                   </a:tcPr>
                 </a:tc>
               </a:tr>
-              <a:tr h="366435">
+              <a:tr h="362888">
                 <a:tc>
                   <a:txBody>
                     <a:bodyPr/>
@@ -13328,10 +13328,10 @@
                               <a:alpha val="100000"/>
                             </a:srgbClr>
                           </a:solidFill>
-                          <a:latin typeface="DejaVu Sans"/>
-                          <a:cs typeface="DejaVu Sans"/>
-                          <a:ea typeface="DejaVu Sans"/>
-                          <a:sym typeface="DejaVu Sans"/>
+                          <a:latin typeface="Arial"/>
+                          <a:cs typeface="Arial"/>
+                          <a:ea typeface="Arial"/>
+                          <a:sym typeface="Arial"/>
                         </a:rPr>
                         <a:t>2019</a:t>
                       </a:r>
@@ -13396,10 +13396,10 @@
                               <a:alpha val="100000"/>
                             </a:srgbClr>
                           </a:solidFill>
-                          <a:latin typeface="DejaVu Sans"/>
-                          <a:cs typeface="DejaVu Sans"/>
-                          <a:ea typeface="DejaVu Sans"/>
-                          <a:sym typeface="DejaVu Sans"/>
+                          <a:latin typeface="Arial"/>
+                          <a:cs typeface="Arial"/>
+                          <a:ea typeface="Arial"/>
+                          <a:sym typeface="Arial"/>
                         </a:rPr>
                         <a:t>1</a:t>
                       </a:r>
@@ -13464,10 +13464,10 @@
                               <a:alpha val="100000"/>
                             </a:srgbClr>
                           </a:solidFill>
-                          <a:latin typeface="DejaVu Sans"/>
-                          <a:cs typeface="DejaVu Sans"/>
-                          <a:ea typeface="DejaVu Sans"/>
-                          <a:sym typeface="DejaVu Sans"/>
+                          <a:latin typeface="Arial"/>
+                          <a:cs typeface="Arial"/>
+                          <a:ea typeface="Arial"/>
+                          <a:sym typeface="Arial"/>
                         </a:rPr>
                         <a:t>0.00597</a:t>
                       </a:r>
@@ -13509,7 +13509,7 @@
                   </a:tcPr>
                 </a:tc>
               </a:tr>
-              <a:tr h="366435">
+              <a:tr h="362888">
                 <a:tc>
                   <a:txBody>
                     <a:bodyPr/>
@@ -13534,10 +13534,10 @@
                               <a:alpha val="100000"/>
                             </a:srgbClr>
                           </a:solidFill>
-                          <a:latin typeface="DejaVu Sans"/>
-                          <a:cs typeface="DejaVu Sans"/>
-                          <a:ea typeface="DejaVu Sans"/>
-                          <a:sym typeface="DejaVu Sans"/>
+                          <a:latin typeface="Arial"/>
+                          <a:cs typeface="Arial"/>
+                          <a:ea typeface="Arial"/>
+                          <a:sym typeface="Arial"/>
                         </a:rPr>
                         <a:t>2020</a:t>
                       </a:r>
@@ -13602,10 +13602,10 @@
                               <a:alpha val="100000"/>
                             </a:srgbClr>
                           </a:solidFill>
-                          <a:latin typeface="DejaVu Sans"/>
-                          <a:cs typeface="DejaVu Sans"/>
-                          <a:ea typeface="DejaVu Sans"/>
-                          <a:sym typeface="DejaVu Sans"/>
+                          <a:latin typeface="Arial"/>
+                          <a:cs typeface="Arial"/>
+                          <a:ea typeface="Arial"/>
+                          <a:sym typeface="Arial"/>
                         </a:rPr>
                         <a:t>1</a:t>
                       </a:r>
@@ -13670,10 +13670,10 @@
                               <a:alpha val="100000"/>
                             </a:srgbClr>
                           </a:solidFill>
-                          <a:latin typeface="DejaVu Sans"/>
-                          <a:cs typeface="DejaVu Sans"/>
-                          <a:ea typeface="DejaVu Sans"/>
-                          <a:sym typeface="DejaVu Sans"/>
+                          <a:latin typeface="Arial"/>
+                          <a:cs typeface="Arial"/>
+                          <a:ea typeface="Arial"/>
+                          <a:sym typeface="Arial"/>
                         </a:rPr>
                         <a:t>0.00569</a:t>
                       </a:r>
@@ -13715,7 +13715,7 @@
                   </a:tcPr>
                 </a:tc>
               </a:tr>
-              <a:tr h="366435">
+              <a:tr h="362956">
                 <a:tc>
                   <a:txBody>
                     <a:bodyPr/>
@@ -13740,10 +13740,10 @@
                               <a:alpha val="100000"/>
                             </a:srgbClr>
                           </a:solidFill>
-                          <a:latin typeface="DejaVu Sans"/>
-                          <a:cs typeface="DejaVu Sans"/>
-                          <a:ea typeface="DejaVu Sans"/>
-                          <a:sym typeface="DejaVu Sans"/>
+                          <a:latin typeface="Arial"/>
+                          <a:cs typeface="Arial"/>
+                          <a:ea typeface="Arial"/>
+                          <a:sym typeface="Arial"/>
                         </a:rPr>
                         <a:t>2017</a:t>
                       </a:r>
@@ -13808,10 +13808,10 @@
                               <a:alpha val="100000"/>
                             </a:srgbClr>
                           </a:solidFill>
-                          <a:latin typeface="DejaVu Sans"/>
-                          <a:cs typeface="DejaVu Sans"/>
-                          <a:ea typeface="DejaVu Sans"/>
-                          <a:sym typeface="DejaVu Sans"/>
+                          <a:latin typeface="Arial"/>
+                          <a:cs typeface="Arial"/>
+                          <a:ea typeface="Arial"/>
+                          <a:sym typeface="Arial"/>
                         </a:rPr>
                         <a:t>2</a:t>
                       </a:r>
@@ -13876,10 +13876,10 @@
                               <a:alpha val="100000"/>
                             </a:srgbClr>
                           </a:solidFill>
-                          <a:latin typeface="DejaVu Sans"/>
-                          <a:cs typeface="DejaVu Sans"/>
-                          <a:ea typeface="DejaVu Sans"/>
-                          <a:sym typeface="DejaVu Sans"/>
+                          <a:latin typeface="Arial"/>
+                          <a:cs typeface="Arial"/>
+                          <a:ea typeface="Arial"/>
+                          <a:sym typeface="Arial"/>
                         </a:rPr>
                         <a:t>0.00532</a:t>
                       </a:r>
@@ -13921,7 +13921,7 @@
                   </a:tcPr>
                 </a:tc>
               </a:tr>
-              <a:tr h="366435">
+              <a:tr h="362888">
                 <a:tc>
                   <a:txBody>
                     <a:bodyPr/>
@@ -13946,10 +13946,10 @@
                               <a:alpha val="100000"/>
                             </a:srgbClr>
                           </a:solidFill>
-                          <a:latin typeface="DejaVu Sans"/>
-                          <a:cs typeface="DejaVu Sans"/>
-                          <a:ea typeface="DejaVu Sans"/>
-                          <a:sym typeface="DejaVu Sans"/>
+                          <a:latin typeface="Arial"/>
+                          <a:cs typeface="Arial"/>
+                          <a:ea typeface="Arial"/>
+                          <a:sym typeface="Arial"/>
                         </a:rPr>
                         <a:t>2018</a:t>
                       </a:r>
@@ -14014,10 +14014,10 @@
                               <a:alpha val="100000"/>
                             </a:srgbClr>
                           </a:solidFill>
-                          <a:latin typeface="DejaVu Sans"/>
-                          <a:cs typeface="DejaVu Sans"/>
-                          <a:ea typeface="DejaVu Sans"/>
-                          <a:sym typeface="DejaVu Sans"/>
+                          <a:latin typeface="Arial"/>
+                          <a:cs typeface="Arial"/>
+                          <a:ea typeface="Arial"/>
+                          <a:sym typeface="Arial"/>
                         </a:rPr>
                         <a:t>2</a:t>
                       </a:r>
@@ -14082,10 +14082,10 @@
                               <a:alpha val="100000"/>
                             </a:srgbClr>
                           </a:solidFill>
-                          <a:latin typeface="DejaVu Sans"/>
-                          <a:cs typeface="DejaVu Sans"/>
-                          <a:ea typeface="DejaVu Sans"/>
-                          <a:sym typeface="DejaVu Sans"/>
+                          <a:latin typeface="Arial"/>
+                          <a:cs typeface="Arial"/>
+                          <a:ea typeface="Arial"/>
+                          <a:sym typeface="Arial"/>
                         </a:rPr>
                         <a:t>0.00524</a:t>
                       </a:r>
@@ -14127,7 +14127,7 @@
                   </a:tcPr>
                 </a:tc>
               </a:tr>
-              <a:tr h="366435">
+              <a:tr h="362956">
                 <a:tc>
                   <a:txBody>
                     <a:bodyPr/>
@@ -14152,10 +14152,10 @@
                               <a:alpha val="100000"/>
                             </a:srgbClr>
                           </a:solidFill>
-                          <a:latin typeface="DejaVu Sans"/>
-                          <a:cs typeface="DejaVu Sans"/>
-                          <a:ea typeface="DejaVu Sans"/>
-                          <a:sym typeface="DejaVu Sans"/>
+                          <a:latin typeface="Arial"/>
+                          <a:cs typeface="Arial"/>
+                          <a:ea typeface="Arial"/>
+                          <a:sym typeface="Arial"/>
                         </a:rPr>
                         <a:t>2019</a:t>
                       </a:r>
@@ -14220,10 +14220,10 @@
                               <a:alpha val="100000"/>
                             </a:srgbClr>
                           </a:solidFill>
-                          <a:latin typeface="DejaVu Sans"/>
-                          <a:cs typeface="DejaVu Sans"/>
-                          <a:ea typeface="DejaVu Sans"/>
-                          <a:sym typeface="DejaVu Sans"/>
+                          <a:latin typeface="Arial"/>
+                          <a:cs typeface="Arial"/>
+                          <a:ea typeface="Arial"/>
+                          <a:sym typeface="Arial"/>
                         </a:rPr>
                         <a:t>2</a:t>
                       </a:r>
@@ -14288,10 +14288,10 @@
                               <a:alpha val="100000"/>
                             </a:srgbClr>
                           </a:solidFill>
-                          <a:latin typeface="DejaVu Sans"/>
-                          <a:cs typeface="DejaVu Sans"/>
-                          <a:ea typeface="DejaVu Sans"/>
-                          <a:sym typeface="DejaVu Sans"/>
+                          <a:latin typeface="Arial"/>
+                          <a:cs typeface="Arial"/>
+                          <a:ea typeface="Arial"/>
+                          <a:sym typeface="Arial"/>
                         </a:rPr>
                         <a:t>0.00538</a:t>
                       </a:r>
@@ -14333,7 +14333,7 @@
                   </a:tcPr>
                 </a:tc>
               </a:tr>
-              <a:tr h="366435">
+              <a:tr h="362888">
                 <a:tc>
                   <a:txBody>
                     <a:bodyPr/>
@@ -14358,10 +14358,10 @@
                               <a:alpha val="100000"/>
                             </a:srgbClr>
                           </a:solidFill>
-                          <a:latin typeface="DejaVu Sans"/>
-                          <a:cs typeface="DejaVu Sans"/>
-                          <a:ea typeface="DejaVu Sans"/>
-                          <a:sym typeface="DejaVu Sans"/>
+                          <a:latin typeface="Arial"/>
+                          <a:cs typeface="Arial"/>
+                          <a:ea typeface="Arial"/>
+                          <a:sym typeface="Arial"/>
                         </a:rPr>
                         <a:t>2020</a:t>
                       </a:r>
@@ -14426,10 +14426,10 @@
                               <a:alpha val="100000"/>
                             </a:srgbClr>
                           </a:solidFill>
-                          <a:latin typeface="DejaVu Sans"/>
-                          <a:cs typeface="DejaVu Sans"/>
-                          <a:ea typeface="DejaVu Sans"/>
-                          <a:sym typeface="DejaVu Sans"/>
+                          <a:latin typeface="Arial"/>
+                          <a:cs typeface="Arial"/>
+                          <a:ea typeface="Arial"/>
+                          <a:sym typeface="Arial"/>
                         </a:rPr>
                         <a:t>2</a:t>
                       </a:r>
@@ -14494,10 +14494,10 @@
                               <a:alpha val="100000"/>
                             </a:srgbClr>
                           </a:solidFill>
-                          <a:latin typeface="DejaVu Sans"/>
-                          <a:cs typeface="DejaVu Sans"/>
-                          <a:ea typeface="DejaVu Sans"/>
-                          <a:sym typeface="DejaVu Sans"/>
+                          <a:latin typeface="Arial"/>
+                          <a:cs typeface="Arial"/>
+                          <a:ea typeface="Arial"/>
+                          <a:sym typeface="Arial"/>
                         </a:rPr>
                         <a:t>0.00515</a:t>
                       </a:r>
@@ -14539,7 +14539,7 @@
                   </a:tcPr>
                 </a:tc>
               </a:tr>
-              <a:tr h="366435">
+              <a:tr h="362956">
                 <a:tc>
                   <a:txBody>
                     <a:bodyPr/>
@@ -14564,10 +14564,10 @@
                               <a:alpha val="100000"/>
                             </a:srgbClr>
                           </a:solidFill>
-                          <a:latin typeface="DejaVu Sans"/>
-                          <a:cs typeface="DejaVu Sans"/>
-                          <a:ea typeface="DejaVu Sans"/>
-                          <a:sym typeface="DejaVu Sans"/>
+                          <a:latin typeface="Arial"/>
+                          <a:cs typeface="Arial"/>
+                          <a:ea typeface="Arial"/>
+                          <a:sym typeface="Arial"/>
                         </a:rPr>
                         <a:t>2017</a:t>
                       </a:r>
@@ -14632,10 +14632,10 @@
                               <a:alpha val="100000"/>
                             </a:srgbClr>
                           </a:solidFill>
-                          <a:latin typeface="DejaVu Sans"/>
-                          <a:cs typeface="DejaVu Sans"/>
-                          <a:ea typeface="DejaVu Sans"/>
-                          <a:sym typeface="DejaVu Sans"/>
+                          <a:latin typeface="Arial"/>
+                          <a:cs typeface="Arial"/>
+                          <a:ea typeface="Arial"/>
+                          <a:sym typeface="Arial"/>
                         </a:rPr>
                         <a:t>3</a:t>
                       </a:r>
@@ -14700,10 +14700,10 @@
                               <a:alpha val="100000"/>
                             </a:srgbClr>
                           </a:solidFill>
-                          <a:latin typeface="DejaVu Sans"/>
-                          <a:cs typeface="DejaVu Sans"/>
-                          <a:ea typeface="DejaVu Sans"/>
-                          <a:sym typeface="DejaVu Sans"/>
+                          <a:latin typeface="Arial"/>
+                          <a:cs typeface="Arial"/>
+                          <a:ea typeface="Arial"/>
+                          <a:sym typeface="Arial"/>
                         </a:rPr>
                         <a:t>0.00491</a:t>
                       </a:r>
@@ -14745,7 +14745,7 @@
                   </a:tcPr>
                 </a:tc>
               </a:tr>
-              <a:tr h="366435">
+              <a:tr h="362956">
                 <a:tc>
                   <a:txBody>
                     <a:bodyPr/>
@@ -14770,10 +14770,10 @@
                               <a:alpha val="100000"/>
                             </a:srgbClr>
                           </a:solidFill>
-                          <a:latin typeface="DejaVu Sans"/>
-                          <a:cs typeface="DejaVu Sans"/>
-                          <a:ea typeface="DejaVu Sans"/>
-                          <a:sym typeface="DejaVu Sans"/>
+                          <a:latin typeface="Arial"/>
+                          <a:cs typeface="Arial"/>
+                          <a:ea typeface="Arial"/>
+                          <a:sym typeface="Arial"/>
                         </a:rPr>
                         <a:t>2018</a:t>
                       </a:r>
@@ -14838,10 +14838,10 @@
                               <a:alpha val="100000"/>
                             </a:srgbClr>
                           </a:solidFill>
-                          <a:latin typeface="DejaVu Sans"/>
-                          <a:cs typeface="DejaVu Sans"/>
-                          <a:ea typeface="DejaVu Sans"/>
-                          <a:sym typeface="DejaVu Sans"/>
+                          <a:latin typeface="Arial"/>
+                          <a:cs typeface="Arial"/>
+                          <a:ea typeface="Arial"/>
+                          <a:sym typeface="Arial"/>
                         </a:rPr>
                         <a:t>3</a:t>
                       </a:r>
@@ -14906,10 +14906,10 @@
                               <a:alpha val="100000"/>
                             </a:srgbClr>
                           </a:solidFill>
-                          <a:latin typeface="DejaVu Sans"/>
-                          <a:cs typeface="DejaVu Sans"/>
-                          <a:ea typeface="DejaVu Sans"/>
-                          <a:sym typeface="DejaVu Sans"/>
+                          <a:latin typeface="Arial"/>
+                          <a:cs typeface="Arial"/>
+                          <a:ea typeface="Arial"/>
+                          <a:sym typeface="Arial"/>
                         </a:rPr>
                         <a:t>0.00484</a:t>
                       </a:r>
@@ -14951,7 +14951,7 @@
                   </a:tcPr>
                 </a:tc>
               </a:tr>
-              <a:tr h="366435">
+              <a:tr h="362956">
                 <a:tc>
                   <a:txBody>
                     <a:bodyPr/>
@@ -14976,10 +14976,10 @@
                               <a:alpha val="100000"/>
                             </a:srgbClr>
                           </a:solidFill>
-                          <a:latin typeface="DejaVu Sans"/>
-                          <a:cs typeface="DejaVu Sans"/>
-                          <a:ea typeface="DejaVu Sans"/>
-                          <a:sym typeface="DejaVu Sans"/>
+                          <a:latin typeface="Arial"/>
+                          <a:cs typeface="Arial"/>
+                          <a:ea typeface="Arial"/>
+                          <a:sym typeface="Arial"/>
                         </a:rPr>
                         <a:t>2019</a:t>
                       </a:r>
@@ -15044,10 +15044,10 @@
                               <a:alpha val="100000"/>
                             </a:srgbClr>
                           </a:solidFill>
-                          <a:latin typeface="DejaVu Sans"/>
-                          <a:cs typeface="DejaVu Sans"/>
-                          <a:ea typeface="DejaVu Sans"/>
-                          <a:sym typeface="DejaVu Sans"/>
+                          <a:latin typeface="Arial"/>
+                          <a:cs typeface="Arial"/>
+                          <a:ea typeface="Arial"/>
+                          <a:sym typeface="Arial"/>
                         </a:rPr>
                         <a:t>3</a:t>
                       </a:r>
@@ -15112,10 +15112,10 @@
                               <a:alpha val="100000"/>
                             </a:srgbClr>
                           </a:solidFill>
-                          <a:latin typeface="DejaVu Sans"/>
-                          <a:cs typeface="DejaVu Sans"/>
-                          <a:ea typeface="DejaVu Sans"/>
-                          <a:sym typeface="DejaVu Sans"/>
+                          <a:latin typeface="Arial"/>
+                          <a:cs typeface="Arial"/>
+                          <a:ea typeface="Arial"/>
+                          <a:sym typeface="Arial"/>
                         </a:rPr>
                         <a:t>0.00496</a:t>
                       </a:r>
@@ -15157,7 +15157,7 @@
                   </a:tcPr>
                 </a:tc>
               </a:tr>
-              <a:tr h="366435">
+              <a:tr h="362956">
                 <a:tc>
                   <a:txBody>
                     <a:bodyPr/>
@@ -15182,10 +15182,10 @@
                               <a:alpha val="100000"/>
                             </a:srgbClr>
                           </a:solidFill>
-                          <a:latin typeface="DejaVu Sans"/>
-                          <a:cs typeface="DejaVu Sans"/>
-                          <a:ea typeface="DejaVu Sans"/>
-                          <a:sym typeface="DejaVu Sans"/>
+                          <a:latin typeface="Arial"/>
+                          <a:cs typeface="Arial"/>
+                          <a:ea typeface="Arial"/>
+                          <a:sym typeface="Arial"/>
                         </a:rPr>
                         <a:t>2020</a:t>
                       </a:r>
@@ -15250,10 +15250,10 @@
                               <a:alpha val="100000"/>
                             </a:srgbClr>
                           </a:solidFill>
-                          <a:latin typeface="DejaVu Sans"/>
-                          <a:cs typeface="DejaVu Sans"/>
-                          <a:ea typeface="DejaVu Sans"/>
-                          <a:sym typeface="DejaVu Sans"/>
+                          <a:latin typeface="Arial"/>
+                          <a:cs typeface="Arial"/>
+                          <a:ea typeface="Arial"/>
+                          <a:sym typeface="Arial"/>
                         </a:rPr>
                         <a:t>3</a:t>
                       </a:r>
@@ -15318,10 +15318,10 @@
                               <a:alpha val="100000"/>
                             </a:srgbClr>
                           </a:solidFill>
-                          <a:latin typeface="DejaVu Sans"/>
-                          <a:cs typeface="DejaVu Sans"/>
-                          <a:ea typeface="DejaVu Sans"/>
-                          <a:sym typeface="DejaVu Sans"/>
+                          <a:latin typeface="Arial"/>
+                          <a:cs typeface="Arial"/>
+                          <a:ea typeface="Arial"/>
+                          <a:sym typeface="Arial"/>
                         </a:rPr>
                         <a:t>0.00476</a:t>
                       </a:r>
@@ -15409,11 +15409,11 @@
             <a:tbl>
               <a:tblPr/>
               <a:tblGrid>
-                <a:gridCol w="616299"/>
-                <a:gridCol w="910979"/>
-                <a:gridCol w="1166504"/>
+                <a:gridCol w="571551"/>
+                <a:gridCol w="920528"/>
+                <a:gridCol w="1176804"/>
               </a:tblGrid>
-              <a:tr h="397404">
+              <a:tr h="390241">
                 <a:tc>
                   <a:txBody>
                     <a:bodyPr/>
@@ -15438,10 +15438,10 @@
                               <a:alpha val="100000"/>
                             </a:srgbClr>
                           </a:solidFill>
-                          <a:latin typeface="DejaVu Sans"/>
-                          <a:cs typeface="DejaVu Sans"/>
-                          <a:ea typeface="DejaVu Sans"/>
-                          <a:sym typeface="DejaVu Sans"/>
+                          <a:latin typeface="Arial"/>
+                          <a:cs typeface="Arial"/>
+                          <a:ea typeface="Arial"/>
+                          <a:sym typeface="Arial"/>
                         </a:rPr>
                         <a:t>AÑO</a:t>
                       </a:r>
@@ -15506,10 +15506,10 @@
                               <a:alpha val="100000"/>
                             </a:srgbClr>
                           </a:solidFill>
-                          <a:latin typeface="DejaVu Sans"/>
-                          <a:cs typeface="DejaVu Sans"/>
-                          <a:ea typeface="DejaVu Sans"/>
-                          <a:sym typeface="DejaVu Sans"/>
+                          <a:latin typeface="Arial"/>
+                          <a:cs typeface="Arial"/>
+                          <a:ea typeface="Arial"/>
+                          <a:sym typeface="Arial"/>
                         </a:rPr>
                         <a:t>ESTRATO</a:t>
                       </a:r>
@@ -15574,10 +15574,10 @@
                               <a:alpha val="100000"/>
                             </a:srgbClr>
                           </a:solidFill>
-                          <a:latin typeface="DejaVu Sans"/>
-                          <a:cs typeface="DejaVu Sans"/>
-                          <a:ea typeface="DejaVu Sans"/>
-                          <a:sym typeface="DejaVu Sans"/>
+                          <a:latin typeface="Arial"/>
+                          <a:cs typeface="Arial"/>
+                          <a:ea typeface="Arial"/>
+                          <a:sym typeface="Arial"/>
                         </a:rPr>
                         <a:t>TASA_RENTA</a:t>
                       </a:r>
@@ -15619,7 +15619,7 @@
                   </a:tcPr>
                 </a:tc>
               </a:tr>
-              <a:tr h="366435">
+              <a:tr h="362888">
                 <a:tc>
                   <a:txBody>
                     <a:bodyPr/>
@@ -15644,10 +15644,10 @@
                               <a:alpha val="100000"/>
                             </a:srgbClr>
                           </a:solidFill>
-                          <a:latin typeface="DejaVu Sans"/>
-                          <a:cs typeface="DejaVu Sans"/>
-                          <a:ea typeface="DejaVu Sans"/>
-                          <a:sym typeface="DejaVu Sans"/>
+                          <a:latin typeface="Arial"/>
+                          <a:cs typeface="Arial"/>
+                          <a:ea typeface="Arial"/>
+                          <a:sym typeface="Arial"/>
                         </a:rPr>
                         <a:t>2017</a:t>
                       </a:r>
@@ -15712,10 +15712,10 @@
                               <a:alpha val="100000"/>
                             </a:srgbClr>
                           </a:solidFill>
-                          <a:latin typeface="DejaVu Sans"/>
-                          <a:cs typeface="DejaVu Sans"/>
-                          <a:ea typeface="DejaVu Sans"/>
-                          <a:sym typeface="DejaVu Sans"/>
+                          <a:latin typeface="Arial"/>
+                          <a:cs typeface="Arial"/>
+                          <a:ea typeface="Arial"/>
+                          <a:sym typeface="Arial"/>
                         </a:rPr>
                         <a:t>4</a:t>
                       </a:r>
@@ -15780,10 +15780,10 @@
                               <a:alpha val="100000"/>
                             </a:srgbClr>
                           </a:solidFill>
-                          <a:latin typeface="DejaVu Sans"/>
-                          <a:cs typeface="DejaVu Sans"/>
-                          <a:ea typeface="DejaVu Sans"/>
-                          <a:sym typeface="DejaVu Sans"/>
+                          <a:latin typeface="Arial"/>
+                          <a:cs typeface="Arial"/>
+                          <a:ea typeface="Arial"/>
+                          <a:sym typeface="Arial"/>
                         </a:rPr>
                         <a:t>0.00448</a:t>
                       </a:r>
@@ -15825,7 +15825,7 @@
                   </a:tcPr>
                 </a:tc>
               </a:tr>
-              <a:tr h="366435">
+              <a:tr h="362888">
                 <a:tc>
                   <a:txBody>
                     <a:bodyPr/>
@@ -15850,10 +15850,10 @@
                               <a:alpha val="100000"/>
                             </a:srgbClr>
                           </a:solidFill>
-                          <a:latin typeface="DejaVu Sans"/>
-                          <a:cs typeface="DejaVu Sans"/>
-                          <a:ea typeface="DejaVu Sans"/>
-                          <a:sym typeface="DejaVu Sans"/>
+                          <a:latin typeface="Arial"/>
+                          <a:cs typeface="Arial"/>
+                          <a:ea typeface="Arial"/>
+                          <a:sym typeface="Arial"/>
                         </a:rPr>
                         <a:t>2018</a:t>
                       </a:r>
@@ -15918,10 +15918,10 @@
                               <a:alpha val="100000"/>
                             </a:srgbClr>
                           </a:solidFill>
-                          <a:latin typeface="DejaVu Sans"/>
-                          <a:cs typeface="DejaVu Sans"/>
-                          <a:ea typeface="DejaVu Sans"/>
-                          <a:sym typeface="DejaVu Sans"/>
+                          <a:latin typeface="Arial"/>
+                          <a:cs typeface="Arial"/>
+                          <a:ea typeface="Arial"/>
+                          <a:sym typeface="Arial"/>
                         </a:rPr>
                         <a:t>4</a:t>
                       </a:r>
@@ -15986,10 +15986,10 @@
                               <a:alpha val="100000"/>
                             </a:srgbClr>
                           </a:solidFill>
-                          <a:latin typeface="DejaVu Sans"/>
-                          <a:cs typeface="DejaVu Sans"/>
-                          <a:ea typeface="DejaVu Sans"/>
-                          <a:sym typeface="DejaVu Sans"/>
+                          <a:latin typeface="Arial"/>
+                          <a:cs typeface="Arial"/>
+                          <a:ea typeface="Arial"/>
+                          <a:sym typeface="Arial"/>
                         </a:rPr>
                         <a:t>0.00442</a:t>
                       </a:r>
@@ -16031,7 +16031,7 @@
                   </a:tcPr>
                 </a:tc>
               </a:tr>
-              <a:tr h="366435">
+              <a:tr h="362888">
                 <a:tc>
                   <a:txBody>
                     <a:bodyPr/>
@@ -16056,10 +16056,10 @@
                               <a:alpha val="100000"/>
                             </a:srgbClr>
                           </a:solidFill>
-                          <a:latin typeface="DejaVu Sans"/>
-                          <a:cs typeface="DejaVu Sans"/>
-                          <a:ea typeface="DejaVu Sans"/>
-                          <a:sym typeface="DejaVu Sans"/>
+                          <a:latin typeface="Arial"/>
+                          <a:cs typeface="Arial"/>
+                          <a:ea typeface="Arial"/>
+                          <a:sym typeface="Arial"/>
                         </a:rPr>
                         <a:t>2019</a:t>
                       </a:r>
@@ -16124,10 +16124,10 @@
                               <a:alpha val="100000"/>
                             </a:srgbClr>
                           </a:solidFill>
-                          <a:latin typeface="DejaVu Sans"/>
-                          <a:cs typeface="DejaVu Sans"/>
-                          <a:ea typeface="DejaVu Sans"/>
-                          <a:sym typeface="DejaVu Sans"/>
+                          <a:latin typeface="Arial"/>
+                          <a:cs typeface="Arial"/>
+                          <a:ea typeface="Arial"/>
+                          <a:sym typeface="Arial"/>
                         </a:rPr>
                         <a:t>4</a:t>
                       </a:r>
@@ -16192,10 +16192,10 @@
                               <a:alpha val="100000"/>
                             </a:srgbClr>
                           </a:solidFill>
-                          <a:latin typeface="DejaVu Sans"/>
-                          <a:cs typeface="DejaVu Sans"/>
-                          <a:ea typeface="DejaVu Sans"/>
-                          <a:sym typeface="DejaVu Sans"/>
+                          <a:latin typeface="Arial"/>
+                          <a:cs typeface="Arial"/>
+                          <a:ea typeface="Arial"/>
+                          <a:sym typeface="Arial"/>
                         </a:rPr>
                         <a:t>0.00452</a:t>
                       </a:r>
@@ -16237,7 +16237,7 @@
                   </a:tcPr>
                 </a:tc>
               </a:tr>
-              <a:tr h="366435">
+              <a:tr h="362956">
                 <a:tc>
                   <a:txBody>
                     <a:bodyPr/>
@@ -16262,10 +16262,10 @@
                               <a:alpha val="100000"/>
                             </a:srgbClr>
                           </a:solidFill>
-                          <a:latin typeface="DejaVu Sans"/>
-                          <a:cs typeface="DejaVu Sans"/>
-                          <a:ea typeface="DejaVu Sans"/>
-                          <a:sym typeface="DejaVu Sans"/>
+                          <a:latin typeface="Arial"/>
+                          <a:cs typeface="Arial"/>
+                          <a:ea typeface="Arial"/>
+                          <a:sym typeface="Arial"/>
                         </a:rPr>
                         <a:t>2020</a:t>
                       </a:r>
@@ -16330,10 +16330,10 @@
                               <a:alpha val="100000"/>
                             </a:srgbClr>
                           </a:solidFill>
-                          <a:latin typeface="DejaVu Sans"/>
-                          <a:cs typeface="DejaVu Sans"/>
-                          <a:ea typeface="DejaVu Sans"/>
-                          <a:sym typeface="DejaVu Sans"/>
+                          <a:latin typeface="Arial"/>
+                          <a:cs typeface="Arial"/>
+                          <a:ea typeface="Arial"/>
+                          <a:sym typeface="Arial"/>
                         </a:rPr>
                         <a:t>4</a:t>
                       </a:r>
@@ -16398,10 +16398,10 @@
                               <a:alpha val="100000"/>
                             </a:srgbClr>
                           </a:solidFill>
-                          <a:latin typeface="DejaVu Sans"/>
-                          <a:cs typeface="DejaVu Sans"/>
-                          <a:ea typeface="DejaVu Sans"/>
-                          <a:sym typeface="DejaVu Sans"/>
+                          <a:latin typeface="Arial"/>
+                          <a:cs typeface="Arial"/>
+                          <a:ea typeface="Arial"/>
+                          <a:sym typeface="Arial"/>
                         </a:rPr>
                         <a:t>0.00435</a:t>
                       </a:r>
@@ -16443,7 +16443,7 @@
                   </a:tcPr>
                 </a:tc>
               </a:tr>
-              <a:tr h="366435">
+              <a:tr h="362956">
                 <a:tc>
                   <a:txBody>
                     <a:bodyPr/>
@@ -16468,10 +16468,10 @@
                               <a:alpha val="100000"/>
                             </a:srgbClr>
                           </a:solidFill>
-                          <a:latin typeface="DejaVu Sans"/>
-                          <a:cs typeface="DejaVu Sans"/>
-                          <a:ea typeface="DejaVu Sans"/>
-                          <a:sym typeface="DejaVu Sans"/>
+                          <a:latin typeface="Arial"/>
+                          <a:cs typeface="Arial"/>
+                          <a:ea typeface="Arial"/>
+                          <a:sym typeface="Arial"/>
                         </a:rPr>
                         <a:t>2017</a:t>
                       </a:r>
@@ -16536,10 +16536,10 @@
                               <a:alpha val="100000"/>
                             </a:srgbClr>
                           </a:solidFill>
-                          <a:latin typeface="DejaVu Sans"/>
-                          <a:cs typeface="DejaVu Sans"/>
-                          <a:ea typeface="DejaVu Sans"/>
-                          <a:sym typeface="DejaVu Sans"/>
+                          <a:latin typeface="Arial"/>
+                          <a:cs typeface="Arial"/>
+                          <a:ea typeface="Arial"/>
+                          <a:sym typeface="Arial"/>
                         </a:rPr>
                         <a:t>5</a:t>
                       </a:r>
@@ -16604,10 +16604,10 @@
                               <a:alpha val="100000"/>
                             </a:srgbClr>
                           </a:solidFill>
-                          <a:latin typeface="DejaVu Sans"/>
-                          <a:cs typeface="DejaVu Sans"/>
-                          <a:ea typeface="DejaVu Sans"/>
-                          <a:sym typeface="DejaVu Sans"/>
+                          <a:latin typeface="Arial"/>
+                          <a:cs typeface="Arial"/>
+                          <a:ea typeface="Arial"/>
+                          <a:sym typeface="Arial"/>
                         </a:rPr>
                         <a:t>0.00453</a:t>
                       </a:r>
@@ -16649,7 +16649,7 @@
                   </a:tcPr>
                 </a:tc>
               </a:tr>
-              <a:tr h="366435">
+              <a:tr h="362888">
                 <a:tc>
                   <a:txBody>
                     <a:bodyPr/>
@@ -16674,10 +16674,10 @@
                               <a:alpha val="100000"/>
                             </a:srgbClr>
                           </a:solidFill>
-                          <a:latin typeface="DejaVu Sans"/>
-                          <a:cs typeface="DejaVu Sans"/>
-                          <a:ea typeface="DejaVu Sans"/>
-                          <a:sym typeface="DejaVu Sans"/>
+                          <a:latin typeface="Arial"/>
+                          <a:cs typeface="Arial"/>
+                          <a:ea typeface="Arial"/>
+                          <a:sym typeface="Arial"/>
                         </a:rPr>
                         <a:t>2018</a:t>
                       </a:r>
@@ -16742,10 +16742,10 @@
                               <a:alpha val="100000"/>
                             </a:srgbClr>
                           </a:solidFill>
-                          <a:latin typeface="DejaVu Sans"/>
-                          <a:cs typeface="DejaVu Sans"/>
-                          <a:ea typeface="DejaVu Sans"/>
-                          <a:sym typeface="DejaVu Sans"/>
+                          <a:latin typeface="Arial"/>
+                          <a:cs typeface="Arial"/>
+                          <a:ea typeface="Arial"/>
+                          <a:sym typeface="Arial"/>
                         </a:rPr>
                         <a:t>5</a:t>
                       </a:r>
@@ -16810,10 +16810,10 @@
                               <a:alpha val="100000"/>
                             </a:srgbClr>
                           </a:solidFill>
-                          <a:latin typeface="DejaVu Sans"/>
-                          <a:cs typeface="DejaVu Sans"/>
-                          <a:ea typeface="DejaVu Sans"/>
-                          <a:sym typeface="DejaVu Sans"/>
+                          <a:latin typeface="Arial"/>
+                          <a:cs typeface="Arial"/>
+                          <a:ea typeface="Arial"/>
+                          <a:sym typeface="Arial"/>
                         </a:rPr>
                         <a:t>0.00447</a:t>
                       </a:r>
@@ -16855,7 +16855,7 @@
                   </a:tcPr>
                 </a:tc>
               </a:tr>
-              <a:tr h="366435">
+              <a:tr h="362888">
                 <a:tc>
                   <a:txBody>
                     <a:bodyPr/>
@@ -16880,10 +16880,10 @@
                               <a:alpha val="100000"/>
                             </a:srgbClr>
                           </a:solidFill>
-                          <a:latin typeface="DejaVu Sans"/>
-                          <a:cs typeface="DejaVu Sans"/>
-                          <a:ea typeface="DejaVu Sans"/>
-                          <a:sym typeface="DejaVu Sans"/>
+                          <a:latin typeface="Arial"/>
+                          <a:cs typeface="Arial"/>
+                          <a:ea typeface="Arial"/>
+                          <a:sym typeface="Arial"/>
                         </a:rPr>
                         <a:t>2019</a:t>
                       </a:r>
@@ -16948,10 +16948,10 @@
                               <a:alpha val="100000"/>
                             </a:srgbClr>
                           </a:solidFill>
-                          <a:latin typeface="DejaVu Sans"/>
-                          <a:cs typeface="DejaVu Sans"/>
-                          <a:ea typeface="DejaVu Sans"/>
-                          <a:sym typeface="DejaVu Sans"/>
+                          <a:latin typeface="Arial"/>
+                          <a:cs typeface="Arial"/>
+                          <a:ea typeface="Arial"/>
+                          <a:sym typeface="Arial"/>
                         </a:rPr>
                         <a:t>5</a:t>
                       </a:r>
@@ -17016,10 +17016,10 @@
                               <a:alpha val="100000"/>
                             </a:srgbClr>
                           </a:solidFill>
-                          <a:latin typeface="DejaVu Sans"/>
-                          <a:cs typeface="DejaVu Sans"/>
-                          <a:ea typeface="DejaVu Sans"/>
-                          <a:sym typeface="DejaVu Sans"/>
+                          <a:latin typeface="Arial"/>
+                          <a:cs typeface="Arial"/>
+                          <a:ea typeface="Arial"/>
+                          <a:sym typeface="Arial"/>
                         </a:rPr>
                         <a:t>0.00457</a:t>
                       </a:r>
@@ -17061,7 +17061,7 @@
                   </a:tcPr>
                 </a:tc>
               </a:tr>
-              <a:tr h="366435">
+              <a:tr h="362888">
                 <a:tc>
                   <a:txBody>
                     <a:bodyPr/>
@@ -17086,10 +17086,10 @@
                               <a:alpha val="100000"/>
                             </a:srgbClr>
                           </a:solidFill>
-                          <a:latin typeface="DejaVu Sans"/>
-                          <a:cs typeface="DejaVu Sans"/>
-                          <a:ea typeface="DejaVu Sans"/>
-                          <a:sym typeface="DejaVu Sans"/>
+                          <a:latin typeface="Arial"/>
+                          <a:cs typeface="Arial"/>
+                          <a:ea typeface="Arial"/>
+                          <a:sym typeface="Arial"/>
                         </a:rPr>
                         <a:t>2020</a:t>
                       </a:r>
@@ -17154,10 +17154,10 @@
                               <a:alpha val="100000"/>
                             </a:srgbClr>
                           </a:solidFill>
-                          <a:latin typeface="DejaVu Sans"/>
-                          <a:cs typeface="DejaVu Sans"/>
-                          <a:ea typeface="DejaVu Sans"/>
-                          <a:sym typeface="DejaVu Sans"/>
+                          <a:latin typeface="Arial"/>
+                          <a:cs typeface="Arial"/>
+                          <a:ea typeface="Arial"/>
+                          <a:sym typeface="Arial"/>
                         </a:rPr>
                         <a:t>5</a:t>
                       </a:r>
@@ -17222,10 +17222,10 @@
                               <a:alpha val="100000"/>
                             </a:srgbClr>
                           </a:solidFill>
-                          <a:latin typeface="DejaVu Sans"/>
-                          <a:cs typeface="DejaVu Sans"/>
-                          <a:ea typeface="DejaVu Sans"/>
-                          <a:sym typeface="DejaVu Sans"/>
+                          <a:latin typeface="Arial"/>
+                          <a:cs typeface="Arial"/>
+                          <a:ea typeface="Arial"/>
+                          <a:sym typeface="Arial"/>
                         </a:rPr>
                         <a:t>0.00440</a:t>
                       </a:r>
@@ -17267,7 +17267,7 @@
                   </a:tcPr>
                 </a:tc>
               </a:tr>
-              <a:tr h="366435">
+              <a:tr h="362956">
                 <a:tc>
                   <a:txBody>
                     <a:bodyPr/>
@@ -17292,10 +17292,10 @@
                               <a:alpha val="100000"/>
                             </a:srgbClr>
                           </a:solidFill>
-                          <a:latin typeface="DejaVu Sans"/>
-                          <a:cs typeface="DejaVu Sans"/>
-                          <a:ea typeface="DejaVu Sans"/>
-                          <a:sym typeface="DejaVu Sans"/>
+                          <a:latin typeface="Arial"/>
+                          <a:cs typeface="Arial"/>
+                          <a:ea typeface="Arial"/>
+                          <a:sym typeface="Arial"/>
                         </a:rPr>
                         <a:t>2017</a:t>
                       </a:r>
@@ -17360,10 +17360,10 @@
                               <a:alpha val="100000"/>
                             </a:srgbClr>
                           </a:solidFill>
-                          <a:latin typeface="DejaVu Sans"/>
-                          <a:cs typeface="DejaVu Sans"/>
-                          <a:ea typeface="DejaVu Sans"/>
-                          <a:sym typeface="DejaVu Sans"/>
+                          <a:latin typeface="Arial"/>
+                          <a:cs typeface="Arial"/>
+                          <a:ea typeface="Arial"/>
+                          <a:sym typeface="Arial"/>
                         </a:rPr>
                         <a:t>6</a:t>
                       </a:r>
@@ -17428,10 +17428,10 @@
                               <a:alpha val="100000"/>
                             </a:srgbClr>
                           </a:solidFill>
-                          <a:latin typeface="DejaVu Sans"/>
-                          <a:cs typeface="DejaVu Sans"/>
-                          <a:ea typeface="DejaVu Sans"/>
-                          <a:sym typeface="DejaVu Sans"/>
+                          <a:latin typeface="Arial"/>
+                          <a:cs typeface="Arial"/>
+                          <a:ea typeface="Arial"/>
+                          <a:sym typeface="Arial"/>
                         </a:rPr>
                         <a:t>0.00443</a:t>
                       </a:r>
@@ -17473,7 +17473,7 @@
                   </a:tcPr>
                 </a:tc>
               </a:tr>
-              <a:tr h="366435">
+              <a:tr h="362956">
                 <a:tc>
                   <a:txBody>
                     <a:bodyPr/>
@@ -17498,10 +17498,10 @@
                               <a:alpha val="100000"/>
                             </a:srgbClr>
                           </a:solidFill>
-                          <a:latin typeface="DejaVu Sans"/>
-                          <a:cs typeface="DejaVu Sans"/>
-                          <a:ea typeface="DejaVu Sans"/>
-                          <a:sym typeface="DejaVu Sans"/>
+                          <a:latin typeface="Arial"/>
+                          <a:cs typeface="Arial"/>
+                          <a:ea typeface="Arial"/>
+                          <a:sym typeface="Arial"/>
                         </a:rPr>
                         <a:t>2018</a:t>
                       </a:r>
@@ -17566,10 +17566,10 @@
                               <a:alpha val="100000"/>
                             </a:srgbClr>
                           </a:solidFill>
-                          <a:latin typeface="DejaVu Sans"/>
-                          <a:cs typeface="DejaVu Sans"/>
-                          <a:ea typeface="DejaVu Sans"/>
-                          <a:sym typeface="DejaVu Sans"/>
+                          <a:latin typeface="Arial"/>
+                          <a:cs typeface="Arial"/>
+                          <a:ea typeface="Arial"/>
+                          <a:sym typeface="Arial"/>
                         </a:rPr>
                         <a:t>6</a:t>
                       </a:r>
@@ -17634,10 +17634,10 @@
                               <a:alpha val="100000"/>
                             </a:srgbClr>
                           </a:solidFill>
-                          <a:latin typeface="DejaVu Sans"/>
-                          <a:cs typeface="DejaVu Sans"/>
-                          <a:ea typeface="DejaVu Sans"/>
-                          <a:sym typeface="DejaVu Sans"/>
+                          <a:latin typeface="Arial"/>
+                          <a:cs typeface="Arial"/>
+                          <a:ea typeface="Arial"/>
+                          <a:sym typeface="Arial"/>
                         </a:rPr>
                         <a:t>0.00438</a:t>
                       </a:r>
@@ -17679,7 +17679,7 @@
                   </a:tcPr>
                 </a:tc>
               </a:tr>
-              <a:tr h="366435">
+              <a:tr h="362888">
                 <a:tc>
                   <a:txBody>
                     <a:bodyPr/>
@@ -17704,10 +17704,10 @@
                               <a:alpha val="100000"/>
                             </a:srgbClr>
                           </a:solidFill>
-                          <a:latin typeface="DejaVu Sans"/>
-                          <a:cs typeface="DejaVu Sans"/>
-                          <a:ea typeface="DejaVu Sans"/>
-                          <a:sym typeface="DejaVu Sans"/>
+                          <a:latin typeface="Arial"/>
+                          <a:cs typeface="Arial"/>
+                          <a:ea typeface="Arial"/>
+                          <a:sym typeface="Arial"/>
                         </a:rPr>
                         <a:t>2019</a:t>
                       </a:r>
@@ -17772,10 +17772,10 @@
                               <a:alpha val="100000"/>
                             </a:srgbClr>
                           </a:solidFill>
-                          <a:latin typeface="DejaVu Sans"/>
-                          <a:cs typeface="DejaVu Sans"/>
-                          <a:ea typeface="DejaVu Sans"/>
-                          <a:sym typeface="DejaVu Sans"/>
+                          <a:latin typeface="Arial"/>
+                          <a:cs typeface="Arial"/>
+                          <a:ea typeface="Arial"/>
+                          <a:sym typeface="Arial"/>
                         </a:rPr>
                         <a:t>6</a:t>
                       </a:r>
@@ -17840,10 +17840,10 @@
                               <a:alpha val="100000"/>
                             </a:srgbClr>
                           </a:solidFill>
-                          <a:latin typeface="DejaVu Sans"/>
-                          <a:cs typeface="DejaVu Sans"/>
-                          <a:ea typeface="DejaVu Sans"/>
-                          <a:sym typeface="DejaVu Sans"/>
+                          <a:latin typeface="Arial"/>
+                          <a:cs typeface="Arial"/>
+                          <a:ea typeface="Arial"/>
+                          <a:sym typeface="Arial"/>
                         </a:rPr>
                         <a:t>0.00447</a:t>
                       </a:r>
@@ -17885,7 +17885,7 @@
                   </a:tcPr>
                 </a:tc>
               </a:tr>
-              <a:tr h="366435">
+              <a:tr h="362956">
                 <a:tc>
                   <a:txBody>
                     <a:bodyPr/>
@@ -17910,10 +17910,10 @@
                               <a:alpha val="100000"/>
                             </a:srgbClr>
                           </a:solidFill>
-                          <a:latin typeface="DejaVu Sans"/>
-                          <a:cs typeface="DejaVu Sans"/>
-                          <a:ea typeface="DejaVu Sans"/>
-                          <a:sym typeface="DejaVu Sans"/>
+                          <a:latin typeface="Arial"/>
+                          <a:cs typeface="Arial"/>
+                          <a:ea typeface="Arial"/>
+                          <a:sym typeface="Arial"/>
                         </a:rPr>
                         <a:t>2020</a:t>
                       </a:r>
@@ -17978,10 +17978,10 @@
                               <a:alpha val="100000"/>
                             </a:srgbClr>
                           </a:solidFill>
-                          <a:latin typeface="DejaVu Sans"/>
-                          <a:cs typeface="DejaVu Sans"/>
-                          <a:ea typeface="DejaVu Sans"/>
-                          <a:sym typeface="DejaVu Sans"/>
+                          <a:latin typeface="Arial"/>
+                          <a:cs typeface="Arial"/>
+                          <a:ea typeface="Arial"/>
+                          <a:sym typeface="Arial"/>
                         </a:rPr>
                         <a:t>6</a:t>
                       </a:r>
@@ -18046,10 +18046,10 @@
                               <a:alpha val="100000"/>
                             </a:srgbClr>
                           </a:solidFill>
-                          <a:latin typeface="DejaVu Sans"/>
-                          <a:cs typeface="DejaVu Sans"/>
-                          <a:ea typeface="DejaVu Sans"/>
-                          <a:sym typeface="DejaVu Sans"/>
+                          <a:latin typeface="Arial"/>
+                          <a:cs typeface="Arial"/>
+                          <a:ea typeface="Arial"/>
+                          <a:sym typeface="Arial"/>
                         </a:rPr>
                         <a:t>0.00431</a:t>
                       </a:r>

</xml_diff>

<commit_message>
Se incluyeron los valores de administración del censo de equipamientos de 2018 en los arriendos. Se requiere definir el IPC para afectar estos valores y si se aplica para la validación.
</commit_message>
<xml_diff>
--- a/reports/PRESENTACION_ESTUDIO_TASA_RENTA.pptx
+++ b/reports/PRESENTACION_ESTUDIO_TASA_RENTA.pptx
@@ -3625,7 +3625,7 @@
             <a:pPr lvl="1"/>
             <a:r>
               <a:rPr/>
-              <a:t>Luego de estas exclusiones, el número de predios en la base para trabajar es 705.025.</a:t>
+              <a:t>Luego de estas exclusiones, el número de predios en la base para trabajar es 704.409.</a:t>
             </a:r>
           </a:p>
         </p:txBody>
@@ -3719,10 +3719,10 @@
             <a:tbl>
               <a:tblPr/>
               <a:tblGrid>
-                <a:gridCol w="1785517"/>
-                <a:gridCol w="1087104"/>
+                <a:gridCol w="1965227"/>
+                <a:gridCol w="1206092"/>
               </a:tblGrid>
-              <a:tr h="437271">
+              <a:tr h="457183">
                 <a:tc>
                   <a:txBody>
                     <a:bodyPr/>
@@ -3860,7 +3860,7 @@
                   </a:tcPr>
                 </a:tc>
               </a:tr>
-              <a:tr h="427982">
+              <a:tr h="437693">
                 <a:tc>
                   <a:txBody>
                     <a:bodyPr/>
@@ -3885,10 +3885,10 @@
                               <a:alpha val="100000"/>
                             </a:srgbClr>
                           </a:solidFill>
-                          <a:latin typeface="Arial"/>
-                          <a:cs typeface="Arial"/>
-                          <a:ea typeface="Arial"/>
-                          <a:sym typeface="Arial"/>
+                          <a:latin typeface="DejaVu Sans"/>
+                          <a:cs typeface="DejaVu Sans"/>
+                          <a:ea typeface="DejaVu Sans"/>
+                          <a:sym typeface="DejaVu Sans"/>
                         </a:rPr>
                         <a:t>Rurales</a:t>
                       </a:r>
@@ -3953,10 +3953,10 @@
                               <a:alpha val="100000"/>
                             </a:srgbClr>
                           </a:solidFill>
-                          <a:latin typeface="Arial"/>
-                          <a:cs typeface="Arial"/>
-                          <a:ea typeface="Arial"/>
-                          <a:sym typeface="Arial"/>
+                          <a:latin typeface="DejaVu Sans"/>
+                          <a:cs typeface="DejaVu Sans"/>
+                          <a:ea typeface="DejaVu Sans"/>
+                          <a:sym typeface="DejaVu Sans"/>
                         </a:rPr>
                         <a:t> 97.321</a:t>
                       </a:r>
@@ -3998,7 +3998,7 @@
                   </a:tcPr>
                 </a:tc>
               </a:tr>
-              <a:tr h="429991">
+              <a:tr h="446846">
                 <a:tc>
                   <a:txBody>
                     <a:bodyPr/>
@@ -4023,10 +4023,10 @@
                               <a:alpha val="100000"/>
                             </a:srgbClr>
                           </a:solidFill>
-                          <a:latin typeface="Arial"/>
-                          <a:cs typeface="Arial"/>
-                          <a:ea typeface="Arial"/>
-                          <a:sym typeface="Arial"/>
+                          <a:latin typeface="DejaVu Sans"/>
+                          <a:cs typeface="DejaVu Sans"/>
+                          <a:ea typeface="DejaVu Sans"/>
+                          <a:sym typeface="DejaVu Sans"/>
                         </a:rPr>
                         <a:t>Sin área</a:t>
                       </a:r>
@@ -4091,10 +4091,10 @@
                               <a:alpha val="100000"/>
                             </a:srgbClr>
                           </a:solidFill>
-                          <a:latin typeface="Arial"/>
-                          <a:cs typeface="Arial"/>
-                          <a:ea typeface="Arial"/>
-                          <a:sym typeface="Arial"/>
+                          <a:latin typeface="DejaVu Sans"/>
+                          <a:cs typeface="DejaVu Sans"/>
+                          <a:ea typeface="DejaVu Sans"/>
+                          <a:sym typeface="DejaVu Sans"/>
                         </a:rPr>
                         <a:t>254.640</a:t>
                       </a:r>
@@ -4136,7 +4136,7 @@
                   </a:tcPr>
                 </a:tc>
               </a:tr>
-              <a:tr h="472630">
+              <a:tr h="482006">
                 <a:tc>
                   <a:txBody>
                     <a:bodyPr/>
@@ -4161,10 +4161,10 @@
                               <a:alpha val="100000"/>
                             </a:srgbClr>
                           </a:solidFill>
-                          <a:latin typeface="Arial"/>
-                          <a:cs typeface="Arial"/>
-                          <a:ea typeface="Arial"/>
-                          <a:sym typeface="Arial"/>
+                          <a:latin typeface="DejaVu Sans"/>
+                          <a:cs typeface="DejaVu Sans"/>
+                          <a:ea typeface="DejaVu Sans"/>
+                          <a:sym typeface="DejaVu Sans"/>
                         </a:rPr>
                         <a:t>Sin Barmanpre</a:t>
                       </a:r>
@@ -4229,10 +4229,10 @@
                               <a:alpha val="100000"/>
                             </a:srgbClr>
                           </a:solidFill>
-                          <a:latin typeface="Arial"/>
-                          <a:cs typeface="Arial"/>
-                          <a:ea typeface="Arial"/>
-                          <a:sym typeface="Arial"/>
+                          <a:latin typeface="DejaVu Sans"/>
+                          <a:cs typeface="DejaVu Sans"/>
+                          <a:ea typeface="DejaVu Sans"/>
+                          <a:sym typeface="DejaVu Sans"/>
                         </a:rPr>
                         <a:t> 81.918</a:t>
                       </a:r>
@@ -4274,7 +4274,7 @@
                   </a:tcPr>
                 </a:tc>
               </a:tr>
-              <a:tr h="429991">
+              <a:tr h="437693">
                 <a:tc>
                   <a:txBody>
                     <a:bodyPr/>
@@ -4299,10 +4299,10 @@
                               <a:alpha val="100000"/>
                             </a:srgbClr>
                           </a:solidFill>
-                          <a:latin typeface="Arial"/>
-                          <a:cs typeface="Arial"/>
-                          <a:ea typeface="Arial"/>
-                          <a:sym typeface="Arial"/>
+                          <a:latin typeface="DejaVu Sans"/>
+                          <a:cs typeface="DejaVu Sans"/>
+                          <a:ea typeface="DejaVu Sans"/>
+                          <a:sym typeface="DejaVu Sans"/>
                         </a:rPr>
                         <a:t>Sin estrato</a:t>
                       </a:r>
@@ -4367,10 +4367,10 @@
                               <a:alpha val="100000"/>
                             </a:srgbClr>
                           </a:solidFill>
-                          <a:latin typeface="Arial"/>
-                          <a:cs typeface="Arial"/>
-                          <a:ea typeface="Arial"/>
-                          <a:sym typeface="Arial"/>
+                          <a:latin typeface="DejaVu Sans"/>
+                          <a:cs typeface="DejaVu Sans"/>
+                          <a:ea typeface="DejaVu Sans"/>
+                          <a:sym typeface="DejaVu Sans"/>
                         </a:rPr>
                         <a:t> 19.043</a:t>
                       </a:r>
@@ -5072,14 +5072,14 @@
             <a:pPr lvl="1"/>
             <a:r>
               <a:rPr/>
-              <a:t>Luego de este control de calidad, la base de datos tiene un total de 580.549.</a:t>
+              <a:t>Luego de este control de calidad, la base de datos tiene un total de 580.937.</a:t>
             </a:r>
           </a:p>
           <a:p>
             <a:pPr lvl="1"/>
             <a:r>
               <a:rPr/>
-              <a:t>Con estos 580.549 registros, se procede a realizar el cálculo del promedio por sector catastral.</a:t>
+              <a:t>Con estos 580.937 registros, se procede a realizar el cálculo del promedio por sector catastral.</a:t>
             </a:r>
           </a:p>
           <a:p>
@@ -6473,11 +6473,11 @@
             <a:tbl>
               <a:tblPr/>
               <a:tblGrid>
-                <a:gridCol w="571551"/>
-                <a:gridCol w="920528"/>
-                <a:gridCol w="1176804"/>
+                <a:gridCol w="616299"/>
+                <a:gridCol w="910979"/>
+                <a:gridCol w="1166504"/>
               </a:tblGrid>
-              <a:tr h="390241">
+              <a:tr h="397404">
                 <a:tc>
                   <a:txBody>
                     <a:bodyPr/>
@@ -6502,10 +6502,10 @@
                               <a:alpha val="100000"/>
                             </a:srgbClr>
                           </a:solidFill>
-                          <a:latin typeface="Arial"/>
-                          <a:cs typeface="Arial"/>
-                          <a:ea typeface="Arial"/>
-                          <a:sym typeface="Arial"/>
+                          <a:latin typeface="DejaVu Sans"/>
+                          <a:cs typeface="DejaVu Sans"/>
+                          <a:ea typeface="DejaVu Sans"/>
+                          <a:sym typeface="DejaVu Sans"/>
                         </a:rPr>
                         <a:t>AÑO</a:t>
                       </a:r>
@@ -6570,10 +6570,10 @@
                               <a:alpha val="100000"/>
                             </a:srgbClr>
                           </a:solidFill>
-                          <a:latin typeface="Arial"/>
-                          <a:cs typeface="Arial"/>
-                          <a:ea typeface="Arial"/>
-                          <a:sym typeface="Arial"/>
+                          <a:latin typeface="DejaVu Sans"/>
+                          <a:cs typeface="DejaVu Sans"/>
+                          <a:ea typeface="DejaVu Sans"/>
+                          <a:sym typeface="DejaVu Sans"/>
                         </a:rPr>
                         <a:t>ESTRATO</a:t>
                       </a:r>
@@ -6638,10 +6638,10 @@
                               <a:alpha val="100000"/>
                             </a:srgbClr>
                           </a:solidFill>
-                          <a:latin typeface="Arial"/>
-                          <a:cs typeface="Arial"/>
-                          <a:ea typeface="Arial"/>
-                          <a:sym typeface="Arial"/>
+                          <a:latin typeface="DejaVu Sans"/>
+                          <a:cs typeface="DejaVu Sans"/>
+                          <a:ea typeface="DejaVu Sans"/>
+                          <a:sym typeface="DejaVu Sans"/>
                         </a:rPr>
                         <a:t>TASA_RENTA</a:t>
                       </a:r>
@@ -6683,7 +6683,7 @@
                   </a:tcPr>
                 </a:tc>
               </a:tr>
-              <a:tr h="362888">
+              <a:tr h="366435">
                 <a:tc>
                   <a:txBody>
                     <a:bodyPr/>
@@ -6708,10 +6708,10 @@
                               <a:alpha val="100000"/>
                             </a:srgbClr>
                           </a:solidFill>
-                          <a:latin typeface="Arial"/>
-                          <a:cs typeface="Arial"/>
-                          <a:ea typeface="Arial"/>
-                          <a:sym typeface="Arial"/>
+                          <a:latin typeface="DejaVu Sans"/>
+                          <a:cs typeface="DejaVu Sans"/>
+                          <a:ea typeface="DejaVu Sans"/>
+                          <a:sym typeface="DejaVu Sans"/>
                         </a:rPr>
                         <a:t>2017</a:t>
                       </a:r>
@@ -6776,10 +6776,10 @@
                               <a:alpha val="100000"/>
                             </a:srgbClr>
                           </a:solidFill>
-                          <a:latin typeface="Arial"/>
-                          <a:cs typeface="Arial"/>
-                          <a:ea typeface="Arial"/>
-                          <a:sym typeface="Arial"/>
+                          <a:latin typeface="DejaVu Sans"/>
+                          <a:cs typeface="DejaVu Sans"/>
+                          <a:ea typeface="DejaVu Sans"/>
+                          <a:sym typeface="DejaVu Sans"/>
                         </a:rPr>
                         <a:t>1</a:t>
                       </a:r>
@@ -6844,12 +6844,12 @@
                               <a:alpha val="100000"/>
                             </a:srgbClr>
                           </a:solidFill>
-                          <a:latin typeface="Arial"/>
-                          <a:cs typeface="Arial"/>
-                          <a:ea typeface="Arial"/>
-                          <a:sym typeface="Arial"/>
+                          <a:latin typeface="DejaVu Sans"/>
+                          <a:cs typeface="DejaVu Sans"/>
+                          <a:ea typeface="DejaVu Sans"/>
+                          <a:sym typeface="DejaVu Sans"/>
                         </a:rPr>
-                        <a:t>0.00540</a:t>
+                        <a:t>0.00539</a:t>
                       </a:r>
                     </a:p>
                   </a:txBody>
@@ -6889,7 +6889,7 @@
                   </a:tcPr>
                 </a:tc>
               </a:tr>
-              <a:tr h="362956">
+              <a:tr h="366435">
                 <a:tc>
                   <a:txBody>
                     <a:bodyPr/>
@@ -6914,10 +6914,10 @@
                               <a:alpha val="100000"/>
                             </a:srgbClr>
                           </a:solidFill>
-                          <a:latin typeface="Arial"/>
-                          <a:cs typeface="Arial"/>
-                          <a:ea typeface="Arial"/>
-                          <a:sym typeface="Arial"/>
+                          <a:latin typeface="DejaVu Sans"/>
+                          <a:cs typeface="DejaVu Sans"/>
+                          <a:ea typeface="DejaVu Sans"/>
+                          <a:sym typeface="DejaVu Sans"/>
                         </a:rPr>
                         <a:t>2018</a:t>
                       </a:r>
@@ -6982,10 +6982,10 @@
                               <a:alpha val="100000"/>
                             </a:srgbClr>
                           </a:solidFill>
-                          <a:latin typeface="Arial"/>
-                          <a:cs typeface="Arial"/>
-                          <a:ea typeface="Arial"/>
-                          <a:sym typeface="Arial"/>
+                          <a:latin typeface="DejaVu Sans"/>
+                          <a:cs typeface="DejaVu Sans"/>
+                          <a:ea typeface="DejaVu Sans"/>
+                          <a:sym typeface="DejaVu Sans"/>
                         </a:rPr>
                         <a:t>1</a:t>
                       </a:r>
@@ -7050,12 +7050,12 @@
                               <a:alpha val="100000"/>
                             </a:srgbClr>
                           </a:solidFill>
-                          <a:latin typeface="Arial"/>
-                          <a:cs typeface="Arial"/>
-                          <a:ea typeface="Arial"/>
-                          <a:sym typeface="Arial"/>
+                          <a:latin typeface="DejaVu Sans"/>
+                          <a:cs typeface="DejaVu Sans"/>
+                          <a:ea typeface="DejaVu Sans"/>
+                          <a:sym typeface="DejaVu Sans"/>
                         </a:rPr>
-                        <a:t>0.00538</a:t>
+                        <a:t>0.00539</a:t>
                       </a:r>
                     </a:p>
                   </a:txBody>
@@ -7095,7 +7095,7 @@
                   </a:tcPr>
                 </a:tc>
               </a:tr>
-              <a:tr h="362888">
+              <a:tr h="366435">
                 <a:tc>
                   <a:txBody>
                     <a:bodyPr/>
@@ -7120,10 +7120,10 @@
                               <a:alpha val="100000"/>
                             </a:srgbClr>
                           </a:solidFill>
-                          <a:latin typeface="Arial"/>
-                          <a:cs typeface="Arial"/>
-                          <a:ea typeface="Arial"/>
-                          <a:sym typeface="Arial"/>
+                          <a:latin typeface="DejaVu Sans"/>
+                          <a:cs typeface="DejaVu Sans"/>
+                          <a:ea typeface="DejaVu Sans"/>
+                          <a:sym typeface="DejaVu Sans"/>
                         </a:rPr>
                         <a:t>2019</a:t>
                       </a:r>
@@ -7188,10 +7188,10 @@
                               <a:alpha val="100000"/>
                             </a:srgbClr>
                           </a:solidFill>
-                          <a:latin typeface="Arial"/>
-                          <a:cs typeface="Arial"/>
-                          <a:ea typeface="Arial"/>
-                          <a:sym typeface="Arial"/>
+                          <a:latin typeface="DejaVu Sans"/>
+                          <a:cs typeface="DejaVu Sans"/>
+                          <a:ea typeface="DejaVu Sans"/>
+                          <a:sym typeface="DejaVu Sans"/>
                         </a:rPr>
                         <a:t>1</a:t>
                       </a:r>
@@ -7256,12 +7256,12 @@
                               <a:alpha val="100000"/>
                             </a:srgbClr>
                           </a:solidFill>
-                          <a:latin typeface="Arial"/>
-                          <a:cs typeface="Arial"/>
-                          <a:ea typeface="Arial"/>
-                          <a:sym typeface="Arial"/>
+                          <a:latin typeface="DejaVu Sans"/>
+                          <a:cs typeface="DejaVu Sans"/>
+                          <a:ea typeface="DejaVu Sans"/>
+                          <a:sym typeface="DejaVu Sans"/>
                         </a:rPr>
-                        <a:t>0.00546</a:t>
+                        <a:t>0.00545</a:t>
                       </a:r>
                     </a:p>
                   </a:txBody>
@@ -7301,7 +7301,7 @@
                   </a:tcPr>
                 </a:tc>
               </a:tr>
-              <a:tr h="362888">
+              <a:tr h="366435">
                 <a:tc>
                   <a:txBody>
                     <a:bodyPr/>
@@ -7326,10 +7326,10 @@
                               <a:alpha val="100000"/>
                             </a:srgbClr>
                           </a:solidFill>
-                          <a:latin typeface="Arial"/>
-                          <a:cs typeface="Arial"/>
-                          <a:ea typeface="Arial"/>
-                          <a:sym typeface="Arial"/>
+                          <a:latin typeface="DejaVu Sans"/>
+                          <a:cs typeface="DejaVu Sans"/>
+                          <a:ea typeface="DejaVu Sans"/>
+                          <a:sym typeface="DejaVu Sans"/>
                         </a:rPr>
                         <a:t>2020</a:t>
                       </a:r>
@@ -7394,10 +7394,10 @@
                               <a:alpha val="100000"/>
                             </a:srgbClr>
                           </a:solidFill>
-                          <a:latin typeface="Arial"/>
-                          <a:cs typeface="Arial"/>
-                          <a:ea typeface="Arial"/>
-                          <a:sym typeface="Arial"/>
+                          <a:latin typeface="DejaVu Sans"/>
+                          <a:cs typeface="DejaVu Sans"/>
+                          <a:ea typeface="DejaVu Sans"/>
+                          <a:sym typeface="DejaVu Sans"/>
                         </a:rPr>
                         <a:t>1</a:t>
                       </a:r>
@@ -7462,10 +7462,10 @@
                               <a:alpha val="100000"/>
                             </a:srgbClr>
                           </a:solidFill>
-                          <a:latin typeface="Arial"/>
-                          <a:cs typeface="Arial"/>
-                          <a:ea typeface="Arial"/>
-                          <a:sym typeface="Arial"/>
+                          <a:latin typeface="DejaVu Sans"/>
+                          <a:cs typeface="DejaVu Sans"/>
+                          <a:ea typeface="DejaVu Sans"/>
+                          <a:sym typeface="DejaVu Sans"/>
                         </a:rPr>
                         <a:t>0.00540</a:t>
                       </a:r>
@@ -7507,7 +7507,7 @@
                   </a:tcPr>
                 </a:tc>
               </a:tr>
-              <a:tr h="362956">
+              <a:tr h="366435">
                 <a:tc>
                   <a:txBody>
                     <a:bodyPr/>
@@ -7532,10 +7532,10 @@
                               <a:alpha val="100000"/>
                             </a:srgbClr>
                           </a:solidFill>
-                          <a:latin typeface="Arial"/>
-                          <a:cs typeface="Arial"/>
-                          <a:ea typeface="Arial"/>
-                          <a:sym typeface="Arial"/>
+                          <a:latin typeface="DejaVu Sans"/>
+                          <a:cs typeface="DejaVu Sans"/>
+                          <a:ea typeface="DejaVu Sans"/>
+                          <a:sym typeface="DejaVu Sans"/>
                         </a:rPr>
                         <a:t>2017</a:t>
                       </a:r>
@@ -7600,10 +7600,10 @@
                               <a:alpha val="100000"/>
                             </a:srgbClr>
                           </a:solidFill>
-                          <a:latin typeface="Arial"/>
-                          <a:cs typeface="Arial"/>
-                          <a:ea typeface="Arial"/>
-                          <a:sym typeface="Arial"/>
+                          <a:latin typeface="DejaVu Sans"/>
+                          <a:cs typeface="DejaVu Sans"/>
+                          <a:ea typeface="DejaVu Sans"/>
+                          <a:sym typeface="DejaVu Sans"/>
                         </a:rPr>
                         <a:t>2</a:t>
                       </a:r>
@@ -7668,12 +7668,12 @@
                               <a:alpha val="100000"/>
                             </a:srgbClr>
                           </a:solidFill>
-                          <a:latin typeface="Arial"/>
-                          <a:cs typeface="Arial"/>
-                          <a:ea typeface="Arial"/>
-                          <a:sym typeface="Arial"/>
+                          <a:latin typeface="DejaVu Sans"/>
+                          <a:cs typeface="DejaVu Sans"/>
+                          <a:ea typeface="DejaVu Sans"/>
+                          <a:sym typeface="DejaVu Sans"/>
                         </a:rPr>
-                        <a:t>0.00553</a:t>
+                        <a:t>0.00546</a:t>
                       </a:r>
                     </a:p>
                   </a:txBody>
@@ -7713,7 +7713,7 @@
                   </a:tcPr>
                 </a:tc>
               </a:tr>
-              <a:tr h="362888">
+              <a:tr h="366435">
                 <a:tc>
                   <a:txBody>
                     <a:bodyPr/>
@@ -7738,10 +7738,10 @@
                               <a:alpha val="100000"/>
                             </a:srgbClr>
                           </a:solidFill>
-                          <a:latin typeface="Arial"/>
-                          <a:cs typeface="Arial"/>
-                          <a:ea typeface="Arial"/>
-                          <a:sym typeface="Arial"/>
+                          <a:latin typeface="DejaVu Sans"/>
+                          <a:cs typeface="DejaVu Sans"/>
+                          <a:ea typeface="DejaVu Sans"/>
+                          <a:sym typeface="DejaVu Sans"/>
                         </a:rPr>
                         <a:t>2018</a:t>
                       </a:r>
@@ -7806,10 +7806,10 @@
                               <a:alpha val="100000"/>
                             </a:srgbClr>
                           </a:solidFill>
-                          <a:latin typeface="Arial"/>
-                          <a:cs typeface="Arial"/>
-                          <a:ea typeface="Arial"/>
-                          <a:sym typeface="Arial"/>
+                          <a:latin typeface="DejaVu Sans"/>
+                          <a:cs typeface="DejaVu Sans"/>
+                          <a:ea typeface="DejaVu Sans"/>
+                          <a:sym typeface="DejaVu Sans"/>
                         </a:rPr>
                         <a:t>2</a:t>
                       </a:r>
@@ -7874,12 +7874,12 @@
                               <a:alpha val="100000"/>
                             </a:srgbClr>
                           </a:solidFill>
-                          <a:latin typeface="Arial"/>
-                          <a:cs typeface="Arial"/>
-                          <a:ea typeface="Arial"/>
-                          <a:sym typeface="Arial"/>
+                          <a:latin typeface="DejaVu Sans"/>
+                          <a:cs typeface="DejaVu Sans"/>
+                          <a:ea typeface="DejaVu Sans"/>
+                          <a:sym typeface="DejaVu Sans"/>
                         </a:rPr>
-                        <a:t>0.00550</a:t>
+                        <a:t>0.00546</a:t>
                       </a:r>
                     </a:p>
                   </a:txBody>
@@ -7919,7 +7919,7 @@
                   </a:tcPr>
                 </a:tc>
               </a:tr>
-              <a:tr h="362888">
+              <a:tr h="366435">
                 <a:tc>
                   <a:txBody>
                     <a:bodyPr/>
@@ -7944,10 +7944,10 @@
                               <a:alpha val="100000"/>
                             </a:srgbClr>
                           </a:solidFill>
-                          <a:latin typeface="Arial"/>
-                          <a:cs typeface="Arial"/>
-                          <a:ea typeface="Arial"/>
-                          <a:sym typeface="Arial"/>
+                          <a:latin typeface="DejaVu Sans"/>
+                          <a:cs typeface="DejaVu Sans"/>
+                          <a:ea typeface="DejaVu Sans"/>
+                          <a:sym typeface="DejaVu Sans"/>
                         </a:rPr>
                         <a:t>2019</a:t>
                       </a:r>
@@ -8012,10 +8012,10 @@
                               <a:alpha val="100000"/>
                             </a:srgbClr>
                           </a:solidFill>
-                          <a:latin typeface="Arial"/>
-                          <a:cs typeface="Arial"/>
-                          <a:ea typeface="Arial"/>
-                          <a:sym typeface="Arial"/>
+                          <a:latin typeface="DejaVu Sans"/>
+                          <a:cs typeface="DejaVu Sans"/>
+                          <a:ea typeface="DejaVu Sans"/>
+                          <a:sym typeface="DejaVu Sans"/>
                         </a:rPr>
                         <a:t>2</a:t>
                       </a:r>
@@ -8080,12 +8080,12 @@
                               <a:alpha val="100000"/>
                             </a:srgbClr>
                           </a:solidFill>
-                          <a:latin typeface="Arial"/>
-                          <a:cs typeface="Arial"/>
-                          <a:ea typeface="Arial"/>
-                          <a:sym typeface="Arial"/>
+                          <a:latin typeface="DejaVu Sans"/>
+                          <a:cs typeface="DejaVu Sans"/>
+                          <a:ea typeface="DejaVu Sans"/>
+                          <a:sym typeface="DejaVu Sans"/>
                         </a:rPr>
-                        <a:t>0.00559</a:t>
+                        <a:t>0.00553</a:t>
                       </a:r>
                     </a:p>
                   </a:txBody>
@@ -8125,7 +8125,7 @@
                   </a:tcPr>
                 </a:tc>
               </a:tr>
-              <a:tr h="362956">
+              <a:tr h="366435">
                 <a:tc>
                   <a:txBody>
                     <a:bodyPr/>
@@ -8150,10 +8150,10 @@
                               <a:alpha val="100000"/>
                             </a:srgbClr>
                           </a:solidFill>
-                          <a:latin typeface="Arial"/>
-                          <a:cs typeface="Arial"/>
-                          <a:ea typeface="Arial"/>
-                          <a:sym typeface="Arial"/>
+                          <a:latin typeface="DejaVu Sans"/>
+                          <a:cs typeface="DejaVu Sans"/>
+                          <a:ea typeface="DejaVu Sans"/>
+                          <a:sym typeface="DejaVu Sans"/>
                         </a:rPr>
                         <a:t>2020</a:t>
                       </a:r>
@@ -8218,10 +8218,10 @@
                               <a:alpha val="100000"/>
                             </a:srgbClr>
                           </a:solidFill>
-                          <a:latin typeface="Arial"/>
-                          <a:cs typeface="Arial"/>
-                          <a:ea typeface="Arial"/>
-                          <a:sym typeface="Arial"/>
+                          <a:latin typeface="DejaVu Sans"/>
+                          <a:cs typeface="DejaVu Sans"/>
+                          <a:ea typeface="DejaVu Sans"/>
+                          <a:sym typeface="DejaVu Sans"/>
                         </a:rPr>
                         <a:t>2</a:t>
                       </a:r>
@@ -8286,12 +8286,12 @@
                               <a:alpha val="100000"/>
                             </a:srgbClr>
                           </a:solidFill>
-                          <a:latin typeface="Arial"/>
-                          <a:cs typeface="Arial"/>
-                          <a:ea typeface="Arial"/>
-                          <a:sym typeface="Arial"/>
+                          <a:latin typeface="DejaVu Sans"/>
+                          <a:cs typeface="DejaVu Sans"/>
+                          <a:ea typeface="DejaVu Sans"/>
+                          <a:sym typeface="DejaVu Sans"/>
                         </a:rPr>
-                        <a:t>0.00553</a:t>
+                        <a:t>0.00547</a:t>
                       </a:r>
                     </a:p>
                   </a:txBody>
@@ -8331,7 +8331,7 @@
                   </a:tcPr>
                 </a:tc>
               </a:tr>
-              <a:tr h="362956">
+              <a:tr h="366435">
                 <a:tc>
                   <a:txBody>
                     <a:bodyPr/>
@@ -8356,10 +8356,10 @@
                               <a:alpha val="100000"/>
                             </a:srgbClr>
                           </a:solidFill>
-                          <a:latin typeface="Arial"/>
-                          <a:cs typeface="Arial"/>
-                          <a:ea typeface="Arial"/>
-                          <a:sym typeface="Arial"/>
+                          <a:latin typeface="DejaVu Sans"/>
+                          <a:cs typeface="DejaVu Sans"/>
+                          <a:ea typeface="DejaVu Sans"/>
+                          <a:sym typeface="DejaVu Sans"/>
                         </a:rPr>
                         <a:t>2017</a:t>
                       </a:r>
@@ -8424,10 +8424,10 @@
                               <a:alpha val="100000"/>
                             </a:srgbClr>
                           </a:solidFill>
-                          <a:latin typeface="Arial"/>
-                          <a:cs typeface="Arial"/>
-                          <a:ea typeface="Arial"/>
-                          <a:sym typeface="Arial"/>
+                          <a:latin typeface="DejaVu Sans"/>
+                          <a:cs typeface="DejaVu Sans"/>
+                          <a:ea typeface="DejaVu Sans"/>
+                          <a:sym typeface="DejaVu Sans"/>
                         </a:rPr>
                         <a:t>3</a:t>
                       </a:r>
@@ -8492,12 +8492,12 @@
                               <a:alpha val="100000"/>
                             </a:srgbClr>
                           </a:solidFill>
-                          <a:latin typeface="Arial"/>
-                          <a:cs typeface="Arial"/>
-                          <a:ea typeface="Arial"/>
-                          <a:sym typeface="Arial"/>
+                          <a:latin typeface="DejaVu Sans"/>
+                          <a:cs typeface="DejaVu Sans"/>
+                          <a:ea typeface="DejaVu Sans"/>
+                          <a:sym typeface="DejaVu Sans"/>
                         </a:rPr>
-                        <a:t>0.00516</a:t>
+                        <a:t>0.00513</a:t>
                       </a:r>
                     </a:p>
                   </a:txBody>
@@ -8537,7 +8537,7 @@
                   </a:tcPr>
                 </a:tc>
               </a:tr>
-              <a:tr h="362956">
+              <a:tr h="366435">
                 <a:tc>
                   <a:txBody>
                     <a:bodyPr/>
@@ -8562,10 +8562,10 @@
                               <a:alpha val="100000"/>
                             </a:srgbClr>
                           </a:solidFill>
-                          <a:latin typeface="Arial"/>
-                          <a:cs typeface="Arial"/>
-                          <a:ea typeface="Arial"/>
-                          <a:sym typeface="Arial"/>
+                          <a:latin typeface="DejaVu Sans"/>
+                          <a:cs typeface="DejaVu Sans"/>
+                          <a:ea typeface="DejaVu Sans"/>
+                          <a:sym typeface="DejaVu Sans"/>
                         </a:rPr>
                         <a:t>2018</a:t>
                       </a:r>
@@ -8630,10 +8630,10 @@
                               <a:alpha val="100000"/>
                             </a:srgbClr>
                           </a:solidFill>
-                          <a:latin typeface="Arial"/>
-                          <a:cs typeface="Arial"/>
-                          <a:ea typeface="Arial"/>
-                          <a:sym typeface="Arial"/>
+                          <a:latin typeface="DejaVu Sans"/>
+                          <a:cs typeface="DejaVu Sans"/>
+                          <a:ea typeface="DejaVu Sans"/>
+                          <a:sym typeface="DejaVu Sans"/>
                         </a:rPr>
                         <a:t>3</a:t>
                       </a:r>
@@ -8698,12 +8698,12 @@
                               <a:alpha val="100000"/>
                             </a:srgbClr>
                           </a:solidFill>
-                          <a:latin typeface="Arial"/>
-                          <a:cs typeface="Arial"/>
-                          <a:ea typeface="Arial"/>
-                          <a:sym typeface="Arial"/>
+                          <a:latin typeface="DejaVu Sans"/>
+                          <a:cs typeface="DejaVu Sans"/>
+                          <a:ea typeface="DejaVu Sans"/>
+                          <a:sym typeface="DejaVu Sans"/>
                         </a:rPr>
-                        <a:t>0.00514</a:t>
+                        <a:t>0.00513</a:t>
                       </a:r>
                     </a:p>
                   </a:txBody>
@@ -8743,7 +8743,7 @@
                   </a:tcPr>
                 </a:tc>
               </a:tr>
-              <a:tr h="362956">
+              <a:tr h="366435">
                 <a:tc>
                   <a:txBody>
                     <a:bodyPr/>
@@ -8768,10 +8768,10 @@
                               <a:alpha val="100000"/>
                             </a:srgbClr>
                           </a:solidFill>
-                          <a:latin typeface="Arial"/>
-                          <a:cs typeface="Arial"/>
-                          <a:ea typeface="Arial"/>
-                          <a:sym typeface="Arial"/>
+                          <a:latin typeface="DejaVu Sans"/>
+                          <a:cs typeface="DejaVu Sans"/>
+                          <a:ea typeface="DejaVu Sans"/>
+                          <a:sym typeface="DejaVu Sans"/>
                         </a:rPr>
                         <a:t>2019</a:t>
                       </a:r>
@@ -8836,10 +8836,10 @@
                               <a:alpha val="100000"/>
                             </a:srgbClr>
                           </a:solidFill>
-                          <a:latin typeface="Arial"/>
-                          <a:cs typeface="Arial"/>
-                          <a:ea typeface="Arial"/>
-                          <a:sym typeface="Arial"/>
+                          <a:latin typeface="DejaVu Sans"/>
+                          <a:cs typeface="DejaVu Sans"/>
+                          <a:ea typeface="DejaVu Sans"/>
+                          <a:sym typeface="DejaVu Sans"/>
                         </a:rPr>
                         <a:t>3</a:t>
                       </a:r>
@@ -8904,12 +8904,12 @@
                               <a:alpha val="100000"/>
                             </a:srgbClr>
                           </a:solidFill>
-                          <a:latin typeface="Arial"/>
-                          <a:cs typeface="Arial"/>
-                          <a:ea typeface="Arial"/>
-                          <a:sym typeface="Arial"/>
+                          <a:latin typeface="DejaVu Sans"/>
+                          <a:cs typeface="DejaVu Sans"/>
+                          <a:ea typeface="DejaVu Sans"/>
+                          <a:sym typeface="DejaVu Sans"/>
                         </a:rPr>
-                        <a:t>0.00521</a:t>
+                        <a:t>0.00519</a:t>
                       </a:r>
                     </a:p>
                   </a:txBody>
@@ -8949,7 +8949,7 @@
                   </a:tcPr>
                 </a:tc>
               </a:tr>
-              <a:tr h="362956">
+              <a:tr h="366435">
                 <a:tc>
                   <a:txBody>
                     <a:bodyPr/>
@@ -8974,10 +8974,10 @@
                               <a:alpha val="100000"/>
                             </a:srgbClr>
                           </a:solidFill>
-                          <a:latin typeface="Arial"/>
-                          <a:cs typeface="Arial"/>
-                          <a:ea typeface="Arial"/>
-                          <a:sym typeface="Arial"/>
+                          <a:latin typeface="DejaVu Sans"/>
+                          <a:cs typeface="DejaVu Sans"/>
+                          <a:ea typeface="DejaVu Sans"/>
+                          <a:sym typeface="DejaVu Sans"/>
                         </a:rPr>
                         <a:t>2020</a:t>
                       </a:r>
@@ -9042,10 +9042,10 @@
                               <a:alpha val="100000"/>
                             </a:srgbClr>
                           </a:solidFill>
-                          <a:latin typeface="Arial"/>
-                          <a:cs typeface="Arial"/>
-                          <a:ea typeface="Arial"/>
-                          <a:sym typeface="Arial"/>
+                          <a:latin typeface="DejaVu Sans"/>
+                          <a:cs typeface="DejaVu Sans"/>
+                          <a:ea typeface="DejaVu Sans"/>
+                          <a:sym typeface="DejaVu Sans"/>
                         </a:rPr>
                         <a:t>3</a:t>
                       </a:r>
@@ -9110,12 +9110,12 @@
                               <a:alpha val="100000"/>
                             </a:srgbClr>
                           </a:solidFill>
-                          <a:latin typeface="Arial"/>
-                          <a:cs typeface="Arial"/>
-                          <a:ea typeface="Arial"/>
-                          <a:sym typeface="Arial"/>
+                          <a:latin typeface="DejaVu Sans"/>
+                          <a:cs typeface="DejaVu Sans"/>
+                          <a:ea typeface="DejaVu Sans"/>
+                          <a:sym typeface="DejaVu Sans"/>
                         </a:rPr>
-                        <a:t>0.00516</a:t>
+                        <a:t>0.00514</a:t>
                       </a:r>
                     </a:p>
                   </a:txBody>
@@ -9201,11 +9201,11 @@
             <a:tbl>
               <a:tblPr/>
               <a:tblGrid>
-                <a:gridCol w="591023"/>
-                <a:gridCol w="980506"/>
-                <a:gridCol w="1260080"/>
+                <a:gridCol w="616299"/>
+                <a:gridCol w="970088"/>
+                <a:gridCol w="1248843"/>
               </a:tblGrid>
-              <a:tr h="402011">
+              <a:tr h="409825">
                 <a:tc>
                   <a:txBody>
                     <a:bodyPr/>
@@ -9230,10 +9230,10 @@
                               <a:alpha val="100000"/>
                             </a:srgbClr>
                           </a:solidFill>
-                          <a:latin typeface="Arial"/>
-                          <a:cs typeface="Arial"/>
-                          <a:ea typeface="Arial"/>
-                          <a:sym typeface="Arial"/>
+                          <a:latin typeface="DejaVu Sans"/>
+                          <a:cs typeface="DejaVu Sans"/>
+                          <a:ea typeface="DejaVu Sans"/>
+                          <a:sym typeface="DejaVu Sans"/>
                         </a:rPr>
                         <a:t>AÑO</a:t>
                       </a:r>
@@ -9298,10 +9298,10 @@
                               <a:alpha val="100000"/>
                             </a:srgbClr>
                           </a:solidFill>
-                          <a:latin typeface="Arial"/>
-                          <a:cs typeface="Arial"/>
-                          <a:ea typeface="Arial"/>
-                          <a:sym typeface="Arial"/>
+                          <a:latin typeface="DejaVu Sans"/>
+                          <a:cs typeface="DejaVu Sans"/>
+                          <a:ea typeface="DejaVu Sans"/>
+                          <a:sym typeface="DejaVu Sans"/>
                         </a:rPr>
                         <a:t>ESTRATO</a:t>
                       </a:r>
@@ -9366,10 +9366,10 @@
                               <a:alpha val="100000"/>
                             </a:srgbClr>
                           </a:solidFill>
-                          <a:latin typeface="Arial"/>
-                          <a:cs typeface="Arial"/>
-                          <a:ea typeface="Arial"/>
-                          <a:sym typeface="Arial"/>
+                          <a:latin typeface="DejaVu Sans"/>
+                          <a:cs typeface="DejaVu Sans"/>
+                          <a:ea typeface="DejaVu Sans"/>
+                          <a:sym typeface="DejaVu Sans"/>
                         </a:rPr>
                         <a:t>TASA_RENTA</a:t>
                       </a:r>
@@ -9411,7 +9411,7 @@
                   </a:tcPr>
                 </a:tc>
               </a:tr>
-              <a:tr h="362888">
+              <a:tr h="366435">
                 <a:tc>
                   <a:txBody>
                     <a:bodyPr/>
@@ -9436,10 +9436,10 @@
                               <a:alpha val="100000"/>
                             </a:srgbClr>
                           </a:solidFill>
-                          <a:latin typeface="Arial"/>
-                          <a:cs typeface="Arial"/>
-                          <a:ea typeface="Arial"/>
-                          <a:sym typeface="Arial"/>
+                          <a:latin typeface="DejaVu Sans"/>
+                          <a:cs typeface="DejaVu Sans"/>
+                          <a:ea typeface="DejaVu Sans"/>
+                          <a:sym typeface="DejaVu Sans"/>
                         </a:rPr>
                         <a:t>2017</a:t>
                       </a:r>
@@ -9504,10 +9504,10 @@
                               <a:alpha val="100000"/>
                             </a:srgbClr>
                           </a:solidFill>
-                          <a:latin typeface="Arial"/>
-                          <a:cs typeface="Arial"/>
-                          <a:ea typeface="Arial"/>
-                          <a:sym typeface="Arial"/>
+                          <a:latin typeface="DejaVu Sans"/>
+                          <a:cs typeface="DejaVu Sans"/>
+                          <a:ea typeface="DejaVu Sans"/>
+                          <a:sym typeface="DejaVu Sans"/>
                         </a:rPr>
                         <a:t>4</a:t>
                       </a:r>
@@ -9572,12 +9572,12 @@
                               <a:alpha val="100000"/>
                             </a:srgbClr>
                           </a:solidFill>
-                          <a:latin typeface="Arial"/>
-                          <a:cs typeface="Arial"/>
-                          <a:ea typeface="Arial"/>
-                          <a:sym typeface="Arial"/>
+                          <a:latin typeface="DejaVu Sans"/>
+                          <a:cs typeface="DejaVu Sans"/>
+                          <a:ea typeface="DejaVu Sans"/>
+                          <a:sym typeface="DejaVu Sans"/>
                         </a:rPr>
-                        <a:t>0.00491</a:t>
+                        <a:t>0.00490</a:t>
                       </a:r>
                     </a:p>
                   </a:txBody>
@@ -9617,7 +9617,7 @@
                   </a:tcPr>
                 </a:tc>
               </a:tr>
-              <a:tr h="362888">
+              <a:tr h="366435">
                 <a:tc>
                   <a:txBody>
                     <a:bodyPr/>
@@ -9642,10 +9642,10 @@
                               <a:alpha val="100000"/>
                             </a:srgbClr>
                           </a:solidFill>
-                          <a:latin typeface="Arial"/>
-                          <a:cs typeface="Arial"/>
-                          <a:ea typeface="Arial"/>
-                          <a:sym typeface="Arial"/>
+                          <a:latin typeface="DejaVu Sans"/>
+                          <a:cs typeface="DejaVu Sans"/>
+                          <a:ea typeface="DejaVu Sans"/>
+                          <a:sym typeface="DejaVu Sans"/>
                         </a:rPr>
                         <a:t>2018</a:t>
                       </a:r>
@@ -9710,10 +9710,10 @@
                               <a:alpha val="100000"/>
                             </a:srgbClr>
                           </a:solidFill>
-                          <a:latin typeface="Arial"/>
-                          <a:cs typeface="Arial"/>
-                          <a:ea typeface="Arial"/>
-                          <a:sym typeface="Arial"/>
+                          <a:latin typeface="DejaVu Sans"/>
+                          <a:cs typeface="DejaVu Sans"/>
+                          <a:ea typeface="DejaVu Sans"/>
+                          <a:sym typeface="DejaVu Sans"/>
                         </a:rPr>
                         <a:t>4</a:t>
                       </a:r>
@@ -9778,10 +9778,10 @@
                               <a:alpha val="100000"/>
                             </a:srgbClr>
                           </a:solidFill>
-                          <a:latin typeface="Arial"/>
-                          <a:cs typeface="Arial"/>
-                          <a:ea typeface="Arial"/>
-                          <a:sym typeface="Arial"/>
+                          <a:latin typeface="DejaVu Sans"/>
+                          <a:cs typeface="DejaVu Sans"/>
+                          <a:ea typeface="DejaVu Sans"/>
+                          <a:sym typeface="DejaVu Sans"/>
                         </a:rPr>
                         <a:t>0.00489</a:t>
                       </a:r>
@@ -9823,7 +9823,7 @@
                   </a:tcPr>
                 </a:tc>
               </a:tr>
-              <a:tr h="362888">
+              <a:tr h="366435">
                 <a:tc>
                   <a:txBody>
                     <a:bodyPr/>
@@ -9848,10 +9848,10 @@
                               <a:alpha val="100000"/>
                             </a:srgbClr>
                           </a:solidFill>
-                          <a:latin typeface="Arial"/>
-                          <a:cs typeface="Arial"/>
-                          <a:ea typeface="Arial"/>
-                          <a:sym typeface="Arial"/>
+                          <a:latin typeface="DejaVu Sans"/>
+                          <a:cs typeface="DejaVu Sans"/>
+                          <a:ea typeface="DejaVu Sans"/>
+                          <a:sym typeface="DejaVu Sans"/>
                         </a:rPr>
                         <a:t>2019</a:t>
                       </a:r>
@@ -9916,10 +9916,10 @@
                               <a:alpha val="100000"/>
                             </a:srgbClr>
                           </a:solidFill>
-                          <a:latin typeface="Arial"/>
-                          <a:cs typeface="Arial"/>
-                          <a:ea typeface="Arial"/>
-                          <a:sym typeface="Arial"/>
+                          <a:latin typeface="DejaVu Sans"/>
+                          <a:cs typeface="DejaVu Sans"/>
+                          <a:ea typeface="DejaVu Sans"/>
+                          <a:sym typeface="DejaVu Sans"/>
                         </a:rPr>
                         <a:t>4</a:t>
                       </a:r>
@@ -9984,12 +9984,12 @@
                               <a:alpha val="100000"/>
                             </a:srgbClr>
                           </a:solidFill>
-                          <a:latin typeface="Arial"/>
-                          <a:cs typeface="Arial"/>
-                          <a:ea typeface="Arial"/>
-                          <a:sym typeface="Arial"/>
+                          <a:latin typeface="DejaVu Sans"/>
+                          <a:cs typeface="DejaVu Sans"/>
+                          <a:ea typeface="DejaVu Sans"/>
+                          <a:sym typeface="DejaVu Sans"/>
                         </a:rPr>
-                        <a:t>0.00496</a:t>
+                        <a:t>0.00495</a:t>
                       </a:r>
                     </a:p>
                   </a:txBody>
@@ -10029,7 +10029,7 @@
                   </a:tcPr>
                 </a:tc>
               </a:tr>
-              <a:tr h="362888">
+              <a:tr h="366435">
                 <a:tc>
                   <a:txBody>
                     <a:bodyPr/>
@@ -10054,10 +10054,10 @@
                               <a:alpha val="100000"/>
                             </a:srgbClr>
                           </a:solidFill>
-                          <a:latin typeface="Arial"/>
-                          <a:cs typeface="Arial"/>
-                          <a:ea typeface="Arial"/>
-                          <a:sym typeface="Arial"/>
+                          <a:latin typeface="DejaVu Sans"/>
+                          <a:cs typeface="DejaVu Sans"/>
+                          <a:ea typeface="DejaVu Sans"/>
+                          <a:sym typeface="DejaVu Sans"/>
                         </a:rPr>
                         <a:t>2020</a:t>
                       </a:r>
@@ -10122,10 +10122,10 @@
                               <a:alpha val="100000"/>
                             </a:srgbClr>
                           </a:solidFill>
-                          <a:latin typeface="Arial"/>
-                          <a:cs typeface="Arial"/>
-                          <a:ea typeface="Arial"/>
-                          <a:sym typeface="Arial"/>
+                          <a:latin typeface="DejaVu Sans"/>
+                          <a:cs typeface="DejaVu Sans"/>
+                          <a:ea typeface="DejaVu Sans"/>
+                          <a:sym typeface="DejaVu Sans"/>
                         </a:rPr>
                         <a:t>4</a:t>
                       </a:r>
@@ -10190,12 +10190,12 @@
                               <a:alpha val="100000"/>
                             </a:srgbClr>
                           </a:solidFill>
-                          <a:latin typeface="Arial"/>
-                          <a:cs typeface="Arial"/>
-                          <a:ea typeface="Arial"/>
-                          <a:sym typeface="Arial"/>
+                          <a:latin typeface="DejaVu Sans"/>
+                          <a:cs typeface="DejaVu Sans"/>
+                          <a:ea typeface="DejaVu Sans"/>
+                          <a:sym typeface="DejaVu Sans"/>
                         </a:rPr>
-                        <a:t>0.00491</a:t>
+                        <a:t>0.00490</a:t>
                       </a:r>
                     </a:p>
                   </a:txBody>
@@ -10235,7 +10235,7 @@
                   </a:tcPr>
                 </a:tc>
               </a:tr>
-              <a:tr h="362956">
+              <a:tr h="366435">
                 <a:tc>
                   <a:txBody>
                     <a:bodyPr/>
@@ -10260,10 +10260,10 @@
                               <a:alpha val="100000"/>
                             </a:srgbClr>
                           </a:solidFill>
-                          <a:latin typeface="Arial"/>
-                          <a:cs typeface="Arial"/>
-                          <a:ea typeface="Arial"/>
-                          <a:sym typeface="Arial"/>
+                          <a:latin typeface="DejaVu Sans"/>
+                          <a:cs typeface="DejaVu Sans"/>
+                          <a:ea typeface="DejaVu Sans"/>
+                          <a:sym typeface="DejaVu Sans"/>
                         </a:rPr>
                         <a:t>2017</a:t>
                       </a:r>
@@ -10328,10 +10328,10 @@
                               <a:alpha val="100000"/>
                             </a:srgbClr>
                           </a:solidFill>
-                          <a:latin typeface="Arial"/>
-                          <a:cs typeface="Arial"/>
-                          <a:ea typeface="Arial"/>
-                          <a:sym typeface="Arial"/>
+                          <a:latin typeface="DejaVu Sans"/>
+                          <a:cs typeface="DejaVu Sans"/>
+                          <a:ea typeface="DejaVu Sans"/>
+                          <a:sym typeface="DejaVu Sans"/>
                         </a:rPr>
                         <a:t>5</a:t>
                       </a:r>
@@ -10396,12 +10396,12 @@
                               <a:alpha val="100000"/>
                             </a:srgbClr>
                           </a:solidFill>
-                          <a:latin typeface="Arial"/>
-                          <a:cs typeface="Arial"/>
-                          <a:ea typeface="Arial"/>
-                          <a:sym typeface="Arial"/>
+                          <a:latin typeface="DejaVu Sans"/>
+                          <a:cs typeface="DejaVu Sans"/>
+                          <a:ea typeface="DejaVu Sans"/>
+                          <a:sym typeface="DejaVu Sans"/>
                         </a:rPr>
-                        <a:t>0.00483</a:t>
+                        <a:t>0.00485</a:t>
                       </a:r>
                     </a:p>
                   </a:txBody>
@@ -10441,7 +10441,7 @@
                   </a:tcPr>
                 </a:tc>
               </a:tr>
-              <a:tr h="362888">
+              <a:tr h="366435">
                 <a:tc>
                   <a:txBody>
                     <a:bodyPr/>
@@ -10466,10 +10466,10 @@
                               <a:alpha val="100000"/>
                             </a:srgbClr>
                           </a:solidFill>
-                          <a:latin typeface="Arial"/>
-                          <a:cs typeface="Arial"/>
-                          <a:ea typeface="Arial"/>
-                          <a:sym typeface="Arial"/>
+                          <a:latin typeface="DejaVu Sans"/>
+                          <a:cs typeface="DejaVu Sans"/>
+                          <a:ea typeface="DejaVu Sans"/>
+                          <a:sym typeface="DejaVu Sans"/>
                         </a:rPr>
                         <a:t>2018</a:t>
                       </a:r>
@@ -10534,10 +10534,10 @@
                               <a:alpha val="100000"/>
                             </a:srgbClr>
                           </a:solidFill>
-                          <a:latin typeface="Arial"/>
-                          <a:cs typeface="Arial"/>
-                          <a:ea typeface="Arial"/>
-                          <a:sym typeface="Arial"/>
+                          <a:latin typeface="DejaVu Sans"/>
+                          <a:cs typeface="DejaVu Sans"/>
+                          <a:ea typeface="DejaVu Sans"/>
+                          <a:sym typeface="DejaVu Sans"/>
                         </a:rPr>
                         <a:t>5</a:t>
                       </a:r>
@@ -10602,12 +10602,12 @@
                               <a:alpha val="100000"/>
                             </a:srgbClr>
                           </a:solidFill>
-                          <a:latin typeface="Arial"/>
-                          <a:cs typeface="Arial"/>
-                          <a:ea typeface="Arial"/>
-                          <a:sym typeface="Arial"/>
+                          <a:latin typeface="DejaVu Sans"/>
+                          <a:cs typeface="DejaVu Sans"/>
+                          <a:ea typeface="DejaVu Sans"/>
+                          <a:sym typeface="DejaVu Sans"/>
                         </a:rPr>
-                        <a:t>0.00482</a:t>
+                        <a:t>0.00485</a:t>
                       </a:r>
                     </a:p>
                   </a:txBody>
@@ -10647,7 +10647,7 @@
                   </a:tcPr>
                 </a:tc>
               </a:tr>
-              <a:tr h="362888">
+              <a:tr h="366435">
                 <a:tc>
                   <a:txBody>
                     <a:bodyPr/>
@@ -10672,10 +10672,10 @@
                               <a:alpha val="100000"/>
                             </a:srgbClr>
                           </a:solidFill>
-                          <a:latin typeface="Arial"/>
-                          <a:cs typeface="Arial"/>
-                          <a:ea typeface="Arial"/>
-                          <a:sym typeface="Arial"/>
+                          <a:latin typeface="DejaVu Sans"/>
+                          <a:cs typeface="DejaVu Sans"/>
+                          <a:ea typeface="DejaVu Sans"/>
+                          <a:sym typeface="DejaVu Sans"/>
                         </a:rPr>
                         <a:t>2019</a:t>
                       </a:r>
@@ -10740,10 +10740,10 @@
                               <a:alpha val="100000"/>
                             </a:srgbClr>
                           </a:solidFill>
-                          <a:latin typeface="Arial"/>
-                          <a:cs typeface="Arial"/>
-                          <a:ea typeface="Arial"/>
-                          <a:sym typeface="Arial"/>
+                          <a:latin typeface="DejaVu Sans"/>
+                          <a:cs typeface="DejaVu Sans"/>
+                          <a:ea typeface="DejaVu Sans"/>
+                          <a:sym typeface="DejaVu Sans"/>
                         </a:rPr>
                         <a:t>5</a:t>
                       </a:r>
@@ -10808,12 +10808,12 @@
                               <a:alpha val="100000"/>
                             </a:srgbClr>
                           </a:solidFill>
-                          <a:latin typeface="Arial"/>
-                          <a:cs typeface="Arial"/>
-                          <a:ea typeface="Arial"/>
-                          <a:sym typeface="Arial"/>
+                          <a:latin typeface="DejaVu Sans"/>
+                          <a:cs typeface="DejaVu Sans"/>
+                          <a:ea typeface="DejaVu Sans"/>
+                          <a:sym typeface="DejaVu Sans"/>
                         </a:rPr>
-                        <a:t>0.00488</a:t>
+                        <a:t>0.00490</a:t>
                       </a:r>
                     </a:p>
                   </a:txBody>
@@ -10853,7 +10853,7 @@
                   </a:tcPr>
                 </a:tc>
               </a:tr>
-              <a:tr h="362956">
+              <a:tr h="366435">
                 <a:tc>
                   <a:txBody>
                     <a:bodyPr/>
@@ -10878,10 +10878,10 @@
                               <a:alpha val="100000"/>
                             </a:srgbClr>
                           </a:solidFill>
-                          <a:latin typeface="Arial"/>
-                          <a:cs typeface="Arial"/>
-                          <a:ea typeface="Arial"/>
-                          <a:sym typeface="Arial"/>
+                          <a:latin typeface="DejaVu Sans"/>
+                          <a:cs typeface="DejaVu Sans"/>
+                          <a:ea typeface="DejaVu Sans"/>
+                          <a:sym typeface="DejaVu Sans"/>
                         </a:rPr>
                         <a:t>2020</a:t>
                       </a:r>
@@ -10946,10 +10946,10 @@
                               <a:alpha val="100000"/>
                             </a:srgbClr>
                           </a:solidFill>
-                          <a:latin typeface="Arial"/>
-                          <a:cs typeface="Arial"/>
-                          <a:ea typeface="Arial"/>
-                          <a:sym typeface="Arial"/>
+                          <a:latin typeface="DejaVu Sans"/>
+                          <a:cs typeface="DejaVu Sans"/>
+                          <a:ea typeface="DejaVu Sans"/>
+                          <a:sym typeface="DejaVu Sans"/>
                         </a:rPr>
                         <a:t>5</a:t>
                       </a:r>
@@ -11014,12 +11014,12 @@
                               <a:alpha val="100000"/>
                             </a:srgbClr>
                           </a:solidFill>
-                          <a:latin typeface="Arial"/>
-                          <a:cs typeface="Arial"/>
-                          <a:ea typeface="Arial"/>
-                          <a:sym typeface="Arial"/>
+                          <a:latin typeface="DejaVu Sans"/>
+                          <a:cs typeface="DejaVu Sans"/>
+                          <a:ea typeface="DejaVu Sans"/>
+                          <a:sym typeface="DejaVu Sans"/>
                         </a:rPr>
-                        <a:t>0.00483</a:t>
+                        <a:t>0.00485</a:t>
                       </a:r>
                     </a:p>
                   </a:txBody>
@@ -11059,7 +11059,7 @@
                   </a:tcPr>
                 </a:tc>
               </a:tr>
-              <a:tr h="362888">
+              <a:tr h="366435">
                 <a:tc>
                   <a:txBody>
                     <a:bodyPr/>
@@ -11084,10 +11084,10 @@
                               <a:alpha val="100000"/>
                             </a:srgbClr>
                           </a:solidFill>
-                          <a:latin typeface="Arial"/>
-                          <a:cs typeface="Arial"/>
-                          <a:ea typeface="Arial"/>
-                          <a:sym typeface="Arial"/>
+                          <a:latin typeface="DejaVu Sans"/>
+                          <a:cs typeface="DejaVu Sans"/>
+                          <a:ea typeface="DejaVu Sans"/>
+                          <a:sym typeface="DejaVu Sans"/>
                         </a:rPr>
                         <a:t>2017</a:t>
                       </a:r>
@@ -11152,10 +11152,10 @@
                               <a:alpha val="100000"/>
                             </a:srgbClr>
                           </a:solidFill>
-                          <a:latin typeface="Arial"/>
-                          <a:cs typeface="Arial"/>
-                          <a:ea typeface="Arial"/>
-                          <a:sym typeface="Arial"/>
+                          <a:latin typeface="DejaVu Sans"/>
+                          <a:cs typeface="DejaVu Sans"/>
+                          <a:ea typeface="DejaVu Sans"/>
+                          <a:sym typeface="DejaVu Sans"/>
                         </a:rPr>
                         <a:t>6</a:t>
                       </a:r>
@@ -11220,10 +11220,10 @@
                               <a:alpha val="100000"/>
                             </a:srgbClr>
                           </a:solidFill>
-                          <a:latin typeface="Arial"/>
-                          <a:cs typeface="Arial"/>
-                          <a:ea typeface="Arial"/>
-                          <a:sym typeface="Arial"/>
+                          <a:latin typeface="DejaVu Sans"/>
+                          <a:cs typeface="DejaVu Sans"/>
+                          <a:ea typeface="DejaVu Sans"/>
+                          <a:sym typeface="DejaVu Sans"/>
                         </a:rPr>
                         <a:t>0.00459</a:t>
                       </a:r>
@@ -11265,7 +11265,7 @@
                   </a:tcPr>
                 </a:tc>
               </a:tr>
-              <a:tr h="362888">
+              <a:tr h="366435">
                 <a:tc>
                   <a:txBody>
                     <a:bodyPr/>
@@ -11290,10 +11290,10 @@
                               <a:alpha val="100000"/>
                             </a:srgbClr>
                           </a:solidFill>
-                          <a:latin typeface="Arial"/>
-                          <a:cs typeface="Arial"/>
-                          <a:ea typeface="Arial"/>
-                          <a:sym typeface="Arial"/>
+                          <a:latin typeface="DejaVu Sans"/>
+                          <a:cs typeface="DejaVu Sans"/>
+                          <a:ea typeface="DejaVu Sans"/>
+                          <a:sym typeface="DejaVu Sans"/>
                         </a:rPr>
                         <a:t>2018</a:t>
                       </a:r>
@@ -11358,10 +11358,10 @@
                               <a:alpha val="100000"/>
                             </a:srgbClr>
                           </a:solidFill>
-                          <a:latin typeface="Arial"/>
-                          <a:cs typeface="Arial"/>
-                          <a:ea typeface="Arial"/>
-                          <a:sym typeface="Arial"/>
+                          <a:latin typeface="DejaVu Sans"/>
+                          <a:cs typeface="DejaVu Sans"/>
+                          <a:ea typeface="DejaVu Sans"/>
+                          <a:sym typeface="DejaVu Sans"/>
                         </a:rPr>
                         <a:t>6</a:t>
                       </a:r>
@@ -11426,12 +11426,12 @@
                               <a:alpha val="100000"/>
                             </a:srgbClr>
                           </a:solidFill>
-                          <a:latin typeface="Arial"/>
-                          <a:cs typeface="Arial"/>
-                          <a:ea typeface="Arial"/>
-                          <a:sym typeface="Arial"/>
+                          <a:latin typeface="DejaVu Sans"/>
+                          <a:cs typeface="DejaVu Sans"/>
+                          <a:ea typeface="DejaVu Sans"/>
+                          <a:sym typeface="DejaVu Sans"/>
                         </a:rPr>
-                        <a:t>0.00457</a:t>
+                        <a:t>0.00459</a:t>
                       </a:r>
                     </a:p>
                   </a:txBody>
@@ -11471,7 +11471,7 @@
                   </a:tcPr>
                 </a:tc>
               </a:tr>
-              <a:tr h="362956">
+              <a:tr h="366435">
                 <a:tc>
                   <a:txBody>
                     <a:bodyPr/>
@@ -11496,10 +11496,10 @@
                               <a:alpha val="100000"/>
                             </a:srgbClr>
                           </a:solidFill>
-                          <a:latin typeface="Arial"/>
-                          <a:cs typeface="Arial"/>
-                          <a:ea typeface="Arial"/>
-                          <a:sym typeface="Arial"/>
+                          <a:latin typeface="DejaVu Sans"/>
+                          <a:cs typeface="DejaVu Sans"/>
+                          <a:ea typeface="DejaVu Sans"/>
+                          <a:sym typeface="DejaVu Sans"/>
                         </a:rPr>
                         <a:t>2019</a:t>
                       </a:r>
@@ -11564,10 +11564,10 @@
                               <a:alpha val="100000"/>
                             </a:srgbClr>
                           </a:solidFill>
-                          <a:latin typeface="Arial"/>
-                          <a:cs typeface="Arial"/>
-                          <a:ea typeface="Arial"/>
-                          <a:sym typeface="Arial"/>
+                          <a:latin typeface="DejaVu Sans"/>
+                          <a:cs typeface="DejaVu Sans"/>
+                          <a:ea typeface="DejaVu Sans"/>
+                          <a:sym typeface="DejaVu Sans"/>
                         </a:rPr>
                         <a:t>6</a:t>
                       </a:r>
@@ -11632,12 +11632,12 @@
                               <a:alpha val="100000"/>
                             </a:srgbClr>
                           </a:solidFill>
-                          <a:latin typeface="Arial"/>
-                          <a:cs typeface="Arial"/>
-                          <a:ea typeface="Arial"/>
-                          <a:sym typeface="Arial"/>
+                          <a:latin typeface="DejaVu Sans"/>
+                          <a:cs typeface="DejaVu Sans"/>
+                          <a:ea typeface="DejaVu Sans"/>
+                          <a:sym typeface="DejaVu Sans"/>
                         </a:rPr>
-                        <a:t>0.00463</a:t>
+                        <a:t>0.00464</a:t>
                       </a:r>
                     </a:p>
                   </a:txBody>
@@ -11677,7 +11677,7 @@
                   </a:tcPr>
                 </a:tc>
               </a:tr>
-              <a:tr h="362888">
+              <a:tr h="366435">
                 <a:tc>
                   <a:txBody>
                     <a:bodyPr/>
@@ -11702,10 +11702,10 @@
                               <a:alpha val="100000"/>
                             </a:srgbClr>
                           </a:solidFill>
-                          <a:latin typeface="Arial"/>
-                          <a:cs typeface="Arial"/>
-                          <a:ea typeface="Arial"/>
-                          <a:sym typeface="Arial"/>
+                          <a:latin typeface="DejaVu Sans"/>
+                          <a:cs typeface="DejaVu Sans"/>
+                          <a:ea typeface="DejaVu Sans"/>
+                          <a:sym typeface="DejaVu Sans"/>
                         </a:rPr>
                         <a:t>2020</a:t>
                       </a:r>
@@ -11770,10 +11770,10 @@
                               <a:alpha val="100000"/>
                             </a:srgbClr>
                           </a:solidFill>
-                          <a:latin typeface="Arial"/>
-                          <a:cs typeface="Arial"/>
-                          <a:ea typeface="Arial"/>
-                          <a:sym typeface="Arial"/>
+                          <a:latin typeface="DejaVu Sans"/>
+                          <a:cs typeface="DejaVu Sans"/>
+                          <a:ea typeface="DejaVu Sans"/>
+                          <a:sym typeface="DejaVu Sans"/>
                         </a:rPr>
                         <a:t>6</a:t>
                       </a:r>
@@ -11838,12 +11838,12 @@
                               <a:alpha val="100000"/>
                             </a:srgbClr>
                           </a:solidFill>
-                          <a:latin typeface="Arial"/>
-                          <a:cs typeface="Arial"/>
-                          <a:ea typeface="Arial"/>
-                          <a:sym typeface="Arial"/>
+                          <a:latin typeface="DejaVu Sans"/>
+                          <a:cs typeface="DejaVu Sans"/>
+                          <a:ea typeface="DejaVu Sans"/>
+                          <a:sym typeface="DejaVu Sans"/>
                         </a:rPr>
-                        <a:t>0.00459</a:t>
+                        <a:t>0.00460</a:t>
                       </a:r>
                     </a:p>
                   </a:txBody>
@@ -12681,11 +12681,11 @@
             <a:tbl>
               <a:tblPr/>
               <a:tblGrid>
-                <a:gridCol w="571551"/>
-                <a:gridCol w="920528"/>
-                <a:gridCol w="1176804"/>
+                <a:gridCol w="616299"/>
+                <a:gridCol w="910979"/>
+                <a:gridCol w="1166504"/>
               </a:tblGrid>
-              <a:tr h="390241">
+              <a:tr h="397404">
                 <a:tc>
                   <a:txBody>
                     <a:bodyPr/>
@@ -12710,10 +12710,10 @@
                               <a:alpha val="100000"/>
                             </a:srgbClr>
                           </a:solidFill>
-                          <a:latin typeface="Arial"/>
-                          <a:cs typeface="Arial"/>
-                          <a:ea typeface="Arial"/>
-                          <a:sym typeface="Arial"/>
+                          <a:latin typeface="DejaVu Sans"/>
+                          <a:cs typeface="DejaVu Sans"/>
+                          <a:ea typeface="DejaVu Sans"/>
+                          <a:sym typeface="DejaVu Sans"/>
                         </a:rPr>
                         <a:t>AÑO</a:t>
                       </a:r>
@@ -12778,10 +12778,10 @@
                               <a:alpha val="100000"/>
                             </a:srgbClr>
                           </a:solidFill>
-                          <a:latin typeface="Arial"/>
-                          <a:cs typeface="Arial"/>
-                          <a:ea typeface="Arial"/>
-                          <a:sym typeface="Arial"/>
+                          <a:latin typeface="DejaVu Sans"/>
+                          <a:cs typeface="DejaVu Sans"/>
+                          <a:ea typeface="DejaVu Sans"/>
+                          <a:sym typeface="DejaVu Sans"/>
                         </a:rPr>
                         <a:t>ESTRATO</a:t>
                       </a:r>
@@ -12846,10 +12846,10 @@
                               <a:alpha val="100000"/>
                             </a:srgbClr>
                           </a:solidFill>
-                          <a:latin typeface="Arial"/>
-                          <a:cs typeface="Arial"/>
-                          <a:ea typeface="Arial"/>
-                          <a:sym typeface="Arial"/>
+                          <a:latin typeface="DejaVu Sans"/>
+                          <a:cs typeface="DejaVu Sans"/>
+                          <a:ea typeface="DejaVu Sans"/>
+                          <a:sym typeface="DejaVu Sans"/>
                         </a:rPr>
                         <a:t>TASA_RENTA</a:t>
                       </a:r>
@@ -12891,7 +12891,7 @@
                   </a:tcPr>
                 </a:tc>
               </a:tr>
-              <a:tr h="362888">
+              <a:tr h="366435">
                 <a:tc>
                   <a:txBody>
                     <a:bodyPr/>
@@ -12916,10 +12916,10 @@
                               <a:alpha val="100000"/>
                             </a:srgbClr>
                           </a:solidFill>
-                          <a:latin typeface="Arial"/>
-                          <a:cs typeface="Arial"/>
-                          <a:ea typeface="Arial"/>
-                          <a:sym typeface="Arial"/>
+                          <a:latin typeface="DejaVu Sans"/>
+                          <a:cs typeface="DejaVu Sans"/>
+                          <a:ea typeface="DejaVu Sans"/>
+                          <a:sym typeface="DejaVu Sans"/>
                         </a:rPr>
                         <a:t>2017</a:t>
                       </a:r>
@@ -12984,10 +12984,10 @@
                               <a:alpha val="100000"/>
                             </a:srgbClr>
                           </a:solidFill>
-                          <a:latin typeface="Arial"/>
-                          <a:cs typeface="Arial"/>
-                          <a:ea typeface="Arial"/>
-                          <a:sym typeface="Arial"/>
+                          <a:latin typeface="DejaVu Sans"/>
+                          <a:cs typeface="DejaVu Sans"/>
+                          <a:ea typeface="DejaVu Sans"/>
+                          <a:sym typeface="DejaVu Sans"/>
                         </a:rPr>
                         <a:t>1</a:t>
                       </a:r>
@@ -13052,10 +13052,10 @@
                               <a:alpha val="100000"/>
                             </a:srgbClr>
                           </a:solidFill>
-                          <a:latin typeface="Arial"/>
-                          <a:cs typeface="Arial"/>
-                          <a:ea typeface="Arial"/>
-                          <a:sym typeface="Arial"/>
+                          <a:latin typeface="DejaVu Sans"/>
+                          <a:cs typeface="DejaVu Sans"/>
+                          <a:ea typeface="DejaVu Sans"/>
+                          <a:sym typeface="DejaVu Sans"/>
                         </a:rPr>
                         <a:t>0.00590</a:t>
                       </a:r>
@@ -13097,7 +13097,7 @@
                   </a:tcPr>
                 </a:tc>
               </a:tr>
-              <a:tr h="362888">
+              <a:tr h="366435">
                 <a:tc>
                   <a:txBody>
                     <a:bodyPr/>
@@ -13122,10 +13122,10 @@
                               <a:alpha val="100000"/>
                             </a:srgbClr>
                           </a:solidFill>
-                          <a:latin typeface="Arial"/>
-                          <a:cs typeface="Arial"/>
-                          <a:ea typeface="Arial"/>
-                          <a:sym typeface="Arial"/>
+                          <a:latin typeface="DejaVu Sans"/>
+                          <a:cs typeface="DejaVu Sans"/>
+                          <a:ea typeface="DejaVu Sans"/>
+                          <a:sym typeface="DejaVu Sans"/>
                         </a:rPr>
                         <a:t>2018</a:t>
                       </a:r>
@@ -13190,10 +13190,10 @@
                               <a:alpha val="100000"/>
                             </a:srgbClr>
                           </a:solidFill>
-                          <a:latin typeface="Arial"/>
-                          <a:cs typeface="Arial"/>
-                          <a:ea typeface="Arial"/>
-                          <a:sym typeface="Arial"/>
+                          <a:latin typeface="DejaVu Sans"/>
+                          <a:cs typeface="DejaVu Sans"/>
+                          <a:ea typeface="DejaVu Sans"/>
+                          <a:sym typeface="DejaVu Sans"/>
                         </a:rPr>
                         <a:t>1</a:t>
                       </a:r>
@@ -13258,12 +13258,12 @@
                               <a:alpha val="100000"/>
                             </a:srgbClr>
                           </a:solidFill>
-                          <a:latin typeface="Arial"/>
-                          <a:cs typeface="Arial"/>
-                          <a:ea typeface="Arial"/>
-                          <a:sym typeface="Arial"/>
+                          <a:latin typeface="DejaVu Sans"/>
+                          <a:cs typeface="DejaVu Sans"/>
+                          <a:ea typeface="DejaVu Sans"/>
+                          <a:sym typeface="DejaVu Sans"/>
                         </a:rPr>
-                        <a:t>0.00580</a:t>
+                        <a:t>0.00581</a:t>
                       </a:r>
                     </a:p>
                   </a:txBody>
@@ -13303,7 +13303,7 @@
                   </a:tcPr>
                 </a:tc>
               </a:tr>
-              <a:tr h="362888">
+              <a:tr h="366435">
                 <a:tc>
                   <a:txBody>
                     <a:bodyPr/>
@@ -13328,10 +13328,10 @@
                               <a:alpha val="100000"/>
                             </a:srgbClr>
                           </a:solidFill>
-                          <a:latin typeface="Arial"/>
-                          <a:cs typeface="Arial"/>
-                          <a:ea typeface="Arial"/>
-                          <a:sym typeface="Arial"/>
+                          <a:latin typeface="DejaVu Sans"/>
+                          <a:cs typeface="DejaVu Sans"/>
+                          <a:ea typeface="DejaVu Sans"/>
+                          <a:sym typeface="DejaVu Sans"/>
                         </a:rPr>
                         <a:t>2019</a:t>
                       </a:r>
@@ -13396,10 +13396,10 @@
                               <a:alpha val="100000"/>
                             </a:srgbClr>
                           </a:solidFill>
-                          <a:latin typeface="Arial"/>
-                          <a:cs typeface="Arial"/>
-                          <a:ea typeface="Arial"/>
-                          <a:sym typeface="Arial"/>
+                          <a:latin typeface="DejaVu Sans"/>
+                          <a:cs typeface="DejaVu Sans"/>
+                          <a:ea typeface="DejaVu Sans"/>
+                          <a:sym typeface="DejaVu Sans"/>
                         </a:rPr>
                         <a:t>1</a:t>
                       </a:r>
@@ -13464,10 +13464,10 @@
                               <a:alpha val="100000"/>
                             </a:srgbClr>
                           </a:solidFill>
-                          <a:latin typeface="Arial"/>
-                          <a:cs typeface="Arial"/>
-                          <a:ea typeface="Arial"/>
-                          <a:sym typeface="Arial"/>
+                          <a:latin typeface="DejaVu Sans"/>
+                          <a:cs typeface="DejaVu Sans"/>
+                          <a:ea typeface="DejaVu Sans"/>
+                          <a:sym typeface="DejaVu Sans"/>
                         </a:rPr>
                         <a:t>0.00597</a:t>
                       </a:r>
@@ -13509,7 +13509,7 @@
                   </a:tcPr>
                 </a:tc>
               </a:tr>
-              <a:tr h="362888">
+              <a:tr h="366435">
                 <a:tc>
                   <a:txBody>
                     <a:bodyPr/>
@@ -13534,10 +13534,10 @@
                               <a:alpha val="100000"/>
                             </a:srgbClr>
                           </a:solidFill>
-                          <a:latin typeface="Arial"/>
-                          <a:cs typeface="Arial"/>
-                          <a:ea typeface="Arial"/>
-                          <a:sym typeface="Arial"/>
+                          <a:latin typeface="DejaVu Sans"/>
+                          <a:cs typeface="DejaVu Sans"/>
+                          <a:ea typeface="DejaVu Sans"/>
+                          <a:sym typeface="DejaVu Sans"/>
                         </a:rPr>
                         <a:t>2020</a:t>
                       </a:r>
@@ -13602,10 +13602,10 @@
                               <a:alpha val="100000"/>
                             </a:srgbClr>
                           </a:solidFill>
-                          <a:latin typeface="Arial"/>
-                          <a:cs typeface="Arial"/>
-                          <a:ea typeface="Arial"/>
-                          <a:sym typeface="Arial"/>
+                          <a:latin typeface="DejaVu Sans"/>
+                          <a:cs typeface="DejaVu Sans"/>
+                          <a:ea typeface="DejaVu Sans"/>
+                          <a:sym typeface="DejaVu Sans"/>
                         </a:rPr>
                         <a:t>1</a:t>
                       </a:r>
@@ -13670,10 +13670,10 @@
                               <a:alpha val="100000"/>
                             </a:srgbClr>
                           </a:solidFill>
-                          <a:latin typeface="Arial"/>
-                          <a:cs typeface="Arial"/>
-                          <a:ea typeface="Arial"/>
-                          <a:sym typeface="Arial"/>
+                          <a:latin typeface="DejaVu Sans"/>
+                          <a:cs typeface="DejaVu Sans"/>
+                          <a:ea typeface="DejaVu Sans"/>
+                          <a:sym typeface="DejaVu Sans"/>
                         </a:rPr>
                         <a:t>0.00569</a:t>
                       </a:r>
@@ -13715,7 +13715,7 @@
                   </a:tcPr>
                 </a:tc>
               </a:tr>
-              <a:tr h="362956">
+              <a:tr h="366435">
                 <a:tc>
                   <a:txBody>
                     <a:bodyPr/>
@@ -13740,10 +13740,10 @@
                               <a:alpha val="100000"/>
                             </a:srgbClr>
                           </a:solidFill>
-                          <a:latin typeface="Arial"/>
-                          <a:cs typeface="Arial"/>
-                          <a:ea typeface="Arial"/>
-                          <a:sym typeface="Arial"/>
+                          <a:latin typeface="DejaVu Sans"/>
+                          <a:cs typeface="DejaVu Sans"/>
+                          <a:ea typeface="DejaVu Sans"/>
+                          <a:sym typeface="DejaVu Sans"/>
                         </a:rPr>
                         <a:t>2017</a:t>
                       </a:r>
@@ -13808,10 +13808,10 @@
                               <a:alpha val="100000"/>
                             </a:srgbClr>
                           </a:solidFill>
-                          <a:latin typeface="Arial"/>
-                          <a:cs typeface="Arial"/>
-                          <a:ea typeface="Arial"/>
-                          <a:sym typeface="Arial"/>
+                          <a:latin typeface="DejaVu Sans"/>
+                          <a:cs typeface="DejaVu Sans"/>
+                          <a:ea typeface="DejaVu Sans"/>
+                          <a:sym typeface="DejaVu Sans"/>
                         </a:rPr>
                         <a:t>2</a:t>
                       </a:r>
@@ -13876,10 +13876,10 @@
                               <a:alpha val="100000"/>
                             </a:srgbClr>
                           </a:solidFill>
-                          <a:latin typeface="Arial"/>
-                          <a:cs typeface="Arial"/>
-                          <a:ea typeface="Arial"/>
-                          <a:sym typeface="Arial"/>
+                          <a:latin typeface="DejaVu Sans"/>
+                          <a:cs typeface="DejaVu Sans"/>
+                          <a:ea typeface="DejaVu Sans"/>
+                          <a:sym typeface="DejaVu Sans"/>
                         </a:rPr>
                         <a:t>0.00532</a:t>
                       </a:r>
@@ -13921,7 +13921,7 @@
                   </a:tcPr>
                 </a:tc>
               </a:tr>
-              <a:tr h="362888">
+              <a:tr h="366435">
                 <a:tc>
                   <a:txBody>
                     <a:bodyPr/>
@@ -13946,10 +13946,10 @@
                               <a:alpha val="100000"/>
                             </a:srgbClr>
                           </a:solidFill>
-                          <a:latin typeface="Arial"/>
-                          <a:cs typeface="Arial"/>
-                          <a:ea typeface="Arial"/>
-                          <a:sym typeface="Arial"/>
+                          <a:latin typeface="DejaVu Sans"/>
+                          <a:cs typeface="DejaVu Sans"/>
+                          <a:ea typeface="DejaVu Sans"/>
+                          <a:sym typeface="DejaVu Sans"/>
                         </a:rPr>
                         <a:t>2018</a:t>
                       </a:r>
@@ -14014,10 +14014,10 @@
                               <a:alpha val="100000"/>
                             </a:srgbClr>
                           </a:solidFill>
-                          <a:latin typeface="Arial"/>
-                          <a:cs typeface="Arial"/>
-                          <a:ea typeface="Arial"/>
-                          <a:sym typeface="Arial"/>
+                          <a:latin typeface="DejaVu Sans"/>
+                          <a:cs typeface="DejaVu Sans"/>
+                          <a:ea typeface="DejaVu Sans"/>
+                          <a:sym typeface="DejaVu Sans"/>
                         </a:rPr>
                         <a:t>2</a:t>
                       </a:r>
@@ -14082,10 +14082,10 @@
                               <a:alpha val="100000"/>
                             </a:srgbClr>
                           </a:solidFill>
-                          <a:latin typeface="Arial"/>
-                          <a:cs typeface="Arial"/>
-                          <a:ea typeface="Arial"/>
-                          <a:sym typeface="Arial"/>
+                          <a:latin typeface="DejaVu Sans"/>
+                          <a:cs typeface="DejaVu Sans"/>
+                          <a:ea typeface="DejaVu Sans"/>
+                          <a:sym typeface="DejaVu Sans"/>
                         </a:rPr>
                         <a:t>0.00524</a:t>
                       </a:r>
@@ -14127,7 +14127,7 @@
                   </a:tcPr>
                 </a:tc>
               </a:tr>
-              <a:tr h="362956">
+              <a:tr h="366435">
                 <a:tc>
                   <a:txBody>
                     <a:bodyPr/>
@@ -14152,10 +14152,10 @@
                               <a:alpha val="100000"/>
                             </a:srgbClr>
                           </a:solidFill>
-                          <a:latin typeface="Arial"/>
-                          <a:cs typeface="Arial"/>
-                          <a:ea typeface="Arial"/>
-                          <a:sym typeface="Arial"/>
+                          <a:latin typeface="DejaVu Sans"/>
+                          <a:cs typeface="DejaVu Sans"/>
+                          <a:ea typeface="DejaVu Sans"/>
+                          <a:sym typeface="DejaVu Sans"/>
                         </a:rPr>
                         <a:t>2019</a:t>
                       </a:r>
@@ -14220,10 +14220,10 @@
                               <a:alpha val="100000"/>
                             </a:srgbClr>
                           </a:solidFill>
-                          <a:latin typeface="Arial"/>
-                          <a:cs typeface="Arial"/>
-                          <a:ea typeface="Arial"/>
-                          <a:sym typeface="Arial"/>
+                          <a:latin typeface="DejaVu Sans"/>
+                          <a:cs typeface="DejaVu Sans"/>
+                          <a:ea typeface="DejaVu Sans"/>
+                          <a:sym typeface="DejaVu Sans"/>
                         </a:rPr>
                         <a:t>2</a:t>
                       </a:r>
@@ -14288,10 +14288,10 @@
                               <a:alpha val="100000"/>
                             </a:srgbClr>
                           </a:solidFill>
-                          <a:latin typeface="Arial"/>
-                          <a:cs typeface="Arial"/>
-                          <a:ea typeface="Arial"/>
-                          <a:sym typeface="Arial"/>
+                          <a:latin typeface="DejaVu Sans"/>
+                          <a:cs typeface="DejaVu Sans"/>
+                          <a:ea typeface="DejaVu Sans"/>
+                          <a:sym typeface="DejaVu Sans"/>
                         </a:rPr>
                         <a:t>0.00538</a:t>
                       </a:r>
@@ -14333,7 +14333,7 @@
                   </a:tcPr>
                 </a:tc>
               </a:tr>
-              <a:tr h="362888">
+              <a:tr h="366435">
                 <a:tc>
                   <a:txBody>
                     <a:bodyPr/>
@@ -14358,10 +14358,10 @@
                               <a:alpha val="100000"/>
                             </a:srgbClr>
                           </a:solidFill>
-                          <a:latin typeface="Arial"/>
-                          <a:cs typeface="Arial"/>
-                          <a:ea typeface="Arial"/>
-                          <a:sym typeface="Arial"/>
+                          <a:latin typeface="DejaVu Sans"/>
+                          <a:cs typeface="DejaVu Sans"/>
+                          <a:ea typeface="DejaVu Sans"/>
+                          <a:sym typeface="DejaVu Sans"/>
                         </a:rPr>
                         <a:t>2020</a:t>
                       </a:r>
@@ -14426,10 +14426,10 @@
                               <a:alpha val="100000"/>
                             </a:srgbClr>
                           </a:solidFill>
-                          <a:latin typeface="Arial"/>
-                          <a:cs typeface="Arial"/>
-                          <a:ea typeface="Arial"/>
-                          <a:sym typeface="Arial"/>
+                          <a:latin typeface="DejaVu Sans"/>
+                          <a:cs typeface="DejaVu Sans"/>
+                          <a:ea typeface="DejaVu Sans"/>
+                          <a:sym typeface="DejaVu Sans"/>
                         </a:rPr>
                         <a:t>2</a:t>
                       </a:r>
@@ -14494,10 +14494,10 @@
                               <a:alpha val="100000"/>
                             </a:srgbClr>
                           </a:solidFill>
-                          <a:latin typeface="Arial"/>
-                          <a:cs typeface="Arial"/>
-                          <a:ea typeface="Arial"/>
-                          <a:sym typeface="Arial"/>
+                          <a:latin typeface="DejaVu Sans"/>
+                          <a:cs typeface="DejaVu Sans"/>
+                          <a:ea typeface="DejaVu Sans"/>
+                          <a:sym typeface="DejaVu Sans"/>
                         </a:rPr>
                         <a:t>0.00515</a:t>
                       </a:r>
@@ -14539,7 +14539,7 @@
                   </a:tcPr>
                 </a:tc>
               </a:tr>
-              <a:tr h="362956">
+              <a:tr h="366435">
                 <a:tc>
                   <a:txBody>
                     <a:bodyPr/>
@@ -14564,10 +14564,10 @@
                               <a:alpha val="100000"/>
                             </a:srgbClr>
                           </a:solidFill>
-                          <a:latin typeface="Arial"/>
-                          <a:cs typeface="Arial"/>
-                          <a:ea typeface="Arial"/>
-                          <a:sym typeface="Arial"/>
+                          <a:latin typeface="DejaVu Sans"/>
+                          <a:cs typeface="DejaVu Sans"/>
+                          <a:ea typeface="DejaVu Sans"/>
+                          <a:sym typeface="DejaVu Sans"/>
                         </a:rPr>
                         <a:t>2017</a:t>
                       </a:r>
@@ -14632,10 +14632,10 @@
                               <a:alpha val="100000"/>
                             </a:srgbClr>
                           </a:solidFill>
-                          <a:latin typeface="Arial"/>
-                          <a:cs typeface="Arial"/>
-                          <a:ea typeface="Arial"/>
-                          <a:sym typeface="Arial"/>
+                          <a:latin typeface="DejaVu Sans"/>
+                          <a:cs typeface="DejaVu Sans"/>
+                          <a:ea typeface="DejaVu Sans"/>
+                          <a:sym typeface="DejaVu Sans"/>
                         </a:rPr>
                         <a:t>3</a:t>
                       </a:r>
@@ -14700,10 +14700,10 @@
                               <a:alpha val="100000"/>
                             </a:srgbClr>
                           </a:solidFill>
-                          <a:latin typeface="Arial"/>
-                          <a:cs typeface="Arial"/>
-                          <a:ea typeface="Arial"/>
-                          <a:sym typeface="Arial"/>
+                          <a:latin typeface="DejaVu Sans"/>
+                          <a:cs typeface="DejaVu Sans"/>
+                          <a:ea typeface="DejaVu Sans"/>
+                          <a:sym typeface="DejaVu Sans"/>
                         </a:rPr>
                         <a:t>0.00491</a:t>
                       </a:r>
@@ -14745,7 +14745,7 @@
                   </a:tcPr>
                 </a:tc>
               </a:tr>
-              <a:tr h="362956">
+              <a:tr h="366435">
                 <a:tc>
                   <a:txBody>
                     <a:bodyPr/>
@@ -14770,10 +14770,10 @@
                               <a:alpha val="100000"/>
                             </a:srgbClr>
                           </a:solidFill>
-                          <a:latin typeface="Arial"/>
-                          <a:cs typeface="Arial"/>
-                          <a:ea typeface="Arial"/>
-                          <a:sym typeface="Arial"/>
+                          <a:latin typeface="DejaVu Sans"/>
+                          <a:cs typeface="DejaVu Sans"/>
+                          <a:ea typeface="DejaVu Sans"/>
+                          <a:sym typeface="DejaVu Sans"/>
                         </a:rPr>
                         <a:t>2018</a:t>
                       </a:r>
@@ -14838,10 +14838,10 @@
                               <a:alpha val="100000"/>
                             </a:srgbClr>
                           </a:solidFill>
-                          <a:latin typeface="Arial"/>
-                          <a:cs typeface="Arial"/>
-                          <a:ea typeface="Arial"/>
-                          <a:sym typeface="Arial"/>
+                          <a:latin typeface="DejaVu Sans"/>
+                          <a:cs typeface="DejaVu Sans"/>
+                          <a:ea typeface="DejaVu Sans"/>
+                          <a:sym typeface="DejaVu Sans"/>
                         </a:rPr>
                         <a:t>3</a:t>
                       </a:r>
@@ -14906,10 +14906,10 @@
                               <a:alpha val="100000"/>
                             </a:srgbClr>
                           </a:solidFill>
-                          <a:latin typeface="Arial"/>
-                          <a:cs typeface="Arial"/>
-                          <a:ea typeface="Arial"/>
-                          <a:sym typeface="Arial"/>
+                          <a:latin typeface="DejaVu Sans"/>
+                          <a:cs typeface="DejaVu Sans"/>
+                          <a:ea typeface="DejaVu Sans"/>
+                          <a:sym typeface="DejaVu Sans"/>
                         </a:rPr>
                         <a:t>0.00484</a:t>
                       </a:r>
@@ -14951,7 +14951,7 @@
                   </a:tcPr>
                 </a:tc>
               </a:tr>
-              <a:tr h="362956">
+              <a:tr h="366435">
                 <a:tc>
                   <a:txBody>
                     <a:bodyPr/>
@@ -14976,10 +14976,10 @@
                               <a:alpha val="100000"/>
                             </a:srgbClr>
                           </a:solidFill>
-                          <a:latin typeface="Arial"/>
-                          <a:cs typeface="Arial"/>
-                          <a:ea typeface="Arial"/>
-                          <a:sym typeface="Arial"/>
+                          <a:latin typeface="DejaVu Sans"/>
+                          <a:cs typeface="DejaVu Sans"/>
+                          <a:ea typeface="DejaVu Sans"/>
+                          <a:sym typeface="DejaVu Sans"/>
                         </a:rPr>
                         <a:t>2019</a:t>
                       </a:r>
@@ -15044,10 +15044,10 @@
                               <a:alpha val="100000"/>
                             </a:srgbClr>
                           </a:solidFill>
-                          <a:latin typeface="Arial"/>
-                          <a:cs typeface="Arial"/>
-                          <a:ea typeface="Arial"/>
-                          <a:sym typeface="Arial"/>
+                          <a:latin typeface="DejaVu Sans"/>
+                          <a:cs typeface="DejaVu Sans"/>
+                          <a:ea typeface="DejaVu Sans"/>
+                          <a:sym typeface="DejaVu Sans"/>
                         </a:rPr>
                         <a:t>3</a:t>
                       </a:r>
@@ -15112,10 +15112,10 @@
                               <a:alpha val="100000"/>
                             </a:srgbClr>
                           </a:solidFill>
-                          <a:latin typeface="Arial"/>
-                          <a:cs typeface="Arial"/>
-                          <a:ea typeface="Arial"/>
-                          <a:sym typeface="Arial"/>
+                          <a:latin typeface="DejaVu Sans"/>
+                          <a:cs typeface="DejaVu Sans"/>
+                          <a:ea typeface="DejaVu Sans"/>
+                          <a:sym typeface="DejaVu Sans"/>
                         </a:rPr>
                         <a:t>0.00496</a:t>
                       </a:r>
@@ -15157,7 +15157,7 @@
                   </a:tcPr>
                 </a:tc>
               </a:tr>
-              <a:tr h="362956">
+              <a:tr h="366435">
                 <a:tc>
                   <a:txBody>
                     <a:bodyPr/>
@@ -15182,10 +15182,10 @@
                               <a:alpha val="100000"/>
                             </a:srgbClr>
                           </a:solidFill>
-                          <a:latin typeface="Arial"/>
-                          <a:cs typeface="Arial"/>
-                          <a:ea typeface="Arial"/>
-                          <a:sym typeface="Arial"/>
+                          <a:latin typeface="DejaVu Sans"/>
+                          <a:cs typeface="DejaVu Sans"/>
+                          <a:ea typeface="DejaVu Sans"/>
+                          <a:sym typeface="DejaVu Sans"/>
                         </a:rPr>
                         <a:t>2020</a:t>
                       </a:r>
@@ -15250,10 +15250,10 @@
                               <a:alpha val="100000"/>
                             </a:srgbClr>
                           </a:solidFill>
-                          <a:latin typeface="Arial"/>
-                          <a:cs typeface="Arial"/>
-                          <a:ea typeface="Arial"/>
-                          <a:sym typeface="Arial"/>
+                          <a:latin typeface="DejaVu Sans"/>
+                          <a:cs typeface="DejaVu Sans"/>
+                          <a:ea typeface="DejaVu Sans"/>
+                          <a:sym typeface="DejaVu Sans"/>
                         </a:rPr>
                         <a:t>3</a:t>
                       </a:r>
@@ -15318,10 +15318,10 @@
                               <a:alpha val="100000"/>
                             </a:srgbClr>
                           </a:solidFill>
-                          <a:latin typeface="Arial"/>
-                          <a:cs typeface="Arial"/>
-                          <a:ea typeface="Arial"/>
-                          <a:sym typeface="Arial"/>
+                          <a:latin typeface="DejaVu Sans"/>
+                          <a:cs typeface="DejaVu Sans"/>
+                          <a:ea typeface="DejaVu Sans"/>
+                          <a:sym typeface="DejaVu Sans"/>
                         </a:rPr>
                         <a:t>0.00476</a:t>
                       </a:r>
@@ -15409,11 +15409,11 @@
             <a:tbl>
               <a:tblPr/>
               <a:tblGrid>
-                <a:gridCol w="571551"/>
-                <a:gridCol w="920528"/>
-                <a:gridCol w="1176804"/>
+                <a:gridCol w="616299"/>
+                <a:gridCol w="910979"/>
+                <a:gridCol w="1166504"/>
               </a:tblGrid>
-              <a:tr h="390241">
+              <a:tr h="397404">
                 <a:tc>
                   <a:txBody>
                     <a:bodyPr/>
@@ -15438,10 +15438,10 @@
                               <a:alpha val="100000"/>
                             </a:srgbClr>
                           </a:solidFill>
-                          <a:latin typeface="Arial"/>
-                          <a:cs typeface="Arial"/>
-                          <a:ea typeface="Arial"/>
-                          <a:sym typeface="Arial"/>
+                          <a:latin typeface="DejaVu Sans"/>
+                          <a:cs typeface="DejaVu Sans"/>
+                          <a:ea typeface="DejaVu Sans"/>
+                          <a:sym typeface="DejaVu Sans"/>
                         </a:rPr>
                         <a:t>AÑO</a:t>
                       </a:r>
@@ -15506,10 +15506,10 @@
                               <a:alpha val="100000"/>
                             </a:srgbClr>
                           </a:solidFill>
-                          <a:latin typeface="Arial"/>
-                          <a:cs typeface="Arial"/>
-                          <a:ea typeface="Arial"/>
-                          <a:sym typeface="Arial"/>
+                          <a:latin typeface="DejaVu Sans"/>
+                          <a:cs typeface="DejaVu Sans"/>
+                          <a:ea typeface="DejaVu Sans"/>
+                          <a:sym typeface="DejaVu Sans"/>
                         </a:rPr>
                         <a:t>ESTRATO</a:t>
                       </a:r>
@@ -15574,10 +15574,10 @@
                               <a:alpha val="100000"/>
                             </a:srgbClr>
                           </a:solidFill>
-                          <a:latin typeface="Arial"/>
-                          <a:cs typeface="Arial"/>
-                          <a:ea typeface="Arial"/>
-                          <a:sym typeface="Arial"/>
+                          <a:latin typeface="DejaVu Sans"/>
+                          <a:cs typeface="DejaVu Sans"/>
+                          <a:ea typeface="DejaVu Sans"/>
+                          <a:sym typeface="DejaVu Sans"/>
                         </a:rPr>
                         <a:t>TASA_RENTA</a:t>
                       </a:r>
@@ -15619,7 +15619,7 @@
                   </a:tcPr>
                 </a:tc>
               </a:tr>
-              <a:tr h="362888">
+              <a:tr h="366435">
                 <a:tc>
                   <a:txBody>
                     <a:bodyPr/>
@@ -15644,10 +15644,10 @@
                               <a:alpha val="100000"/>
                             </a:srgbClr>
                           </a:solidFill>
-                          <a:latin typeface="Arial"/>
-                          <a:cs typeface="Arial"/>
-                          <a:ea typeface="Arial"/>
-                          <a:sym typeface="Arial"/>
+                          <a:latin typeface="DejaVu Sans"/>
+                          <a:cs typeface="DejaVu Sans"/>
+                          <a:ea typeface="DejaVu Sans"/>
+                          <a:sym typeface="DejaVu Sans"/>
                         </a:rPr>
                         <a:t>2017</a:t>
                       </a:r>
@@ -15712,10 +15712,10 @@
                               <a:alpha val="100000"/>
                             </a:srgbClr>
                           </a:solidFill>
-                          <a:latin typeface="Arial"/>
-                          <a:cs typeface="Arial"/>
-                          <a:ea typeface="Arial"/>
-                          <a:sym typeface="Arial"/>
+                          <a:latin typeface="DejaVu Sans"/>
+                          <a:cs typeface="DejaVu Sans"/>
+                          <a:ea typeface="DejaVu Sans"/>
+                          <a:sym typeface="DejaVu Sans"/>
                         </a:rPr>
                         <a:t>4</a:t>
                       </a:r>
@@ -15780,10 +15780,10 @@
                               <a:alpha val="100000"/>
                             </a:srgbClr>
                           </a:solidFill>
-                          <a:latin typeface="Arial"/>
-                          <a:cs typeface="Arial"/>
-                          <a:ea typeface="Arial"/>
-                          <a:sym typeface="Arial"/>
+                          <a:latin typeface="DejaVu Sans"/>
+                          <a:cs typeface="DejaVu Sans"/>
+                          <a:ea typeface="DejaVu Sans"/>
+                          <a:sym typeface="DejaVu Sans"/>
                         </a:rPr>
                         <a:t>0.00448</a:t>
                       </a:r>
@@ -15825,7 +15825,7 @@
                   </a:tcPr>
                 </a:tc>
               </a:tr>
-              <a:tr h="362888">
+              <a:tr h="366435">
                 <a:tc>
                   <a:txBody>
                     <a:bodyPr/>
@@ -15850,10 +15850,10 @@
                               <a:alpha val="100000"/>
                             </a:srgbClr>
                           </a:solidFill>
-                          <a:latin typeface="Arial"/>
-                          <a:cs typeface="Arial"/>
-                          <a:ea typeface="Arial"/>
-                          <a:sym typeface="Arial"/>
+                          <a:latin typeface="DejaVu Sans"/>
+                          <a:cs typeface="DejaVu Sans"/>
+                          <a:ea typeface="DejaVu Sans"/>
+                          <a:sym typeface="DejaVu Sans"/>
                         </a:rPr>
                         <a:t>2018</a:t>
                       </a:r>
@@ -15918,10 +15918,10 @@
                               <a:alpha val="100000"/>
                             </a:srgbClr>
                           </a:solidFill>
-                          <a:latin typeface="Arial"/>
-                          <a:cs typeface="Arial"/>
-                          <a:ea typeface="Arial"/>
-                          <a:sym typeface="Arial"/>
+                          <a:latin typeface="DejaVu Sans"/>
+                          <a:cs typeface="DejaVu Sans"/>
+                          <a:ea typeface="DejaVu Sans"/>
+                          <a:sym typeface="DejaVu Sans"/>
                         </a:rPr>
                         <a:t>4</a:t>
                       </a:r>
@@ -15986,10 +15986,10 @@
                               <a:alpha val="100000"/>
                             </a:srgbClr>
                           </a:solidFill>
-                          <a:latin typeface="Arial"/>
-                          <a:cs typeface="Arial"/>
-                          <a:ea typeface="Arial"/>
-                          <a:sym typeface="Arial"/>
+                          <a:latin typeface="DejaVu Sans"/>
+                          <a:cs typeface="DejaVu Sans"/>
+                          <a:ea typeface="DejaVu Sans"/>
+                          <a:sym typeface="DejaVu Sans"/>
                         </a:rPr>
                         <a:t>0.00442</a:t>
                       </a:r>
@@ -16031,7 +16031,7 @@
                   </a:tcPr>
                 </a:tc>
               </a:tr>
-              <a:tr h="362888">
+              <a:tr h="366435">
                 <a:tc>
                   <a:txBody>
                     <a:bodyPr/>
@@ -16056,10 +16056,10 @@
                               <a:alpha val="100000"/>
                             </a:srgbClr>
                           </a:solidFill>
-                          <a:latin typeface="Arial"/>
-                          <a:cs typeface="Arial"/>
-                          <a:ea typeface="Arial"/>
-                          <a:sym typeface="Arial"/>
+                          <a:latin typeface="DejaVu Sans"/>
+                          <a:cs typeface="DejaVu Sans"/>
+                          <a:ea typeface="DejaVu Sans"/>
+                          <a:sym typeface="DejaVu Sans"/>
                         </a:rPr>
                         <a:t>2019</a:t>
                       </a:r>
@@ -16124,10 +16124,10 @@
                               <a:alpha val="100000"/>
                             </a:srgbClr>
                           </a:solidFill>
-                          <a:latin typeface="Arial"/>
-                          <a:cs typeface="Arial"/>
-                          <a:ea typeface="Arial"/>
-                          <a:sym typeface="Arial"/>
+                          <a:latin typeface="DejaVu Sans"/>
+                          <a:cs typeface="DejaVu Sans"/>
+                          <a:ea typeface="DejaVu Sans"/>
+                          <a:sym typeface="DejaVu Sans"/>
                         </a:rPr>
                         <a:t>4</a:t>
                       </a:r>
@@ -16192,10 +16192,10 @@
                               <a:alpha val="100000"/>
                             </a:srgbClr>
                           </a:solidFill>
-                          <a:latin typeface="Arial"/>
-                          <a:cs typeface="Arial"/>
-                          <a:ea typeface="Arial"/>
-                          <a:sym typeface="Arial"/>
+                          <a:latin typeface="DejaVu Sans"/>
+                          <a:cs typeface="DejaVu Sans"/>
+                          <a:ea typeface="DejaVu Sans"/>
+                          <a:sym typeface="DejaVu Sans"/>
                         </a:rPr>
                         <a:t>0.00452</a:t>
                       </a:r>
@@ -16237,7 +16237,7 @@
                   </a:tcPr>
                 </a:tc>
               </a:tr>
-              <a:tr h="362956">
+              <a:tr h="366435">
                 <a:tc>
                   <a:txBody>
                     <a:bodyPr/>
@@ -16262,10 +16262,10 @@
                               <a:alpha val="100000"/>
                             </a:srgbClr>
                           </a:solidFill>
-                          <a:latin typeface="Arial"/>
-                          <a:cs typeface="Arial"/>
-                          <a:ea typeface="Arial"/>
-                          <a:sym typeface="Arial"/>
+                          <a:latin typeface="DejaVu Sans"/>
+                          <a:cs typeface="DejaVu Sans"/>
+                          <a:ea typeface="DejaVu Sans"/>
+                          <a:sym typeface="DejaVu Sans"/>
                         </a:rPr>
                         <a:t>2020</a:t>
                       </a:r>
@@ -16330,10 +16330,10 @@
                               <a:alpha val="100000"/>
                             </a:srgbClr>
                           </a:solidFill>
-                          <a:latin typeface="Arial"/>
-                          <a:cs typeface="Arial"/>
-                          <a:ea typeface="Arial"/>
-                          <a:sym typeface="Arial"/>
+                          <a:latin typeface="DejaVu Sans"/>
+                          <a:cs typeface="DejaVu Sans"/>
+                          <a:ea typeface="DejaVu Sans"/>
+                          <a:sym typeface="DejaVu Sans"/>
                         </a:rPr>
                         <a:t>4</a:t>
                       </a:r>
@@ -16398,10 +16398,10 @@
                               <a:alpha val="100000"/>
                             </a:srgbClr>
                           </a:solidFill>
-                          <a:latin typeface="Arial"/>
-                          <a:cs typeface="Arial"/>
-                          <a:ea typeface="Arial"/>
-                          <a:sym typeface="Arial"/>
+                          <a:latin typeface="DejaVu Sans"/>
+                          <a:cs typeface="DejaVu Sans"/>
+                          <a:ea typeface="DejaVu Sans"/>
+                          <a:sym typeface="DejaVu Sans"/>
                         </a:rPr>
                         <a:t>0.00435</a:t>
                       </a:r>
@@ -16443,7 +16443,7 @@
                   </a:tcPr>
                 </a:tc>
               </a:tr>
-              <a:tr h="362956">
+              <a:tr h="366435">
                 <a:tc>
                   <a:txBody>
                     <a:bodyPr/>
@@ -16468,10 +16468,10 @@
                               <a:alpha val="100000"/>
                             </a:srgbClr>
                           </a:solidFill>
-                          <a:latin typeface="Arial"/>
-                          <a:cs typeface="Arial"/>
-                          <a:ea typeface="Arial"/>
-                          <a:sym typeface="Arial"/>
+                          <a:latin typeface="DejaVu Sans"/>
+                          <a:cs typeface="DejaVu Sans"/>
+                          <a:ea typeface="DejaVu Sans"/>
+                          <a:sym typeface="DejaVu Sans"/>
                         </a:rPr>
                         <a:t>2017</a:t>
                       </a:r>
@@ -16536,10 +16536,10 @@
                               <a:alpha val="100000"/>
                             </a:srgbClr>
                           </a:solidFill>
-                          <a:latin typeface="Arial"/>
-                          <a:cs typeface="Arial"/>
-                          <a:ea typeface="Arial"/>
-                          <a:sym typeface="Arial"/>
+                          <a:latin typeface="DejaVu Sans"/>
+                          <a:cs typeface="DejaVu Sans"/>
+                          <a:ea typeface="DejaVu Sans"/>
+                          <a:sym typeface="DejaVu Sans"/>
                         </a:rPr>
                         <a:t>5</a:t>
                       </a:r>
@@ -16604,10 +16604,10 @@
                               <a:alpha val="100000"/>
                             </a:srgbClr>
                           </a:solidFill>
-                          <a:latin typeface="Arial"/>
-                          <a:cs typeface="Arial"/>
-                          <a:ea typeface="Arial"/>
-                          <a:sym typeface="Arial"/>
+                          <a:latin typeface="DejaVu Sans"/>
+                          <a:cs typeface="DejaVu Sans"/>
+                          <a:ea typeface="DejaVu Sans"/>
+                          <a:sym typeface="DejaVu Sans"/>
                         </a:rPr>
                         <a:t>0.00453</a:t>
                       </a:r>
@@ -16649,7 +16649,7 @@
                   </a:tcPr>
                 </a:tc>
               </a:tr>
-              <a:tr h="362888">
+              <a:tr h="366435">
                 <a:tc>
                   <a:txBody>
                     <a:bodyPr/>
@@ -16674,10 +16674,10 @@
                               <a:alpha val="100000"/>
                             </a:srgbClr>
                           </a:solidFill>
-                          <a:latin typeface="Arial"/>
-                          <a:cs typeface="Arial"/>
-                          <a:ea typeface="Arial"/>
-                          <a:sym typeface="Arial"/>
+                          <a:latin typeface="DejaVu Sans"/>
+                          <a:cs typeface="DejaVu Sans"/>
+                          <a:ea typeface="DejaVu Sans"/>
+                          <a:sym typeface="DejaVu Sans"/>
                         </a:rPr>
                         <a:t>2018</a:t>
                       </a:r>
@@ -16742,10 +16742,10 @@
                               <a:alpha val="100000"/>
                             </a:srgbClr>
                           </a:solidFill>
-                          <a:latin typeface="Arial"/>
-                          <a:cs typeface="Arial"/>
-                          <a:ea typeface="Arial"/>
-                          <a:sym typeface="Arial"/>
+                          <a:latin typeface="DejaVu Sans"/>
+                          <a:cs typeface="DejaVu Sans"/>
+                          <a:ea typeface="DejaVu Sans"/>
+                          <a:sym typeface="DejaVu Sans"/>
                         </a:rPr>
                         <a:t>5</a:t>
                       </a:r>
@@ -16810,10 +16810,10 @@
                               <a:alpha val="100000"/>
                             </a:srgbClr>
                           </a:solidFill>
-                          <a:latin typeface="Arial"/>
-                          <a:cs typeface="Arial"/>
-                          <a:ea typeface="Arial"/>
-                          <a:sym typeface="Arial"/>
+                          <a:latin typeface="DejaVu Sans"/>
+                          <a:cs typeface="DejaVu Sans"/>
+                          <a:ea typeface="DejaVu Sans"/>
+                          <a:sym typeface="DejaVu Sans"/>
                         </a:rPr>
                         <a:t>0.00447</a:t>
                       </a:r>
@@ -16855,7 +16855,7 @@
                   </a:tcPr>
                 </a:tc>
               </a:tr>
-              <a:tr h="362888">
+              <a:tr h="366435">
                 <a:tc>
                   <a:txBody>
                     <a:bodyPr/>
@@ -16880,10 +16880,10 @@
                               <a:alpha val="100000"/>
                             </a:srgbClr>
                           </a:solidFill>
-                          <a:latin typeface="Arial"/>
-                          <a:cs typeface="Arial"/>
-                          <a:ea typeface="Arial"/>
-                          <a:sym typeface="Arial"/>
+                          <a:latin typeface="DejaVu Sans"/>
+                          <a:cs typeface="DejaVu Sans"/>
+                          <a:ea typeface="DejaVu Sans"/>
+                          <a:sym typeface="DejaVu Sans"/>
                         </a:rPr>
                         <a:t>2019</a:t>
                       </a:r>
@@ -16948,10 +16948,10 @@
                               <a:alpha val="100000"/>
                             </a:srgbClr>
                           </a:solidFill>
-                          <a:latin typeface="Arial"/>
-                          <a:cs typeface="Arial"/>
-                          <a:ea typeface="Arial"/>
-                          <a:sym typeface="Arial"/>
+                          <a:latin typeface="DejaVu Sans"/>
+                          <a:cs typeface="DejaVu Sans"/>
+                          <a:ea typeface="DejaVu Sans"/>
+                          <a:sym typeface="DejaVu Sans"/>
                         </a:rPr>
                         <a:t>5</a:t>
                       </a:r>
@@ -17016,10 +17016,10 @@
                               <a:alpha val="100000"/>
                             </a:srgbClr>
                           </a:solidFill>
-                          <a:latin typeface="Arial"/>
-                          <a:cs typeface="Arial"/>
-                          <a:ea typeface="Arial"/>
-                          <a:sym typeface="Arial"/>
+                          <a:latin typeface="DejaVu Sans"/>
+                          <a:cs typeface="DejaVu Sans"/>
+                          <a:ea typeface="DejaVu Sans"/>
+                          <a:sym typeface="DejaVu Sans"/>
                         </a:rPr>
                         <a:t>0.00457</a:t>
                       </a:r>
@@ -17061,7 +17061,7 @@
                   </a:tcPr>
                 </a:tc>
               </a:tr>
-              <a:tr h="362888">
+              <a:tr h="366435">
                 <a:tc>
                   <a:txBody>
                     <a:bodyPr/>
@@ -17086,10 +17086,10 @@
                               <a:alpha val="100000"/>
                             </a:srgbClr>
                           </a:solidFill>
-                          <a:latin typeface="Arial"/>
-                          <a:cs typeface="Arial"/>
-                          <a:ea typeface="Arial"/>
-                          <a:sym typeface="Arial"/>
+                          <a:latin typeface="DejaVu Sans"/>
+                          <a:cs typeface="DejaVu Sans"/>
+                          <a:ea typeface="DejaVu Sans"/>
+                          <a:sym typeface="DejaVu Sans"/>
                         </a:rPr>
                         <a:t>2020</a:t>
                       </a:r>
@@ -17154,10 +17154,10 @@
                               <a:alpha val="100000"/>
                             </a:srgbClr>
                           </a:solidFill>
-                          <a:latin typeface="Arial"/>
-                          <a:cs typeface="Arial"/>
-                          <a:ea typeface="Arial"/>
-                          <a:sym typeface="Arial"/>
+                          <a:latin typeface="DejaVu Sans"/>
+                          <a:cs typeface="DejaVu Sans"/>
+                          <a:ea typeface="DejaVu Sans"/>
+                          <a:sym typeface="DejaVu Sans"/>
                         </a:rPr>
                         <a:t>5</a:t>
                       </a:r>
@@ -17222,10 +17222,10 @@
                               <a:alpha val="100000"/>
                             </a:srgbClr>
                           </a:solidFill>
-                          <a:latin typeface="Arial"/>
-                          <a:cs typeface="Arial"/>
-                          <a:ea typeface="Arial"/>
-                          <a:sym typeface="Arial"/>
+                          <a:latin typeface="DejaVu Sans"/>
+                          <a:cs typeface="DejaVu Sans"/>
+                          <a:ea typeface="DejaVu Sans"/>
+                          <a:sym typeface="DejaVu Sans"/>
                         </a:rPr>
                         <a:t>0.00440</a:t>
                       </a:r>
@@ -17267,7 +17267,7 @@
                   </a:tcPr>
                 </a:tc>
               </a:tr>
-              <a:tr h="362956">
+              <a:tr h="366435">
                 <a:tc>
                   <a:txBody>
                     <a:bodyPr/>
@@ -17292,10 +17292,10 @@
                               <a:alpha val="100000"/>
                             </a:srgbClr>
                           </a:solidFill>
-                          <a:latin typeface="Arial"/>
-                          <a:cs typeface="Arial"/>
-                          <a:ea typeface="Arial"/>
-                          <a:sym typeface="Arial"/>
+                          <a:latin typeface="DejaVu Sans"/>
+                          <a:cs typeface="DejaVu Sans"/>
+                          <a:ea typeface="DejaVu Sans"/>
+                          <a:sym typeface="DejaVu Sans"/>
                         </a:rPr>
                         <a:t>2017</a:t>
                       </a:r>
@@ -17360,10 +17360,10 @@
                               <a:alpha val="100000"/>
                             </a:srgbClr>
                           </a:solidFill>
-                          <a:latin typeface="Arial"/>
-                          <a:cs typeface="Arial"/>
-                          <a:ea typeface="Arial"/>
-                          <a:sym typeface="Arial"/>
+                          <a:latin typeface="DejaVu Sans"/>
+                          <a:cs typeface="DejaVu Sans"/>
+                          <a:ea typeface="DejaVu Sans"/>
+                          <a:sym typeface="DejaVu Sans"/>
                         </a:rPr>
                         <a:t>6</a:t>
                       </a:r>
@@ -17428,10 +17428,10 @@
                               <a:alpha val="100000"/>
                             </a:srgbClr>
                           </a:solidFill>
-                          <a:latin typeface="Arial"/>
-                          <a:cs typeface="Arial"/>
-                          <a:ea typeface="Arial"/>
-                          <a:sym typeface="Arial"/>
+                          <a:latin typeface="DejaVu Sans"/>
+                          <a:cs typeface="DejaVu Sans"/>
+                          <a:ea typeface="DejaVu Sans"/>
+                          <a:sym typeface="DejaVu Sans"/>
                         </a:rPr>
                         <a:t>0.00443</a:t>
                       </a:r>
@@ -17473,7 +17473,7 @@
                   </a:tcPr>
                 </a:tc>
               </a:tr>
-              <a:tr h="362956">
+              <a:tr h="366435">
                 <a:tc>
                   <a:txBody>
                     <a:bodyPr/>
@@ -17498,10 +17498,10 @@
                               <a:alpha val="100000"/>
                             </a:srgbClr>
                           </a:solidFill>
-                          <a:latin typeface="Arial"/>
-                          <a:cs typeface="Arial"/>
-                          <a:ea typeface="Arial"/>
-                          <a:sym typeface="Arial"/>
+                          <a:latin typeface="DejaVu Sans"/>
+                          <a:cs typeface="DejaVu Sans"/>
+                          <a:ea typeface="DejaVu Sans"/>
+                          <a:sym typeface="DejaVu Sans"/>
                         </a:rPr>
                         <a:t>2018</a:t>
                       </a:r>
@@ -17566,10 +17566,10 @@
                               <a:alpha val="100000"/>
                             </a:srgbClr>
                           </a:solidFill>
-                          <a:latin typeface="Arial"/>
-                          <a:cs typeface="Arial"/>
-                          <a:ea typeface="Arial"/>
-                          <a:sym typeface="Arial"/>
+                          <a:latin typeface="DejaVu Sans"/>
+                          <a:cs typeface="DejaVu Sans"/>
+                          <a:ea typeface="DejaVu Sans"/>
+                          <a:sym typeface="DejaVu Sans"/>
                         </a:rPr>
                         <a:t>6</a:t>
                       </a:r>
@@ -17634,10 +17634,10 @@
                               <a:alpha val="100000"/>
                             </a:srgbClr>
                           </a:solidFill>
-                          <a:latin typeface="Arial"/>
-                          <a:cs typeface="Arial"/>
-                          <a:ea typeface="Arial"/>
-                          <a:sym typeface="Arial"/>
+                          <a:latin typeface="DejaVu Sans"/>
+                          <a:cs typeface="DejaVu Sans"/>
+                          <a:ea typeface="DejaVu Sans"/>
+                          <a:sym typeface="DejaVu Sans"/>
                         </a:rPr>
                         <a:t>0.00438</a:t>
                       </a:r>
@@ -17679,7 +17679,7 @@
                   </a:tcPr>
                 </a:tc>
               </a:tr>
-              <a:tr h="362888">
+              <a:tr h="366435">
                 <a:tc>
                   <a:txBody>
                     <a:bodyPr/>
@@ -17704,10 +17704,10 @@
                               <a:alpha val="100000"/>
                             </a:srgbClr>
                           </a:solidFill>
-                          <a:latin typeface="Arial"/>
-                          <a:cs typeface="Arial"/>
-                          <a:ea typeface="Arial"/>
-                          <a:sym typeface="Arial"/>
+                          <a:latin typeface="DejaVu Sans"/>
+                          <a:cs typeface="DejaVu Sans"/>
+                          <a:ea typeface="DejaVu Sans"/>
+                          <a:sym typeface="DejaVu Sans"/>
                         </a:rPr>
                         <a:t>2019</a:t>
                       </a:r>
@@ -17772,10 +17772,10 @@
                               <a:alpha val="100000"/>
                             </a:srgbClr>
                           </a:solidFill>
-                          <a:latin typeface="Arial"/>
-                          <a:cs typeface="Arial"/>
-                          <a:ea typeface="Arial"/>
-                          <a:sym typeface="Arial"/>
+                          <a:latin typeface="DejaVu Sans"/>
+                          <a:cs typeface="DejaVu Sans"/>
+                          <a:ea typeface="DejaVu Sans"/>
+                          <a:sym typeface="DejaVu Sans"/>
                         </a:rPr>
                         <a:t>6</a:t>
                       </a:r>
@@ -17840,10 +17840,10 @@
                               <a:alpha val="100000"/>
                             </a:srgbClr>
                           </a:solidFill>
-                          <a:latin typeface="Arial"/>
-                          <a:cs typeface="Arial"/>
-                          <a:ea typeface="Arial"/>
-                          <a:sym typeface="Arial"/>
+                          <a:latin typeface="DejaVu Sans"/>
+                          <a:cs typeface="DejaVu Sans"/>
+                          <a:ea typeface="DejaVu Sans"/>
+                          <a:sym typeface="DejaVu Sans"/>
                         </a:rPr>
                         <a:t>0.00447</a:t>
                       </a:r>
@@ -17885,7 +17885,7 @@
                   </a:tcPr>
                 </a:tc>
               </a:tr>
-              <a:tr h="362956">
+              <a:tr h="366435">
                 <a:tc>
                   <a:txBody>
                     <a:bodyPr/>
@@ -17910,10 +17910,10 @@
                               <a:alpha val="100000"/>
                             </a:srgbClr>
                           </a:solidFill>
-                          <a:latin typeface="Arial"/>
-                          <a:cs typeface="Arial"/>
-                          <a:ea typeface="Arial"/>
-                          <a:sym typeface="Arial"/>
+                          <a:latin typeface="DejaVu Sans"/>
+                          <a:cs typeface="DejaVu Sans"/>
+                          <a:ea typeface="DejaVu Sans"/>
+                          <a:sym typeface="DejaVu Sans"/>
                         </a:rPr>
                         <a:t>2020</a:t>
                       </a:r>
@@ -17978,10 +17978,10 @@
                               <a:alpha val="100000"/>
                             </a:srgbClr>
                           </a:solidFill>
-                          <a:latin typeface="Arial"/>
-                          <a:cs typeface="Arial"/>
-                          <a:ea typeface="Arial"/>
-                          <a:sym typeface="Arial"/>
+                          <a:latin typeface="DejaVu Sans"/>
+                          <a:cs typeface="DejaVu Sans"/>
+                          <a:ea typeface="DejaVu Sans"/>
+                          <a:sym typeface="DejaVu Sans"/>
                         </a:rPr>
                         <a:t>6</a:t>
                       </a:r>
@@ -18046,10 +18046,10 @@
                               <a:alpha val="100000"/>
                             </a:srgbClr>
                           </a:solidFill>
-                          <a:latin typeface="Arial"/>
-                          <a:cs typeface="Arial"/>
-                          <a:ea typeface="Arial"/>
-                          <a:sym typeface="Arial"/>
+                          <a:latin typeface="DejaVu Sans"/>
+                          <a:cs typeface="DejaVu Sans"/>
+                          <a:ea typeface="DejaVu Sans"/>
+                          <a:sym typeface="DejaVu Sans"/>
                         </a:rPr>
                         <a:t>0.00431</a:t>
                       </a:r>

</xml_diff>

<commit_message>
Se creó una nueva versión del estudio, considerando los valores de administración, en la estimación y en el testeo de las tasas
</commit_message>
<xml_diff>
--- a/reports/PRESENTACION_ESTUDIO_TASA_RENTA.pptx
+++ b/reports/PRESENTACION_ESTUDIO_TASA_RENTA.pptx
@@ -3625,7 +3625,7 @@
             <a:pPr lvl="1"/>
             <a:r>
               <a:rPr/>
-              <a:t>Luego de estas exclusiones, el número de predios en la base para trabajar es 704.409.</a:t>
+              <a:t>Luego de estas exclusiones, el número de predios en la base para trabajar es 704.408.</a:t>
             </a:r>
           </a:p>
         </p:txBody>
@@ -5072,14 +5072,14 @@
             <a:pPr lvl="1"/>
             <a:r>
               <a:rPr/>
-              <a:t>Luego de este control de calidad, la base de datos tiene un total de 580.937.</a:t>
+              <a:t>Luego de este control de calidad, la base de datos tiene un total de 580.980.</a:t>
             </a:r>
           </a:p>
           <a:p>
             <a:pPr lvl="1"/>
             <a:r>
               <a:rPr/>
-              <a:t>Con estos 580.937 registros, se procede a realizar el cálculo del promedio por sector catastral.</a:t>
+              <a:t>Con estos 580.980 registros, se procede a realizar el cálculo del promedio por sector catastral.</a:t>
             </a:r>
           </a:p>
           <a:p>
@@ -7673,7 +7673,7 @@
                           <a:ea typeface="DejaVu Sans"/>
                           <a:sym typeface="DejaVu Sans"/>
                         </a:rPr>
-                        <a:t>0.00546</a:t>
+                        <a:t>0.00547</a:t>
                       </a:r>
                     </a:p>
                   </a:txBody>
@@ -7879,7 +7879,7 @@
                           <a:ea typeface="DejaVu Sans"/>
                           <a:sym typeface="DejaVu Sans"/>
                         </a:rPr>
-                        <a:t>0.00546</a:t>
+                        <a:t>0.00547</a:t>
                       </a:r>
                     </a:p>
                   </a:txBody>
@@ -8291,7 +8291,7 @@
                           <a:ea typeface="DejaVu Sans"/>
                           <a:sym typeface="DejaVu Sans"/>
                         </a:rPr>
-                        <a:t>0.00547</a:t>
+                        <a:t>0.00548</a:t>
                       </a:r>
                     </a:p>
                   </a:txBody>
@@ -8497,7 +8497,7 @@
                           <a:ea typeface="DejaVu Sans"/>
                           <a:sym typeface="DejaVu Sans"/>
                         </a:rPr>
-                        <a:t>0.00513</a:t>
+                        <a:t>0.00514</a:t>
                       </a:r>
                     </a:p>
                   </a:txBody>
@@ -8703,7 +8703,7 @@
                           <a:ea typeface="DejaVu Sans"/>
                           <a:sym typeface="DejaVu Sans"/>
                         </a:rPr>
-                        <a:t>0.00513</a:t>
+                        <a:t>0.00514</a:t>
                       </a:r>
                     </a:p>
                   </a:txBody>
@@ -9115,7 +9115,7 @@
                           <a:ea typeface="DejaVu Sans"/>
                           <a:sym typeface="DejaVu Sans"/>
                         </a:rPr>
-                        <a:t>0.00514</a:t>
+                        <a:t>0.00515</a:t>
                       </a:r>
                     </a:p>
                   </a:txBody>
@@ -9577,7 +9577,7 @@
                           <a:ea typeface="DejaVu Sans"/>
                           <a:sym typeface="DejaVu Sans"/>
                         </a:rPr>
-                        <a:t>0.00490</a:t>
+                        <a:t>0.00489</a:t>
                       </a:r>
                     </a:p>
                   </a:txBody>
@@ -9989,7 +9989,7 @@
                           <a:ea typeface="DejaVu Sans"/>
                           <a:sym typeface="DejaVu Sans"/>
                         </a:rPr>
-                        <a:t>0.00495</a:t>
+                        <a:t>0.00494</a:t>
                       </a:r>
                     </a:p>
                   </a:txBody>
@@ -10607,7 +10607,7 @@
                           <a:ea typeface="DejaVu Sans"/>
                           <a:sym typeface="DejaVu Sans"/>
                         </a:rPr>
-                        <a:t>0.00485</a:t>
+                        <a:t>0.00484</a:t>
                       </a:r>
                     </a:p>
                   </a:txBody>
@@ -10813,7 +10813,7 @@
                           <a:ea typeface="DejaVu Sans"/>
                           <a:sym typeface="DejaVu Sans"/>
                         </a:rPr>
-                        <a:t>0.00490</a:t>
+                        <a:t>0.00489</a:t>
                       </a:r>
                     </a:p>
                   </a:txBody>
@@ -11637,7 +11637,7 @@
                           <a:ea typeface="DejaVu Sans"/>
                           <a:sym typeface="DejaVu Sans"/>
                         </a:rPr>
-                        <a:t>0.00464</a:t>
+                        <a:t>0.00463</a:t>
                       </a:r>
                     </a:p>
                   </a:txBody>

</xml_diff>

<commit_message>
Se cargó la última versión del documento, para la entrega final.
</commit_message>
<xml_diff>
--- a/reports/PRESENTACION_ESTUDIO_TASA_RENTA.pptx
+++ b/reports/PRESENTACION_ESTUDIO_TASA_RENTA.pptx
@@ -3625,7 +3625,7 @@
             <a:pPr lvl="1"/>
             <a:r>
               <a:rPr/>
-              <a:t>Luego de estas exclusiones, el número de predios en la base para trabajar es 704.408.</a:t>
+              <a:t>Luego de estas exclusiones, el número de predios en la base para trabajar es 705.025.</a:t>
             </a:r>
           </a:p>
         </p:txBody>
@@ -3719,10 +3719,10 @@
             <a:tbl>
               <a:tblPr/>
               <a:tblGrid>
-                <a:gridCol w="1965227"/>
-                <a:gridCol w="1206092"/>
+                <a:gridCol w="1785517"/>
+                <a:gridCol w="1087104"/>
               </a:tblGrid>
-              <a:tr h="457183">
+              <a:tr h="437271">
                 <a:tc>
                   <a:txBody>
                     <a:bodyPr/>
@@ -3860,7 +3860,7 @@
                   </a:tcPr>
                 </a:tc>
               </a:tr>
-              <a:tr h="437693">
+              <a:tr h="427982">
                 <a:tc>
                   <a:txBody>
                     <a:bodyPr/>
@@ -3885,10 +3885,10 @@
                               <a:alpha val="100000"/>
                             </a:srgbClr>
                           </a:solidFill>
-                          <a:latin typeface="DejaVu Sans"/>
-                          <a:cs typeface="DejaVu Sans"/>
-                          <a:ea typeface="DejaVu Sans"/>
-                          <a:sym typeface="DejaVu Sans"/>
+                          <a:latin typeface="Arial"/>
+                          <a:cs typeface="Arial"/>
+                          <a:ea typeface="Arial"/>
+                          <a:sym typeface="Arial"/>
                         </a:rPr>
                         <a:t>Rurales</a:t>
                       </a:r>
@@ -3953,10 +3953,10 @@
                               <a:alpha val="100000"/>
                             </a:srgbClr>
                           </a:solidFill>
-                          <a:latin typeface="DejaVu Sans"/>
-                          <a:cs typeface="DejaVu Sans"/>
-                          <a:ea typeface="DejaVu Sans"/>
-                          <a:sym typeface="DejaVu Sans"/>
+                          <a:latin typeface="Arial"/>
+                          <a:cs typeface="Arial"/>
+                          <a:ea typeface="Arial"/>
+                          <a:sym typeface="Arial"/>
                         </a:rPr>
                         <a:t> 97.321</a:t>
                       </a:r>
@@ -3998,7 +3998,7 @@
                   </a:tcPr>
                 </a:tc>
               </a:tr>
-              <a:tr h="446846">
+              <a:tr h="429991">
                 <a:tc>
                   <a:txBody>
                     <a:bodyPr/>
@@ -4023,10 +4023,10 @@
                               <a:alpha val="100000"/>
                             </a:srgbClr>
                           </a:solidFill>
-                          <a:latin typeface="DejaVu Sans"/>
-                          <a:cs typeface="DejaVu Sans"/>
-                          <a:ea typeface="DejaVu Sans"/>
-                          <a:sym typeface="DejaVu Sans"/>
+                          <a:latin typeface="Arial"/>
+                          <a:cs typeface="Arial"/>
+                          <a:ea typeface="Arial"/>
+                          <a:sym typeface="Arial"/>
                         </a:rPr>
                         <a:t>Sin área</a:t>
                       </a:r>
@@ -4091,10 +4091,10 @@
                               <a:alpha val="100000"/>
                             </a:srgbClr>
                           </a:solidFill>
-                          <a:latin typeface="DejaVu Sans"/>
-                          <a:cs typeface="DejaVu Sans"/>
-                          <a:ea typeface="DejaVu Sans"/>
-                          <a:sym typeface="DejaVu Sans"/>
+                          <a:latin typeface="Arial"/>
+                          <a:cs typeface="Arial"/>
+                          <a:ea typeface="Arial"/>
+                          <a:sym typeface="Arial"/>
                         </a:rPr>
                         <a:t>254.640</a:t>
                       </a:r>
@@ -4136,7 +4136,7 @@
                   </a:tcPr>
                 </a:tc>
               </a:tr>
-              <a:tr h="482006">
+              <a:tr h="472630">
                 <a:tc>
                   <a:txBody>
                     <a:bodyPr/>
@@ -4161,10 +4161,10 @@
                               <a:alpha val="100000"/>
                             </a:srgbClr>
                           </a:solidFill>
-                          <a:latin typeface="DejaVu Sans"/>
-                          <a:cs typeface="DejaVu Sans"/>
-                          <a:ea typeface="DejaVu Sans"/>
-                          <a:sym typeface="DejaVu Sans"/>
+                          <a:latin typeface="Arial"/>
+                          <a:cs typeface="Arial"/>
+                          <a:ea typeface="Arial"/>
+                          <a:sym typeface="Arial"/>
                         </a:rPr>
                         <a:t>Sin Barmanpre</a:t>
                       </a:r>
@@ -4229,10 +4229,10 @@
                               <a:alpha val="100000"/>
                             </a:srgbClr>
                           </a:solidFill>
-                          <a:latin typeface="DejaVu Sans"/>
-                          <a:cs typeface="DejaVu Sans"/>
-                          <a:ea typeface="DejaVu Sans"/>
-                          <a:sym typeface="DejaVu Sans"/>
+                          <a:latin typeface="Arial"/>
+                          <a:cs typeface="Arial"/>
+                          <a:ea typeface="Arial"/>
+                          <a:sym typeface="Arial"/>
                         </a:rPr>
                         <a:t> 81.918</a:t>
                       </a:r>
@@ -4274,7 +4274,7 @@
                   </a:tcPr>
                 </a:tc>
               </a:tr>
-              <a:tr h="437693">
+              <a:tr h="429991">
                 <a:tc>
                   <a:txBody>
                     <a:bodyPr/>
@@ -4299,10 +4299,10 @@
                               <a:alpha val="100000"/>
                             </a:srgbClr>
                           </a:solidFill>
-                          <a:latin typeface="DejaVu Sans"/>
-                          <a:cs typeface="DejaVu Sans"/>
-                          <a:ea typeface="DejaVu Sans"/>
-                          <a:sym typeface="DejaVu Sans"/>
+                          <a:latin typeface="Arial"/>
+                          <a:cs typeface="Arial"/>
+                          <a:ea typeface="Arial"/>
+                          <a:sym typeface="Arial"/>
                         </a:rPr>
                         <a:t>Sin estrato</a:t>
                       </a:r>
@@ -4367,10 +4367,10 @@
                               <a:alpha val="100000"/>
                             </a:srgbClr>
                           </a:solidFill>
-                          <a:latin typeface="DejaVu Sans"/>
-                          <a:cs typeface="DejaVu Sans"/>
-                          <a:ea typeface="DejaVu Sans"/>
-                          <a:sym typeface="DejaVu Sans"/>
+                          <a:latin typeface="Arial"/>
+                          <a:cs typeface="Arial"/>
+                          <a:ea typeface="Arial"/>
+                          <a:sym typeface="Arial"/>
                         </a:rPr>
                         <a:t> 19.043</a:t>
                       </a:r>
@@ -5072,14 +5072,14 @@
             <a:pPr lvl="1"/>
             <a:r>
               <a:rPr/>
-              <a:t>Luego de este control de calidad, la base de datos tiene un total de 580.980.</a:t>
+              <a:t>Luego de este control de calidad, la base de datos tiene un total de 580.554.</a:t>
             </a:r>
           </a:p>
           <a:p>
             <a:pPr lvl="1"/>
             <a:r>
               <a:rPr/>
-              <a:t>Con estos 580.980 registros, se procede a realizar el cálculo del promedio por sector catastral.</a:t>
+              <a:t>Con estos 580.554 registros, se procede a realizar el cálculo del promedio por sector catastral.</a:t>
             </a:r>
           </a:p>
           <a:p>
@@ -6473,11 +6473,11 @@
             <a:tbl>
               <a:tblPr/>
               <a:tblGrid>
-                <a:gridCol w="616299"/>
-                <a:gridCol w="910979"/>
-                <a:gridCol w="1166504"/>
+                <a:gridCol w="571551"/>
+                <a:gridCol w="920528"/>
+                <a:gridCol w="1176804"/>
               </a:tblGrid>
-              <a:tr h="397404">
+              <a:tr h="390241">
                 <a:tc>
                   <a:txBody>
                     <a:bodyPr/>
@@ -6502,10 +6502,10 @@
                               <a:alpha val="100000"/>
                             </a:srgbClr>
                           </a:solidFill>
-                          <a:latin typeface="DejaVu Sans"/>
-                          <a:cs typeface="DejaVu Sans"/>
-                          <a:ea typeface="DejaVu Sans"/>
-                          <a:sym typeface="DejaVu Sans"/>
+                          <a:latin typeface="Arial"/>
+                          <a:cs typeface="Arial"/>
+                          <a:ea typeface="Arial"/>
+                          <a:sym typeface="Arial"/>
                         </a:rPr>
                         <a:t>AÑO</a:t>
                       </a:r>
@@ -6570,10 +6570,10 @@
                               <a:alpha val="100000"/>
                             </a:srgbClr>
                           </a:solidFill>
-                          <a:latin typeface="DejaVu Sans"/>
-                          <a:cs typeface="DejaVu Sans"/>
-                          <a:ea typeface="DejaVu Sans"/>
-                          <a:sym typeface="DejaVu Sans"/>
+                          <a:latin typeface="Arial"/>
+                          <a:cs typeface="Arial"/>
+                          <a:ea typeface="Arial"/>
+                          <a:sym typeface="Arial"/>
                         </a:rPr>
                         <a:t>ESTRATO</a:t>
                       </a:r>
@@ -6638,10 +6638,10 @@
                               <a:alpha val="100000"/>
                             </a:srgbClr>
                           </a:solidFill>
-                          <a:latin typeface="DejaVu Sans"/>
-                          <a:cs typeface="DejaVu Sans"/>
-                          <a:ea typeface="DejaVu Sans"/>
-                          <a:sym typeface="DejaVu Sans"/>
+                          <a:latin typeface="Arial"/>
+                          <a:cs typeface="Arial"/>
+                          <a:ea typeface="Arial"/>
+                          <a:sym typeface="Arial"/>
                         </a:rPr>
                         <a:t>TASA_RENTA</a:t>
                       </a:r>
@@ -6683,7 +6683,7 @@
                   </a:tcPr>
                 </a:tc>
               </a:tr>
-              <a:tr h="366435">
+              <a:tr h="362888">
                 <a:tc>
                   <a:txBody>
                     <a:bodyPr/>
@@ -6708,10 +6708,10 @@
                               <a:alpha val="100000"/>
                             </a:srgbClr>
                           </a:solidFill>
-                          <a:latin typeface="DejaVu Sans"/>
-                          <a:cs typeface="DejaVu Sans"/>
-                          <a:ea typeface="DejaVu Sans"/>
-                          <a:sym typeface="DejaVu Sans"/>
+                          <a:latin typeface="Arial"/>
+                          <a:cs typeface="Arial"/>
+                          <a:ea typeface="Arial"/>
+                          <a:sym typeface="Arial"/>
                         </a:rPr>
                         <a:t>2017</a:t>
                       </a:r>
@@ -6776,10 +6776,10 @@
                               <a:alpha val="100000"/>
                             </a:srgbClr>
                           </a:solidFill>
-                          <a:latin typeface="DejaVu Sans"/>
-                          <a:cs typeface="DejaVu Sans"/>
-                          <a:ea typeface="DejaVu Sans"/>
-                          <a:sym typeface="DejaVu Sans"/>
+                          <a:latin typeface="Arial"/>
+                          <a:cs typeface="Arial"/>
+                          <a:ea typeface="Arial"/>
+                          <a:sym typeface="Arial"/>
                         </a:rPr>
                         <a:t>1</a:t>
                       </a:r>
@@ -6844,12 +6844,12 @@
                               <a:alpha val="100000"/>
                             </a:srgbClr>
                           </a:solidFill>
-                          <a:latin typeface="DejaVu Sans"/>
-                          <a:cs typeface="DejaVu Sans"/>
-                          <a:ea typeface="DejaVu Sans"/>
-                          <a:sym typeface="DejaVu Sans"/>
+                          <a:latin typeface="Arial"/>
+                          <a:cs typeface="Arial"/>
+                          <a:ea typeface="Arial"/>
+                          <a:sym typeface="Arial"/>
                         </a:rPr>
-                        <a:t>0.00539</a:t>
+                        <a:t>0.00540</a:t>
                       </a:r>
                     </a:p>
                   </a:txBody>
@@ -6889,7 +6889,7 @@
                   </a:tcPr>
                 </a:tc>
               </a:tr>
-              <a:tr h="366435">
+              <a:tr h="362956">
                 <a:tc>
                   <a:txBody>
                     <a:bodyPr/>
@@ -6914,10 +6914,10 @@
                               <a:alpha val="100000"/>
                             </a:srgbClr>
                           </a:solidFill>
-                          <a:latin typeface="DejaVu Sans"/>
-                          <a:cs typeface="DejaVu Sans"/>
-                          <a:ea typeface="DejaVu Sans"/>
-                          <a:sym typeface="DejaVu Sans"/>
+                          <a:latin typeface="Arial"/>
+                          <a:cs typeface="Arial"/>
+                          <a:ea typeface="Arial"/>
+                          <a:sym typeface="Arial"/>
                         </a:rPr>
                         <a:t>2018</a:t>
                       </a:r>
@@ -6982,10 +6982,10 @@
                               <a:alpha val="100000"/>
                             </a:srgbClr>
                           </a:solidFill>
-                          <a:latin typeface="DejaVu Sans"/>
-                          <a:cs typeface="DejaVu Sans"/>
-                          <a:ea typeface="DejaVu Sans"/>
-                          <a:sym typeface="DejaVu Sans"/>
+                          <a:latin typeface="Arial"/>
+                          <a:cs typeface="Arial"/>
+                          <a:ea typeface="Arial"/>
+                          <a:sym typeface="Arial"/>
                         </a:rPr>
                         <a:t>1</a:t>
                       </a:r>
@@ -7050,12 +7050,12 @@
                               <a:alpha val="100000"/>
                             </a:srgbClr>
                           </a:solidFill>
-                          <a:latin typeface="DejaVu Sans"/>
-                          <a:cs typeface="DejaVu Sans"/>
-                          <a:ea typeface="DejaVu Sans"/>
-                          <a:sym typeface="DejaVu Sans"/>
+                          <a:latin typeface="Arial"/>
+                          <a:cs typeface="Arial"/>
+                          <a:ea typeface="Arial"/>
+                          <a:sym typeface="Arial"/>
                         </a:rPr>
-                        <a:t>0.00539</a:t>
+                        <a:t>0.00538</a:t>
                       </a:r>
                     </a:p>
                   </a:txBody>
@@ -7095,7 +7095,7 @@
                   </a:tcPr>
                 </a:tc>
               </a:tr>
-              <a:tr h="366435">
+              <a:tr h="362888">
                 <a:tc>
                   <a:txBody>
                     <a:bodyPr/>
@@ -7120,10 +7120,10 @@
                               <a:alpha val="100000"/>
                             </a:srgbClr>
                           </a:solidFill>
-                          <a:latin typeface="DejaVu Sans"/>
-                          <a:cs typeface="DejaVu Sans"/>
-                          <a:ea typeface="DejaVu Sans"/>
-                          <a:sym typeface="DejaVu Sans"/>
+                          <a:latin typeface="Arial"/>
+                          <a:cs typeface="Arial"/>
+                          <a:ea typeface="Arial"/>
+                          <a:sym typeface="Arial"/>
                         </a:rPr>
                         <a:t>2019</a:t>
                       </a:r>
@@ -7188,10 +7188,10 @@
                               <a:alpha val="100000"/>
                             </a:srgbClr>
                           </a:solidFill>
-                          <a:latin typeface="DejaVu Sans"/>
-                          <a:cs typeface="DejaVu Sans"/>
-                          <a:ea typeface="DejaVu Sans"/>
-                          <a:sym typeface="DejaVu Sans"/>
+                          <a:latin typeface="Arial"/>
+                          <a:cs typeface="Arial"/>
+                          <a:ea typeface="Arial"/>
+                          <a:sym typeface="Arial"/>
                         </a:rPr>
                         <a:t>1</a:t>
                       </a:r>
@@ -7256,12 +7256,12 @@
                               <a:alpha val="100000"/>
                             </a:srgbClr>
                           </a:solidFill>
-                          <a:latin typeface="DejaVu Sans"/>
-                          <a:cs typeface="DejaVu Sans"/>
-                          <a:ea typeface="DejaVu Sans"/>
-                          <a:sym typeface="DejaVu Sans"/>
+                          <a:latin typeface="Arial"/>
+                          <a:cs typeface="Arial"/>
+                          <a:ea typeface="Arial"/>
+                          <a:sym typeface="Arial"/>
                         </a:rPr>
-                        <a:t>0.00545</a:t>
+                        <a:t>0.00546</a:t>
                       </a:r>
                     </a:p>
                   </a:txBody>
@@ -7301,7 +7301,7 @@
                   </a:tcPr>
                 </a:tc>
               </a:tr>
-              <a:tr h="366435">
+              <a:tr h="362888">
                 <a:tc>
                   <a:txBody>
                     <a:bodyPr/>
@@ -7326,10 +7326,10 @@
                               <a:alpha val="100000"/>
                             </a:srgbClr>
                           </a:solidFill>
-                          <a:latin typeface="DejaVu Sans"/>
-                          <a:cs typeface="DejaVu Sans"/>
-                          <a:ea typeface="DejaVu Sans"/>
-                          <a:sym typeface="DejaVu Sans"/>
+                          <a:latin typeface="Arial"/>
+                          <a:cs typeface="Arial"/>
+                          <a:ea typeface="Arial"/>
+                          <a:sym typeface="Arial"/>
                         </a:rPr>
                         <a:t>2020</a:t>
                       </a:r>
@@ -7394,10 +7394,10 @@
                               <a:alpha val="100000"/>
                             </a:srgbClr>
                           </a:solidFill>
-                          <a:latin typeface="DejaVu Sans"/>
-                          <a:cs typeface="DejaVu Sans"/>
-                          <a:ea typeface="DejaVu Sans"/>
-                          <a:sym typeface="DejaVu Sans"/>
+                          <a:latin typeface="Arial"/>
+                          <a:cs typeface="Arial"/>
+                          <a:ea typeface="Arial"/>
+                          <a:sym typeface="Arial"/>
                         </a:rPr>
                         <a:t>1</a:t>
                       </a:r>
@@ -7462,10 +7462,10 @@
                               <a:alpha val="100000"/>
                             </a:srgbClr>
                           </a:solidFill>
-                          <a:latin typeface="DejaVu Sans"/>
-                          <a:cs typeface="DejaVu Sans"/>
-                          <a:ea typeface="DejaVu Sans"/>
-                          <a:sym typeface="DejaVu Sans"/>
+                          <a:latin typeface="Arial"/>
+                          <a:cs typeface="Arial"/>
+                          <a:ea typeface="Arial"/>
+                          <a:sym typeface="Arial"/>
                         </a:rPr>
                         <a:t>0.00540</a:t>
                       </a:r>
@@ -7507,7 +7507,7 @@
                   </a:tcPr>
                 </a:tc>
               </a:tr>
-              <a:tr h="366435">
+              <a:tr h="362956">
                 <a:tc>
                   <a:txBody>
                     <a:bodyPr/>
@@ -7532,10 +7532,10 @@
                               <a:alpha val="100000"/>
                             </a:srgbClr>
                           </a:solidFill>
-                          <a:latin typeface="DejaVu Sans"/>
-                          <a:cs typeface="DejaVu Sans"/>
-                          <a:ea typeface="DejaVu Sans"/>
-                          <a:sym typeface="DejaVu Sans"/>
+                          <a:latin typeface="Arial"/>
+                          <a:cs typeface="Arial"/>
+                          <a:ea typeface="Arial"/>
+                          <a:sym typeface="Arial"/>
                         </a:rPr>
                         <a:t>2017</a:t>
                       </a:r>
@@ -7600,10 +7600,10 @@
                               <a:alpha val="100000"/>
                             </a:srgbClr>
                           </a:solidFill>
-                          <a:latin typeface="DejaVu Sans"/>
-                          <a:cs typeface="DejaVu Sans"/>
-                          <a:ea typeface="DejaVu Sans"/>
-                          <a:sym typeface="DejaVu Sans"/>
+                          <a:latin typeface="Arial"/>
+                          <a:cs typeface="Arial"/>
+                          <a:ea typeface="Arial"/>
+                          <a:sym typeface="Arial"/>
                         </a:rPr>
                         <a:t>2</a:t>
                       </a:r>
@@ -7668,12 +7668,12 @@
                               <a:alpha val="100000"/>
                             </a:srgbClr>
                           </a:solidFill>
-                          <a:latin typeface="DejaVu Sans"/>
-                          <a:cs typeface="DejaVu Sans"/>
-                          <a:ea typeface="DejaVu Sans"/>
-                          <a:sym typeface="DejaVu Sans"/>
+                          <a:latin typeface="Arial"/>
+                          <a:cs typeface="Arial"/>
+                          <a:ea typeface="Arial"/>
+                          <a:sym typeface="Arial"/>
                         </a:rPr>
-                        <a:t>0.00547</a:t>
+                        <a:t>0.00553</a:t>
                       </a:r>
                     </a:p>
                   </a:txBody>
@@ -7713,7 +7713,7 @@
                   </a:tcPr>
                 </a:tc>
               </a:tr>
-              <a:tr h="366435">
+              <a:tr h="362888">
                 <a:tc>
                   <a:txBody>
                     <a:bodyPr/>
@@ -7738,10 +7738,10 @@
                               <a:alpha val="100000"/>
                             </a:srgbClr>
                           </a:solidFill>
-                          <a:latin typeface="DejaVu Sans"/>
-                          <a:cs typeface="DejaVu Sans"/>
-                          <a:ea typeface="DejaVu Sans"/>
-                          <a:sym typeface="DejaVu Sans"/>
+                          <a:latin typeface="Arial"/>
+                          <a:cs typeface="Arial"/>
+                          <a:ea typeface="Arial"/>
+                          <a:sym typeface="Arial"/>
                         </a:rPr>
                         <a:t>2018</a:t>
                       </a:r>
@@ -7806,10 +7806,10 @@
                               <a:alpha val="100000"/>
                             </a:srgbClr>
                           </a:solidFill>
-                          <a:latin typeface="DejaVu Sans"/>
-                          <a:cs typeface="DejaVu Sans"/>
-                          <a:ea typeface="DejaVu Sans"/>
-                          <a:sym typeface="DejaVu Sans"/>
+                          <a:latin typeface="Arial"/>
+                          <a:cs typeface="Arial"/>
+                          <a:ea typeface="Arial"/>
+                          <a:sym typeface="Arial"/>
                         </a:rPr>
                         <a:t>2</a:t>
                       </a:r>
@@ -7874,12 +7874,12 @@
                               <a:alpha val="100000"/>
                             </a:srgbClr>
                           </a:solidFill>
-                          <a:latin typeface="DejaVu Sans"/>
-                          <a:cs typeface="DejaVu Sans"/>
-                          <a:ea typeface="DejaVu Sans"/>
-                          <a:sym typeface="DejaVu Sans"/>
+                          <a:latin typeface="Arial"/>
+                          <a:cs typeface="Arial"/>
+                          <a:ea typeface="Arial"/>
+                          <a:sym typeface="Arial"/>
                         </a:rPr>
-                        <a:t>0.00547</a:t>
+                        <a:t>0.00550</a:t>
                       </a:r>
                     </a:p>
                   </a:txBody>
@@ -7919,7 +7919,7 @@
                   </a:tcPr>
                 </a:tc>
               </a:tr>
-              <a:tr h="366435">
+              <a:tr h="362888">
                 <a:tc>
                   <a:txBody>
                     <a:bodyPr/>
@@ -7944,10 +7944,10 @@
                               <a:alpha val="100000"/>
                             </a:srgbClr>
                           </a:solidFill>
-                          <a:latin typeface="DejaVu Sans"/>
-                          <a:cs typeface="DejaVu Sans"/>
-                          <a:ea typeface="DejaVu Sans"/>
-                          <a:sym typeface="DejaVu Sans"/>
+                          <a:latin typeface="Arial"/>
+                          <a:cs typeface="Arial"/>
+                          <a:ea typeface="Arial"/>
+                          <a:sym typeface="Arial"/>
                         </a:rPr>
                         <a:t>2019</a:t>
                       </a:r>
@@ -8012,10 +8012,10 @@
                               <a:alpha val="100000"/>
                             </a:srgbClr>
                           </a:solidFill>
-                          <a:latin typeface="DejaVu Sans"/>
-                          <a:cs typeface="DejaVu Sans"/>
-                          <a:ea typeface="DejaVu Sans"/>
-                          <a:sym typeface="DejaVu Sans"/>
+                          <a:latin typeface="Arial"/>
+                          <a:cs typeface="Arial"/>
+                          <a:ea typeface="Arial"/>
+                          <a:sym typeface="Arial"/>
                         </a:rPr>
                         <a:t>2</a:t>
                       </a:r>
@@ -8080,12 +8080,12 @@
                               <a:alpha val="100000"/>
                             </a:srgbClr>
                           </a:solidFill>
-                          <a:latin typeface="DejaVu Sans"/>
-                          <a:cs typeface="DejaVu Sans"/>
-                          <a:ea typeface="DejaVu Sans"/>
-                          <a:sym typeface="DejaVu Sans"/>
+                          <a:latin typeface="Arial"/>
+                          <a:cs typeface="Arial"/>
+                          <a:ea typeface="Arial"/>
+                          <a:sym typeface="Arial"/>
                         </a:rPr>
-                        <a:t>0.00553</a:t>
+                        <a:t>0.00559</a:t>
                       </a:r>
                     </a:p>
                   </a:txBody>
@@ -8125,7 +8125,7 @@
                   </a:tcPr>
                 </a:tc>
               </a:tr>
-              <a:tr h="366435">
+              <a:tr h="362956">
                 <a:tc>
                   <a:txBody>
                     <a:bodyPr/>
@@ -8150,10 +8150,10 @@
                               <a:alpha val="100000"/>
                             </a:srgbClr>
                           </a:solidFill>
-                          <a:latin typeface="DejaVu Sans"/>
-                          <a:cs typeface="DejaVu Sans"/>
-                          <a:ea typeface="DejaVu Sans"/>
-                          <a:sym typeface="DejaVu Sans"/>
+                          <a:latin typeface="Arial"/>
+                          <a:cs typeface="Arial"/>
+                          <a:ea typeface="Arial"/>
+                          <a:sym typeface="Arial"/>
                         </a:rPr>
                         <a:t>2020</a:t>
                       </a:r>
@@ -8218,10 +8218,10 @@
                               <a:alpha val="100000"/>
                             </a:srgbClr>
                           </a:solidFill>
-                          <a:latin typeface="DejaVu Sans"/>
-                          <a:cs typeface="DejaVu Sans"/>
-                          <a:ea typeface="DejaVu Sans"/>
-                          <a:sym typeface="DejaVu Sans"/>
+                          <a:latin typeface="Arial"/>
+                          <a:cs typeface="Arial"/>
+                          <a:ea typeface="Arial"/>
+                          <a:sym typeface="Arial"/>
                         </a:rPr>
                         <a:t>2</a:t>
                       </a:r>
@@ -8286,12 +8286,12 @@
                               <a:alpha val="100000"/>
                             </a:srgbClr>
                           </a:solidFill>
-                          <a:latin typeface="DejaVu Sans"/>
-                          <a:cs typeface="DejaVu Sans"/>
-                          <a:ea typeface="DejaVu Sans"/>
-                          <a:sym typeface="DejaVu Sans"/>
+                          <a:latin typeface="Arial"/>
+                          <a:cs typeface="Arial"/>
+                          <a:ea typeface="Arial"/>
+                          <a:sym typeface="Arial"/>
                         </a:rPr>
-                        <a:t>0.00548</a:t>
+                        <a:t>0.00553</a:t>
                       </a:r>
                     </a:p>
                   </a:txBody>
@@ -8331,7 +8331,7 @@
                   </a:tcPr>
                 </a:tc>
               </a:tr>
-              <a:tr h="366435">
+              <a:tr h="362956">
                 <a:tc>
                   <a:txBody>
                     <a:bodyPr/>
@@ -8356,10 +8356,10 @@
                               <a:alpha val="100000"/>
                             </a:srgbClr>
                           </a:solidFill>
-                          <a:latin typeface="DejaVu Sans"/>
-                          <a:cs typeface="DejaVu Sans"/>
-                          <a:ea typeface="DejaVu Sans"/>
-                          <a:sym typeface="DejaVu Sans"/>
+                          <a:latin typeface="Arial"/>
+                          <a:cs typeface="Arial"/>
+                          <a:ea typeface="Arial"/>
+                          <a:sym typeface="Arial"/>
                         </a:rPr>
                         <a:t>2017</a:t>
                       </a:r>
@@ -8424,10 +8424,10 @@
                               <a:alpha val="100000"/>
                             </a:srgbClr>
                           </a:solidFill>
-                          <a:latin typeface="DejaVu Sans"/>
-                          <a:cs typeface="DejaVu Sans"/>
-                          <a:ea typeface="DejaVu Sans"/>
-                          <a:sym typeface="DejaVu Sans"/>
+                          <a:latin typeface="Arial"/>
+                          <a:cs typeface="Arial"/>
+                          <a:ea typeface="Arial"/>
+                          <a:sym typeface="Arial"/>
                         </a:rPr>
                         <a:t>3</a:t>
                       </a:r>
@@ -8492,12 +8492,12 @@
                               <a:alpha val="100000"/>
                             </a:srgbClr>
                           </a:solidFill>
-                          <a:latin typeface="DejaVu Sans"/>
-                          <a:cs typeface="DejaVu Sans"/>
-                          <a:ea typeface="DejaVu Sans"/>
-                          <a:sym typeface="DejaVu Sans"/>
+                          <a:latin typeface="Arial"/>
+                          <a:cs typeface="Arial"/>
+                          <a:ea typeface="Arial"/>
+                          <a:sym typeface="Arial"/>
                         </a:rPr>
-                        <a:t>0.00514</a:t>
+                        <a:t>0.00516</a:t>
                       </a:r>
                     </a:p>
                   </a:txBody>
@@ -8537,7 +8537,7 @@
                   </a:tcPr>
                 </a:tc>
               </a:tr>
-              <a:tr h="366435">
+              <a:tr h="362956">
                 <a:tc>
                   <a:txBody>
                     <a:bodyPr/>
@@ -8562,10 +8562,10 @@
                               <a:alpha val="100000"/>
                             </a:srgbClr>
                           </a:solidFill>
-                          <a:latin typeface="DejaVu Sans"/>
-                          <a:cs typeface="DejaVu Sans"/>
-                          <a:ea typeface="DejaVu Sans"/>
-                          <a:sym typeface="DejaVu Sans"/>
+                          <a:latin typeface="Arial"/>
+                          <a:cs typeface="Arial"/>
+                          <a:ea typeface="Arial"/>
+                          <a:sym typeface="Arial"/>
                         </a:rPr>
                         <a:t>2018</a:t>
                       </a:r>
@@ -8630,10 +8630,10 @@
                               <a:alpha val="100000"/>
                             </a:srgbClr>
                           </a:solidFill>
-                          <a:latin typeface="DejaVu Sans"/>
-                          <a:cs typeface="DejaVu Sans"/>
-                          <a:ea typeface="DejaVu Sans"/>
-                          <a:sym typeface="DejaVu Sans"/>
+                          <a:latin typeface="Arial"/>
+                          <a:cs typeface="Arial"/>
+                          <a:ea typeface="Arial"/>
+                          <a:sym typeface="Arial"/>
                         </a:rPr>
                         <a:t>3</a:t>
                       </a:r>
@@ -8698,10 +8698,10 @@
                               <a:alpha val="100000"/>
                             </a:srgbClr>
                           </a:solidFill>
-                          <a:latin typeface="DejaVu Sans"/>
-                          <a:cs typeface="DejaVu Sans"/>
-                          <a:ea typeface="DejaVu Sans"/>
-                          <a:sym typeface="DejaVu Sans"/>
+                          <a:latin typeface="Arial"/>
+                          <a:cs typeface="Arial"/>
+                          <a:ea typeface="Arial"/>
+                          <a:sym typeface="Arial"/>
                         </a:rPr>
                         <a:t>0.00514</a:t>
                       </a:r>
@@ -8743,7 +8743,7 @@
                   </a:tcPr>
                 </a:tc>
               </a:tr>
-              <a:tr h="366435">
+              <a:tr h="362956">
                 <a:tc>
                   <a:txBody>
                     <a:bodyPr/>
@@ -8768,10 +8768,10 @@
                               <a:alpha val="100000"/>
                             </a:srgbClr>
                           </a:solidFill>
-                          <a:latin typeface="DejaVu Sans"/>
-                          <a:cs typeface="DejaVu Sans"/>
-                          <a:ea typeface="DejaVu Sans"/>
-                          <a:sym typeface="DejaVu Sans"/>
+                          <a:latin typeface="Arial"/>
+                          <a:cs typeface="Arial"/>
+                          <a:ea typeface="Arial"/>
+                          <a:sym typeface="Arial"/>
                         </a:rPr>
                         <a:t>2019</a:t>
                       </a:r>
@@ -8836,10 +8836,10 @@
                               <a:alpha val="100000"/>
                             </a:srgbClr>
                           </a:solidFill>
-                          <a:latin typeface="DejaVu Sans"/>
-                          <a:cs typeface="DejaVu Sans"/>
-                          <a:ea typeface="DejaVu Sans"/>
-                          <a:sym typeface="DejaVu Sans"/>
+                          <a:latin typeface="Arial"/>
+                          <a:cs typeface="Arial"/>
+                          <a:ea typeface="Arial"/>
+                          <a:sym typeface="Arial"/>
                         </a:rPr>
                         <a:t>3</a:t>
                       </a:r>
@@ -8904,12 +8904,12 @@
                               <a:alpha val="100000"/>
                             </a:srgbClr>
                           </a:solidFill>
-                          <a:latin typeface="DejaVu Sans"/>
-                          <a:cs typeface="DejaVu Sans"/>
-                          <a:ea typeface="DejaVu Sans"/>
-                          <a:sym typeface="DejaVu Sans"/>
+                          <a:latin typeface="Arial"/>
+                          <a:cs typeface="Arial"/>
+                          <a:ea typeface="Arial"/>
+                          <a:sym typeface="Arial"/>
                         </a:rPr>
-                        <a:t>0.00519</a:t>
+                        <a:t>0.00521</a:t>
                       </a:r>
                     </a:p>
                   </a:txBody>
@@ -8949,7 +8949,7 @@
                   </a:tcPr>
                 </a:tc>
               </a:tr>
-              <a:tr h="366435">
+              <a:tr h="362956">
                 <a:tc>
                   <a:txBody>
                     <a:bodyPr/>
@@ -8974,10 +8974,10 @@
                               <a:alpha val="100000"/>
                             </a:srgbClr>
                           </a:solidFill>
-                          <a:latin typeface="DejaVu Sans"/>
-                          <a:cs typeface="DejaVu Sans"/>
-                          <a:ea typeface="DejaVu Sans"/>
-                          <a:sym typeface="DejaVu Sans"/>
+                          <a:latin typeface="Arial"/>
+                          <a:cs typeface="Arial"/>
+                          <a:ea typeface="Arial"/>
+                          <a:sym typeface="Arial"/>
                         </a:rPr>
                         <a:t>2020</a:t>
                       </a:r>
@@ -9042,10 +9042,10 @@
                               <a:alpha val="100000"/>
                             </a:srgbClr>
                           </a:solidFill>
-                          <a:latin typeface="DejaVu Sans"/>
-                          <a:cs typeface="DejaVu Sans"/>
-                          <a:ea typeface="DejaVu Sans"/>
-                          <a:sym typeface="DejaVu Sans"/>
+                          <a:latin typeface="Arial"/>
+                          <a:cs typeface="Arial"/>
+                          <a:ea typeface="Arial"/>
+                          <a:sym typeface="Arial"/>
                         </a:rPr>
                         <a:t>3</a:t>
                       </a:r>
@@ -9110,12 +9110,12 @@
                               <a:alpha val="100000"/>
                             </a:srgbClr>
                           </a:solidFill>
-                          <a:latin typeface="DejaVu Sans"/>
-                          <a:cs typeface="DejaVu Sans"/>
-                          <a:ea typeface="DejaVu Sans"/>
-                          <a:sym typeface="DejaVu Sans"/>
+                          <a:latin typeface="Arial"/>
+                          <a:cs typeface="Arial"/>
+                          <a:ea typeface="Arial"/>
+                          <a:sym typeface="Arial"/>
                         </a:rPr>
-                        <a:t>0.00515</a:t>
+                        <a:t>0.00516</a:t>
                       </a:r>
                     </a:p>
                   </a:txBody>
@@ -9201,11 +9201,11 @@
             <a:tbl>
               <a:tblPr/>
               <a:tblGrid>
-                <a:gridCol w="616299"/>
-                <a:gridCol w="970088"/>
-                <a:gridCol w="1248843"/>
+                <a:gridCol w="591023"/>
+                <a:gridCol w="980506"/>
+                <a:gridCol w="1260080"/>
               </a:tblGrid>
-              <a:tr h="409825">
+              <a:tr h="402011">
                 <a:tc>
                   <a:txBody>
                     <a:bodyPr/>
@@ -9230,10 +9230,10 @@
                               <a:alpha val="100000"/>
                             </a:srgbClr>
                           </a:solidFill>
-                          <a:latin typeface="DejaVu Sans"/>
-                          <a:cs typeface="DejaVu Sans"/>
-                          <a:ea typeface="DejaVu Sans"/>
-                          <a:sym typeface="DejaVu Sans"/>
+                          <a:latin typeface="Arial"/>
+                          <a:cs typeface="Arial"/>
+                          <a:ea typeface="Arial"/>
+                          <a:sym typeface="Arial"/>
                         </a:rPr>
                         <a:t>AÑO</a:t>
                       </a:r>
@@ -9298,10 +9298,10 @@
                               <a:alpha val="100000"/>
                             </a:srgbClr>
                           </a:solidFill>
-                          <a:latin typeface="DejaVu Sans"/>
-                          <a:cs typeface="DejaVu Sans"/>
-                          <a:ea typeface="DejaVu Sans"/>
-                          <a:sym typeface="DejaVu Sans"/>
+                          <a:latin typeface="Arial"/>
+                          <a:cs typeface="Arial"/>
+                          <a:ea typeface="Arial"/>
+                          <a:sym typeface="Arial"/>
                         </a:rPr>
                         <a:t>ESTRATO</a:t>
                       </a:r>
@@ -9366,10 +9366,10 @@
                               <a:alpha val="100000"/>
                             </a:srgbClr>
                           </a:solidFill>
-                          <a:latin typeface="DejaVu Sans"/>
-                          <a:cs typeface="DejaVu Sans"/>
-                          <a:ea typeface="DejaVu Sans"/>
-                          <a:sym typeface="DejaVu Sans"/>
+                          <a:latin typeface="Arial"/>
+                          <a:cs typeface="Arial"/>
+                          <a:ea typeface="Arial"/>
+                          <a:sym typeface="Arial"/>
                         </a:rPr>
                         <a:t>TASA_RENTA</a:t>
                       </a:r>
@@ -9411,7 +9411,7 @@
                   </a:tcPr>
                 </a:tc>
               </a:tr>
-              <a:tr h="366435">
+              <a:tr h="362888">
                 <a:tc>
                   <a:txBody>
                     <a:bodyPr/>
@@ -9436,10 +9436,10 @@
                               <a:alpha val="100000"/>
                             </a:srgbClr>
                           </a:solidFill>
-                          <a:latin typeface="DejaVu Sans"/>
-                          <a:cs typeface="DejaVu Sans"/>
-                          <a:ea typeface="DejaVu Sans"/>
-                          <a:sym typeface="DejaVu Sans"/>
+                          <a:latin typeface="Arial"/>
+                          <a:cs typeface="Arial"/>
+                          <a:ea typeface="Arial"/>
+                          <a:sym typeface="Arial"/>
                         </a:rPr>
                         <a:t>2017</a:t>
                       </a:r>
@@ -9504,10 +9504,10 @@
                               <a:alpha val="100000"/>
                             </a:srgbClr>
                           </a:solidFill>
-                          <a:latin typeface="DejaVu Sans"/>
-                          <a:cs typeface="DejaVu Sans"/>
-                          <a:ea typeface="DejaVu Sans"/>
-                          <a:sym typeface="DejaVu Sans"/>
+                          <a:latin typeface="Arial"/>
+                          <a:cs typeface="Arial"/>
+                          <a:ea typeface="Arial"/>
+                          <a:sym typeface="Arial"/>
                         </a:rPr>
                         <a:t>4</a:t>
                       </a:r>
@@ -9572,12 +9572,12 @@
                               <a:alpha val="100000"/>
                             </a:srgbClr>
                           </a:solidFill>
-                          <a:latin typeface="DejaVu Sans"/>
-                          <a:cs typeface="DejaVu Sans"/>
-                          <a:ea typeface="DejaVu Sans"/>
-                          <a:sym typeface="DejaVu Sans"/>
+                          <a:latin typeface="Arial"/>
+                          <a:cs typeface="Arial"/>
+                          <a:ea typeface="Arial"/>
+                          <a:sym typeface="Arial"/>
                         </a:rPr>
-                        <a:t>0.00489</a:t>
+                        <a:t>0.00491</a:t>
                       </a:r>
                     </a:p>
                   </a:txBody>
@@ -9617,7 +9617,7 @@
                   </a:tcPr>
                 </a:tc>
               </a:tr>
-              <a:tr h="366435">
+              <a:tr h="362888">
                 <a:tc>
                   <a:txBody>
                     <a:bodyPr/>
@@ -9642,10 +9642,10 @@
                               <a:alpha val="100000"/>
                             </a:srgbClr>
                           </a:solidFill>
-                          <a:latin typeface="DejaVu Sans"/>
-                          <a:cs typeface="DejaVu Sans"/>
-                          <a:ea typeface="DejaVu Sans"/>
-                          <a:sym typeface="DejaVu Sans"/>
+                          <a:latin typeface="Arial"/>
+                          <a:cs typeface="Arial"/>
+                          <a:ea typeface="Arial"/>
+                          <a:sym typeface="Arial"/>
                         </a:rPr>
                         <a:t>2018</a:t>
                       </a:r>
@@ -9710,10 +9710,10 @@
                               <a:alpha val="100000"/>
                             </a:srgbClr>
                           </a:solidFill>
-                          <a:latin typeface="DejaVu Sans"/>
-                          <a:cs typeface="DejaVu Sans"/>
-                          <a:ea typeface="DejaVu Sans"/>
-                          <a:sym typeface="DejaVu Sans"/>
+                          <a:latin typeface="Arial"/>
+                          <a:cs typeface="Arial"/>
+                          <a:ea typeface="Arial"/>
+                          <a:sym typeface="Arial"/>
                         </a:rPr>
                         <a:t>4</a:t>
                       </a:r>
@@ -9778,10 +9778,10 @@
                               <a:alpha val="100000"/>
                             </a:srgbClr>
                           </a:solidFill>
-                          <a:latin typeface="DejaVu Sans"/>
-                          <a:cs typeface="DejaVu Sans"/>
-                          <a:ea typeface="DejaVu Sans"/>
-                          <a:sym typeface="DejaVu Sans"/>
+                          <a:latin typeface="Arial"/>
+                          <a:cs typeface="Arial"/>
+                          <a:ea typeface="Arial"/>
+                          <a:sym typeface="Arial"/>
                         </a:rPr>
                         <a:t>0.00489</a:t>
                       </a:r>
@@ -9823,7 +9823,7 @@
                   </a:tcPr>
                 </a:tc>
               </a:tr>
-              <a:tr h="366435">
+              <a:tr h="362888">
                 <a:tc>
                   <a:txBody>
                     <a:bodyPr/>
@@ -9848,10 +9848,10 @@
                               <a:alpha val="100000"/>
                             </a:srgbClr>
                           </a:solidFill>
-                          <a:latin typeface="DejaVu Sans"/>
-                          <a:cs typeface="DejaVu Sans"/>
-                          <a:ea typeface="DejaVu Sans"/>
-                          <a:sym typeface="DejaVu Sans"/>
+                          <a:latin typeface="Arial"/>
+                          <a:cs typeface="Arial"/>
+                          <a:ea typeface="Arial"/>
+                          <a:sym typeface="Arial"/>
                         </a:rPr>
                         <a:t>2019</a:t>
                       </a:r>
@@ -9916,10 +9916,10 @@
                               <a:alpha val="100000"/>
                             </a:srgbClr>
                           </a:solidFill>
-                          <a:latin typeface="DejaVu Sans"/>
-                          <a:cs typeface="DejaVu Sans"/>
-                          <a:ea typeface="DejaVu Sans"/>
-                          <a:sym typeface="DejaVu Sans"/>
+                          <a:latin typeface="Arial"/>
+                          <a:cs typeface="Arial"/>
+                          <a:ea typeface="Arial"/>
+                          <a:sym typeface="Arial"/>
                         </a:rPr>
                         <a:t>4</a:t>
                       </a:r>
@@ -9984,12 +9984,12 @@
                               <a:alpha val="100000"/>
                             </a:srgbClr>
                           </a:solidFill>
-                          <a:latin typeface="DejaVu Sans"/>
-                          <a:cs typeface="DejaVu Sans"/>
-                          <a:ea typeface="DejaVu Sans"/>
-                          <a:sym typeface="DejaVu Sans"/>
+                          <a:latin typeface="Arial"/>
+                          <a:cs typeface="Arial"/>
+                          <a:ea typeface="Arial"/>
+                          <a:sym typeface="Arial"/>
                         </a:rPr>
-                        <a:t>0.00494</a:t>
+                        <a:t>0.00496</a:t>
                       </a:r>
                     </a:p>
                   </a:txBody>
@@ -10029,7 +10029,7 @@
                   </a:tcPr>
                 </a:tc>
               </a:tr>
-              <a:tr h="366435">
+              <a:tr h="362888">
                 <a:tc>
                   <a:txBody>
                     <a:bodyPr/>
@@ -10054,10 +10054,10 @@
                               <a:alpha val="100000"/>
                             </a:srgbClr>
                           </a:solidFill>
-                          <a:latin typeface="DejaVu Sans"/>
-                          <a:cs typeface="DejaVu Sans"/>
-                          <a:ea typeface="DejaVu Sans"/>
-                          <a:sym typeface="DejaVu Sans"/>
+                          <a:latin typeface="Arial"/>
+                          <a:cs typeface="Arial"/>
+                          <a:ea typeface="Arial"/>
+                          <a:sym typeface="Arial"/>
                         </a:rPr>
                         <a:t>2020</a:t>
                       </a:r>
@@ -10122,10 +10122,10 @@
                               <a:alpha val="100000"/>
                             </a:srgbClr>
                           </a:solidFill>
-                          <a:latin typeface="DejaVu Sans"/>
-                          <a:cs typeface="DejaVu Sans"/>
-                          <a:ea typeface="DejaVu Sans"/>
-                          <a:sym typeface="DejaVu Sans"/>
+                          <a:latin typeface="Arial"/>
+                          <a:cs typeface="Arial"/>
+                          <a:ea typeface="Arial"/>
+                          <a:sym typeface="Arial"/>
                         </a:rPr>
                         <a:t>4</a:t>
                       </a:r>
@@ -10190,12 +10190,12 @@
                               <a:alpha val="100000"/>
                             </a:srgbClr>
                           </a:solidFill>
-                          <a:latin typeface="DejaVu Sans"/>
-                          <a:cs typeface="DejaVu Sans"/>
-                          <a:ea typeface="DejaVu Sans"/>
-                          <a:sym typeface="DejaVu Sans"/>
+                          <a:latin typeface="Arial"/>
+                          <a:cs typeface="Arial"/>
+                          <a:ea typeface="Arial"/>
+                          <a:sym typeface="Arial"/>
                         </a:rPr>
-                        <a:t>0.00490</a:t>
+                        <a:t>0.00491</a:t>
                       </a:r>
                     </a:p>
                   </a:txBody>
@@ -10235,7 +10235,7 @@
                   </a:tcPr>
                 </a:tc>
               </a:tr>
-              <a:tr h="366435">
+              <a:tr h="362956">
                 <a:tc>
                   <a:txBody>
                     <a:bodyPr/>
@@ -10260,10 +10260,10 @@
                               <a:alpha val="100000"/>
                             </a:srgbClr>
                           </a:solidFill>
-                          <a:latin typeface="DejaVu Sans"/>
-                          <a:cs typeface="DejaVu Sans"/>
-                          <a:ea typeface="DejaVu Sans"/>
-                          <a:sym typeface="DejaVu Sans"/>
+                          <a:latin typeface="Arial"/>
+                          <a:cs typeface="Arial"/>
+                          <a:ea typeface="Arial"/>
+                          <a:sym typeface="Arial"/>
                         </a:rPr>
                         <a:t>2017</a:t>
                       </a:r>
@@ -10328,10 +10328,10 @@
                               <a:alpha val="100000"/>
                             </a:srgbClr>
                           </a:solidFill>
-                          <a:latin typeface="DejaVu Sans"/>
-                          <a:cs typeface="DejaVu Sans"/>
-                          <a:ea typeface="DejaVu Sans"/>
-                          <a:sym typeface="DejaVu Sans"/>
+                          <a:latin typeface="Arial"/>
+                          <a:cs typeface="Arial"/>
+                          <a:ea typeface="Arial"/>
+                          <a:sym typeface="Arial"/>
                         </a:rPr>
                         <a:t>5</a:t>
                       </a:r>
@@ -10396,12 +10396,12 @@
                               <a:alpha val="100000"/>
                             </a:srgbClr>
                           </a:solidFill>
-                          <a:latin typeface="DejaVu Sans"/>
-                          <a:cs typeface="DejaVu Sans"/>
-                          <a:ea typeface="DejaVu Sans"/>
-                          <a:sym typeface="DejaVu Sans"/>
+                          <a:latin typeface="Arial"/>
+                          <a:cs typeface="Arial"/>
+                          <a:ea typeface="Arial"/>
+                          <a:sym typeface="Arial"/>
                         </a:rPr>
-                        <a:t>0.00485</a:t>
+                        <a:t>0.00483</a:t>
                       </a:r>
                     </a:p>
                   </a:txBody>
@@ -10441,7 +10441,7 @@
                   </a:tcPr>
                 </a:tc>
               </a:tr>
-              <a:tr h="366435">
+              <a:tr h="362888">
                 <a:tc>
                   <a:txBody>
                     <a:bodyPr/>
@@ -10466,10 +10466,10 @@
                               <a:alpha val="100000"/>
                             </a:srgbClr>
                           </a:solidFill>
-                          <a:latin typeface="DejaVu Sans"/>
-                          <a:cs typeface="DejaVu Sans"/>
-                          <a:ea typeface="DejaVu Sans"/>
-                          <a:sym typeface="DejaVu Sans"/>
+                          <a:latin typeface="Arial"/>
+                          <a:cs typeface="Arial"/>
+                          <a:ea typeface="Arial"/>
+                          <a:sym typeface="Arial"/>
                         </a:rPr>
                         <a:t>2018</a:t>
                       </a:r>
@@ -10534,10 +10534,10 @@
                               <a:alpha val="100000"/>
                             </a:srgbClr>
                           </a:solidFill>
-                          <a:latin typeface="DejaVu Sans"/>
-                          <a:cs typeface="DejaVu Sans"/>
-                          <a:ea typeface="DejaVu Sans"/>
-                          <a:sym typeface="DejaVu Sans"/>
+                          <a:latin typeface="Arial"/>
+                          <a:cs typeface="Arial"/>
+                          <a:ea typeface="Arial"/>
+                          <a:sym typeface="Arial"/>
                         </a:rPr>
                         <a:t>5</a:t>
                       </a:r>
@@ -10602,12 +10602,12 @@
                               <a:alpha val="100000"/>
                             </a:srgbClr>
                           </a:solidFill>
-                          <a:latin typeface="DejaVu Sans"/>
-                          <a:cs typeface="DejaVu Sans"/>
-                          <a:ea typeface="DejaVu Sans"/>
-                          <a:sym typeface="DejaVu Sans"/>
+                          <a:latin typeface="Arial"/>
+                          <a:cs typeface="Arial"/>
+                          <a:ea typeface="Arial"/>
+                          <a:sym typeface="Arial"/>
                         </a:rPr>
-                        <a:t>0.00484</a:t>
+                        <a:t>0.00482</a:t>
                       </a:r>
                     </a:p>
                   </a:txBody>
@@ -10647,7 +10647,7 @@
                   </a:tcPr>
                 </a:tc>
               </a:tr>
-              <a:tr h="366435">
+              <a:tr h="362888">
                 <a:tc>
                   <a:txBody>
                     <a:bodyPr/>
@@ -10672,10 +10672,10 @@
                               <a:alpha val="100000"/>
                             </a:srgbClr>
                           </a:solidFill>
-                          <a:latin typeface="DejaVu Sans"/>
-                          <a:cs typeface="DejaVu Sans"/>
-                          <a:ea typeface="DejaVu Sans"/>
-                          <a:sym typeface="DejaVu Sans"/>
+                          <a:latin typeface="Arial"/>
+                          <a:cs typeface="Arial"/>
+                          <a:ea typeface="Arial"/>
+                          <a:sym typeface="Arial"/>
                         </a:rPr>
                         <a:t>2019</a:t>
                       </a:r>
@@ -10740,10 +10740,10 @@
                               <a:alpha val="100000"/>
                             </a:srgbClr>
                           </a:solidFill>
-                          <a:latin typeface="DejaVu Sans"/>
-                          <a:cs typeface="DejaVu Sans"/>
-                          <a:ea typeface="DejaVu Sans"/>
-                          <a:sym typeface="DejaVu Sans"/>
+                          <a:latin typeface="Arial"/>
+                          <a:cs typeface="Arial"/>
+                          <a:ea typeface="Arial"/>
+                          <a:sym typeface="Arial"/>
                         </a:rPr>
                         <a:t>5</a:t>
                       </a:r>
@@ -10808,12 +10808,12 @@
                               <a:alpha val="100000"/>
                             </a:srgbClr>
                           </a:solidFill>
-                          <a:latin typeface="DejaVu Sans"/>
-                          <a:cs typeface="DejaVu Sans"/>
-                          <a:ea typeface="DejaVu Sans"/>
-                          <a:sym typeface="DejaVu Sans"/>
+                          <a:latin typeface="Arial"/>
+                          <a:cs typeface="Arial"/>
+                          <a:ea typeface="Arial"/>
+                          <a:sym typeface="Arial"/>
                         </a:rPr>
-                        <a:t>0.00489</a:t>
+                        <a:t>0.00488</a:t>
                       </a:r>
                     </a:p>
                   </a:txBody>
@@ -10853,7 +10853,7 @@
                   </a:tcPr>
                 </a:tc>
               </a:tr>
-              <a:tr h="366435">
+              <a:tr h="362956">
                 <a:tc>
                   <a:txBody>
                     <a:bodyPr/>
@@ -10878,10 +10878,10 @@
                               <a:alpha val="100000"/>
                             </a:srgbClr>
                           </a:solidFill>
-                          <a:latin typeface="DejaVu Sans"/>
-                          <a:cs typeface="DejaVu Sans"/>
-                          <a:ea typeface="DejaVu Sans"/>
-                          <a:sym typeface="DejaVu Sans"/>
+                          <a:latin typeface="Arial"/>
+                          <a:cs typeface="Arial"/>
+                          <a:ea typeface="Arial"/>
+                          <a:sym typeface="Arial"/>
                         </a:rPr>
                         <a:t>2020</a:t>
                       </a:r>
@@ -10946,10 +10946,10 @@
                               <a:alpha val="100000"/>
                             </a:srgbClr>
                           </a:solidFill>
-                          <a:latin typeface="DejaVu Sans"/>
-                          <a:cs typeface="DejaVu Sans"/>
-                          <a:ea typeface="DejaVu Sans"/>
-                          <a:sym typeface="DejaVu Sans"/>
+                          <a:latin typeface="Arial"/>
+                          <a:cs typeface="Arial"/>
+                          <a:ea typeface="Arial"/>
+                          <a:sym typeface="Arial"/>
                         </a:rPr>
                         <a:t>5</a:t>
                       </a:r>
@@ -11014,12 +11014,12 @@
                               <a:alpha val="100000"/>
                             </a:srgbClr>
                           </a:solidFill>
-                          <a:latin typeface="DejaVu Sans"/>
-                          <a:cs typeface="DejaVu Sans"/>
-                          <a:ea typeface="DejaVu Sans"/>
-                          <a:sym typeface="DejaVu Sans"/>
+                          <a:latin typeface="Arial"/>
+                          <a:cs typeface="Arial"/>
+                          <a:ea typeface="Arial"/>
+                          <a:sym typeface="Arial"/>
                         </a:rPr>
-                        <a:t>0.00485</a:t>
+                        <a:t>0.00483</a:t>
                       </a:r>
                     </a:p>
                   </a:txBody>
@@ -11059,7 +11059,7 @@
                   </a:tcPr>
                 </a:tc>
               </a:tr>
-              <a:tr h="366435">
+              <a:tr h="362888">
                 <a:tc>
                   <a:txBody>
                     <a:bodyPr/>
@@ -11084,10 +11084,10 @@
                               <a:alpha val="100000"/>
                             </a:srgbClr>
                           </a:solidFill>
-                          <a:latin typeface="DejaVu Sans"/>
-                          <a:cs typeface="DejaVu Sans"/>
-                          <a:ea typeface="DejaVu Sans"/>
-                          <a:sym typeface="DejaVu Sans"/>
+                          <a:latin typeface="Arial"/>
+                          <a:cs typeface="Arial"/>
+                          <a:ea typeface="Arial"/>
+                          <a:sym typeface="Arial"/>
                         </a:rPr>
                         <a:t>2017</a:t>
                       </a:r>
@@ -11152,10 +11152,10 @@
                               <a:alpha val="100000"/>
                             </a:srgbClr>
                           </a:solidFill>
-                          <a:latin typeface="DejaVu Sans"/>
-                          <a:cs typeface="DejaVu Sans"/>
-                          <a:ea typeface="DejaVu Sans"/>
-                          <a:sym typeface="DejaVu Sans"/>
+                          <a:latin typeface="Arial"/>
+                          <a:cs typeface="Arial"/>
+                          <a:ea typeface="Arial"/>
+                          <a:sym typeface="Arial"/>
                         </a:rPr>
                         <a:t>6</a:t>
                       </a:r>
@@ -11220,10 +11220,10 @@
                               <a:alpha val="100000"/>
                             </a:srgbClr>
                           </a:solidFill>
-                          <a:latin typeface="DejaVu Sans"/>
-                          <a:cs typeface="DejaVu Sans"/>
-                          <a:ea typeface="DejaVu Sans"/>
-                          <a:sym typeface="DejaVu Sans"/>
+                          <a:latin typeface="Arial"/>
+                          <a:cs typeface="Arial"/>
+                          <a:ea typeface="Arial"/>
+                          <a:sym typeface="Arial"/>
                         </a:rPr>
                         <a:t>0.00459</a:t>
                       </a:r>
@@ -11265,7 +11265,7 @@
                   </a:tcPr>
                 </a:tc>
               </a:tr>
-              <a:tr h="366435">
+              <a:tr h="362888">
                 <a:tc>
                   <a:txBody>
                     <a:bodyPr/>
@@ -11290,10 +11290,10 @@
                               <a:alpha val="100000"/>
                             </a:srgbClr>
                           </a:solidFill>
-                          <a:latin typeface="DejaVu Sans"/>
-                          <a:cs typeface="DejaVu Sans"/>
-                          <a:ea typeface="DejaVu Sans"/>
-                          <a:sym typeface="DejaVu Sans"/>
+                          <a:latin typeface="Arial"/>
+                          <a:cs typeface="Arial"/>
+                          <a:ea typeface="Arial"/>
+                          <a:sym typeface="Arial"/>
                         </a:rPr>
                         <a:t>2018</a:t>
                       </a:r>
@@ -11358,10 +11358,10 @@
                               <a:alpha val="100000"/>
                             </a:srgbClr>
                           </a:solidFill>
-                          <a:latin typeface="DejaVu Sans"/>
-                          <a:cs typeface="DejaVu Sans"/>
-                          <a:ea typeface="DejaVu Sans"/>
-                          <a:sym typeface="DejaVu Sans"/>
+                          <a:latin typeface="Arial"/>
+                          <a:cs typeface="Arial"/>
+                          <a:ea typeface="Arial"/>
+                          <a:sym typeface="Arial"/>
                         </a:rPr>
                         <a:t>6</a:t>
                       </a:r>
@@ -11426,12 +11426,12 @@
                               <a:alpha val="100000"/>
                             </a:srgbClr>
                           </a:solidFill>
-                          <a:latin typeface="DejaVu Sans"/>
-                          <a:cs typeface="DejaVu Sans"/>
-                          <a:ea typeface="DejaVu Sans"/>
-                          <a:sym typeface="DejaVu Sans"/>
+                          <a:latin typeface="Arial"/>
+                          <a:cs typeface="Arial"/>
+                          <a:ea typeface="Arial"/>
+                          <a:sym typeface="Arial"/>
                         </a:rPr>
-                        <a:t>0.00459</a:t>
+                        <a:t>0.00457</a:t>
                       </a:r>
                     </a:p>
                   </a:txBody>
@@ -11471,7 +11471,7 @@
                   </a:tcPr>
                 </a:tc>
               </a:tr>
-              <a:tr h="366435">
+              <a:tr h="362956">
                 <a:tc>
                   <a:txBody>
                     <a:bodyPr/>
@@ -11496,10 +11496,10 @@
                               <a:alpha val="100000"/>
                             </a:srgbClr>
                           </a:solidFill>
-                          <a:latin typeface="DejaVu Sans"/>
-                          <a:cs typeface="DejaVu Sans"/>
-                          <a:ea typeface="DejaVu Sans"/>
-                          <a:sym typeface="DejaVu Sans"/>
+                          <a:latin typeface="Arial"/>
+                          <a:cs typeface="Arial"/>
+                          <a:ea typeface="Arial"/>
+                          <a:sym typeface="Arial"/>
                         </a:rPr>
                         <a:t>2019</a:t>
                       </a:r>
@@ -11564,10 +11564,10 @@
                               <a:alpha val="100000"/>
                             </a:srgbClr>
                           </a:solidFill>
-                          <a:latin typeface="DejaVu Sans"/>
-                          <a:cs typeface="DejaVu Sans"/>
-                          <a:ea typeface="DejaVu Sans"/>
-                          <a:sym typeface="DejaVu Sans"/>
+                          <a:latin typeface="Arial"/>
+                          <a:cs typeface="Arial"/>
+                          <a:ea typeface="Arial"/>
+                          <a:sym typeface="Arial"/>
                         </a:rPr>
                         <a:t>6</a:t>
                       </a:r>
@@ -11632,10 +11632,10 @@
                               <a:alpha val="100000"/>
                             </a:srgbClr>
                           </a:solidFill>
-                          <a:latin typeface="DejaVu Sans"/>
-                          <a:cs typeface="DejaVu Sans"/>
-                          <a:ea typeface="DejaVu Sans"/>
-                          <a:sym typeface="DejaVu Sans"/>
+                          <a:latin typeface="Arial"/>
+                          <a:cs typeface="Arial"/>
+                          <a:ea typeface="Arial"/>
+                          <a:sym typeface="Arial"/>
                         </a:rPr>
                         <a:t>0.00463</a:t>
                       </a:r>
@@ -11677,7 +11677,7 @@
                   </a:tcPr>
                 </a:tc>
               </a:tr>
-              <a:tr h="366435">
+              <a:tr h="362888">
                 <a:tc>
                   <a:txBody>
                     <a:bodyPr/>
@@ -11702,10 +11702,10 @@
                               <a:alpha val="100000"/>
                             </a:srgbClr>
                           </a:solidFill>
-                          <a:latin typeface="DejaVu Sans"/>
-                          <a:cs typeface="DejaVu Sans"/>
-                          <a:ea typeface="DejaVu Sans"/>
-                          <a:sym typeface="DejaVu Sans"/>
+                          <a:latin typeface="Arial"/>
+                          <a:cs typeface="Arial"/>
+                          <a:ea typeface="Arial"/>
+                          <a:sym typeface="Arial"/>
                         </a:rPr>
                         <a:t>2020</a:t>
                       </a:r>
@@ -11770,10 +11770,10 @@
                               <a:alpha val="100000"/>
                             </a:srgbClr>
                           </a:solidFill>
-                          <a:latin typeface="DejaVu Sans"/>
-                          <a:cs typeface="DejaVu Sans"/>
-                          <a:ea typeface="DejaVu Sans"/>
-                          <a:sym typeface="DejaVu Sans"/>
+                          <a:latin typeface="Arial"/>
+                          <a:cs typeface="Arial"/>
+                          <a:ea typeface="Arial"/>
+                          <a:sym typeface="Arial"/>
                         </a:rPr>
                         <a:t>6</a:t>
                       </a:r>
@@ -11838,12 +11838,12 @@
                               <a:alpha val="100000"/>
                             </a:srgbClr>
                           </a:solidFill>
-                          <a:latin typeface="DejaVu Sans"/>
-                          <a:cs typeface="DejaVu Sans"/>
-                          <a:ea typeface="DejaVu Sans"/>
-                          <a:sym typeface="DejaVu Sans"/>
+                          <a:latin typeface="Arial"/>
+                          <a:cs typeface="Arial"/>
+                          <a:ea typeface="Arial"/>
+                          <a:sym typeface="Arial"/>
                         </a:rPr>
-                        <a:t>0.00460</a:t>
+                        <a:t>0.00459</a:t>
                       </a:r>
                     </a:p>
                   </a:txBody>
@@ -12681,11 +12681,11 @@
             <a:tbl>
               <a:tblPr/>
               <a:tblGrid>
-                <a:gridCol w="616299"/>
-                <a:gridCol w="910979"/>
-                <a:gridCol w="1166504"/>
+                <a:gridCol w="571551"/>
+                <a:gridCol w="920528"/>
+                <a:gridCol w="1176804"/>
               </a:tblGrid>
-              <a:tr h="397404">
+              <a:tr h="390241">
                 <a:tc>
                   <a:txBody>
                     <a:bodyPr/>
@@ -12710,10 +12710,10 @@
                               <a:alpha val="100000"/>
                             </a:srgbClr>
                           </a:solidFill>
-                          <a:latin typeface="DejaVu Sans"/>
-                          <a:cs typeface="DejaVu Sans"/>
-                          <a:ea typeface="DejaVu Sans"/>
-                          <a:sym typeface="DejaVu Sans"/>
+                          <a:latin typeface="Arial"/>
+                          <a:cs typeface="Arial"/>
+                          <a:ea typeface="Arial"/>
+                          <a:sym typeface="Arial"/>
                         </a:rPr>
                         <a:t>AÑO</a:t>
                       </a:r>
@@ -12778,10 +12778,10 @@
                               <a:alpha val="100000"/>
                             </a:srgbClr>
                           </a:solidFill>
-                          <a:latin typeface="DejaVu Sans"/>
-                          <a:cs typeface="DejaVu Sans"/>
-                          <a:ea typeface="DejaVu Sans"/>
-                          <a:sym typeface="DejaVu Sans"/>
+                          <a:latin typeface="Arial"/>
+                          <a:cs typeface="Arial"/>
+                          <a:ea typeface="Arial"/>
+                          <a:sym typeface="Arial"/>
                         </a:rPr>
                         <a:t>ESTRATO</a:t>
                       </a:r>
@@ -12846,10 +12846,10 @@
                               <a:alpha val="100000"/>
                             </a:srgbClr>
                           </a:solidFill>
-                          <a:latin typeface="DejaVu Sans"/>
-                          <a:cs typeface="DejaVu Sans"/>
-                          <a:ea typeface="DejaVu Sans"/>
-                          <a:sym typeface="DejaVu Sans"/>
+                          <a:latin typeface="Arial"/>
+                          <a:cs typeface="Arial"/>
+                          <a:ea typeface="Arial"/>
+                          <a:sym typeface="Arial"/>
                         </a:rPr>
                         <a:t>TASA_RENTA</a:t>
                       </a:r>
@@ -12891,7 +12891,7 @@
                   </a:tcPr>
                 </a:tc>
               </a:tr>
-              <a:tr h="366435">
+              <a:tr h="362888">
                 <a:tc>
                   <a:txBody>
                     <a:bodyPr/>
@@ -12916,10 +12916,10 @@
                               <a:alpha val="100000"/>
                             </a:srgbClr>
                           </a:solidFill>
-                          <a:latin typeface="DejaVu Sans"/>
-                          <a:cs typeface="DejaVu Sans"/>
-                          <a:ea typeface="DejaVu Sans"/>
-                          <a:sym typeface="DejaVu Sans"/>
+                          <a:latin typeface="Arial"/>
+                          <a:cs typeface="Arial"/>
+                          <a:ea typeface="Arial"/>
+                          <a:sym typeface="Arial"/>
                         </a:rPr>
                         <a:t>2017</a:t>
                       </a:r>
@@ -12984,10 +12984,10 @@
                               <a:alpha val="100000"/>
                             </a:srgbClr>
                           </a:solidFill>
-                          <a:latin typeface="DejaVu Sans"/>
-                          <a:cs typeface="DejaVu Sans"/>
-                          <a:ea typeface="DejaVu Sans"/>
-                          <a:sym typeface="DejaVu Sans"/>
+                          <a:latin typeface="Arial"/>
+                          <a:cs typeface="Arial"/>
+                          <a:ea typeface="Arial"/>
+                          <a:sym typeface="Arial"/>
                         </a:rPr>
                         <a:t>1</a:t>
                       </a:r>
@@ -13052,10 +13052,10 @@
                               <a:alpha val="100000"/>
                             </a:srgbClr>
                           </a:solidFill>
-                          <a:latin typeface="DejaVu Sans"/>
-                          <a:cs typeface="DejaVu Sans"/>
-                          <a:ea typeface="DejaVu Sans"/>
-                          <a:sym typeface="DejaVu Sans"/>
+                          <a:latin typeface="Arial"/>
+                          <a:cs typeface="Arial"/>
+                          <a:ea typeface="Arial"/>
+                          <a:sym typeface="Arial"/>
                         </a:rPr>
                         <a:t>0.00590</a:t>
                       </a:r>
@@ -13097,7 +13097,7 @@
                   </a:tcPr>
                 </a:tc>
               </a:tr>
-              <a:tr h="366435">
+              <a:tr h="362888">
                 <a:tc>
                   <a:txBody>
                     <a:bodyPr/>
@@ -13122,10 +13122,10 @@
                               <a:alpha val="100000"/>
                             </a:srgbClr>
                           </a:solidFill>
-                          <a:latin typeface="DejaVu Sans"/>
-                          <a:cs typeface="DejaVu Sans"/>
-                          <a:ea typeface="DejaVu Sans"/>
-                          <a:sym typeface="DejaVu Sans"/>
+                          <a:latin typeface="Arial"/>
+                          <a:cs typeface="Arial"/>
+                          <a:ea typeface="Arial"/>
+                          <a:sym typeface="Arial"/>
                         </a:rPr>
                         <a:t>2018</a:t>
                       </a:r>
@@ -13190,10 +13190,10 @@
                               <a:alpha val="100000"/>
                             </a:srgbClr>
                           </a:solidFill>
-                          <a:latin typeface="DejaVu Sans"/>
-                          <a:cs typeface="DejaVu Sans"/>
-                          <a:ea typeface="DejaVu Sans"/>
-                          <a:sym typeface="DejaVu Sans"/>
+                          <a:latin typeface="Arial"/>
+                          <a:cs typeface="Arial"/>
+                          <a:ea typeface="Arial"/>
+                          <a:sym typeface="Arial"/>
                         </a:rPr>
                         <a:t>1</a:t>
                       </a:r>
@@ -13258,10 +13258,10 @@
                               <a:alpha val="100000"/>
                             </a:srgbClr>
                           </a:solidFill>
-                          <a:latin typeface="DejaVu Sans"/>
-                          <a:cs typeface="DejaVu Sans"/>
-                          <a:ea typeface="DejaVu Sans"/>
-                          <a:sym typeface="DejaVu Sans"/>
+                          <a:latin typeface="Arial"/>
+                          <a:cs typeface="Arial"/>
+                          <a:ea typeface="Arial"/>
+                          <a:sym typeface="Arial"/>
                         </a:rPr>
                         <a:t>0.00581</a:t>
                       </a:r>
@@ -13303,7 +13303,7 @@
                   </a:tcPr>
                 </a:tc>
               </a:tr>
-              <a:tr h="366435">
+              <a:tr h="362888">
                 <a:tc>
                   <a:txBody>
                     <a:bodyPr/>
@@ -13328,10 +13328,10 @@
                               <a:alpha val="100000"/>
                             </a:srgbClr>
                           </a:solidFill>
-                          <a:latin typeface="DejaVu Sans"/>
-                          <a:cs typeface="DejaVu Sans"/>
-                          <a:ea typeface="DejaVu Sans"/>
-                          <a:sym typeface="DejaVu Sans"/>
+                          <a:latin typeface="Arial"/>
+                          <a:cs typeface="Arial"/>
+                          <a:ea typeface="Arial"/>
+                          <a:sym typeface="Arial"/>
                         </a:rPr>
                         <a:t>2019</a:t>
                       </a:r>
@@ -13396,10 +13396,10 @@
                               <a:alpha val="100000"/>
                             </a:srgbClr>
                           </a:solidFill>
-                          <a:latin typeface="DejaVu Sans"/>
-                          <a:cs typeface="DejaVu Sans"/>
-                          <a:ea typeface="DejaVu Sans"/>
-                          <a:sym typeface="DejaVu Sans"/>
+                          <a:latin typeface="Arial"/>
+                          <a:cs typeface="Arial"/>
+                          <a:ea typeface="Arial"/>
+                          <a:sym typeface="Arial"/>
                         </a:rPr>
                         <a:t>1</a:t>
                       </a:r>
@@ -13464,10 +13464,10 @@
                               <a:alpha val="100000"/>
                             </a:srgbClr>
                           </a:solidFill>
-                          <a:latin typeface="DejaVu Sans"/>
-                          <a:cs typeface="DejaVu Sans"/>
-                          <a:ea typeface="DejaVu Sans"/>
-                          <a:sym typeface="DejaVu Sans"/>
+                          <a:latin typeface="Arial"/>
+                          <a:cs typeface="Arial"/>
+                          <a:ea typeface="Arial"/>
+                          <a:sym typeface="Arial"/>
                         </a:rPr>
                         <a:t>0.00597</a:t>
                       </a:r>
@@ -13509,7 +13509,7 @@
                   </a:tcPr>
                 </a:tc>
               </a:tr>
-              <a:tr h="366435">
+              <a:tr h="362888">
                 <a:tc>
                   <a:txBody>
                     <a:bodyPr/>
@@ -13534,10 +13534,10 @@
                               <a:alpha val="100000"/>
                             </a:srgbClr>
                           </a:solidFill>
-                          <a:latin typeface="DejaVu Sans"/>
-                          <a:cs typeface="DejaVu Sans"/>
-                          <a:ea typeface="DejaVu Sans"/>
-                          <a:sym typeface="DejaVu Sans"/>
+                          <a:latin typeface="Arial"/>
+                          <a:cs typeface="Arial"/>
+                          <a:ea typeface="Arial"/>
+                          <a:sym typeface="Arial"/>
                         </a:rPr>
                         <a:t>2020</a:t>
                       </a:r>
@@ -13602,10 +13602,10 @@
                               <a:alpha val="100000"/>
                             </a:srgbClr>
                           </a:solidFill>
-                          <a:latin typeface="DejaVu Sans"/>
-                          <a:cs typeface="DejaVu Sans"/>
-                          <a:ea typeface="DejaVu Sans"/>
-                          <a:sym typeface="DejaVu Sans"/>
+                          <a:latin typeface="Arial"/>
+                          <a:cs typeface="Arial"/>
+                          <a:ea typeface="Arial"/>
+                          <a:sym typeface="Arial"/>
                         </a:rPr>
                         <a:t>1</a:t>
                       </a:r>
@@ -13670,10 +13670,10 @@
                               <a:alpha val="100000"/>
                             </a:srgbClr>
                           </a:solidFill>
-                          <a:latin typeface="DejaVu Sans"/>
-                          <a:cs typeface="DejaVu Sans"/>
-                          <a:ea typeface="DejaVu Sans"/>
-                          <a:sym typeface="DejaVu Sans"/>
+                          <a:latin typeface="Arial"/>
+                          <a:cs typeface="Arial"/>
+                          <a:ea typeface="Arial"/>
+                          <a:sym typeface="Arial"/>
                         </a:rPr>
                         <a:t>0.00569</a:t>
                       </a:r>
@@ -13715,7 +13715,7 @@
                   </a:tcPr>
                 </a:tc>
               </a:tr>
-              <a:tr h="366435">
+              <a:tr h="362956">
                 <a:tc>
                   <a:txBody>
                     <a:bodyPr/>
@@ -13740,10 +13740,10 @@
                               <a:alpha val="100000"/>
                             </a:srgbClr>
                           </a:solidFill>
-                          <a:latin typeface="DejaVu Sans"/>
-                          <a:cs typeface="DejaVu Sans"/>
-                          <a:ea typeface="DejaVu Sans"/>
-                          <a:sym typeface="DejaVu Sans"/>
+                          <a:latin typeface="Arial"/>
+                          <a:cs typeface="Arial"/>
+                          <a:ea typeface="Arial"/>
+                          <a:sym typeface="Arial"/>
                         </a:rPr>
                         <a:t>2017</a:t>
                       </a:r>
@@ -13808,10 +13808,10 @@
                               <a:alpha val="100000"/>
                             </a:srgbClr>
                           </a:solidFill>
-                          <a:latin typeface="DejaVu Sans"/>
-                          <a:cs typeface="DejaVu Sans"/>
-                          <a:ea typeface="DejaVu Sans"/>
-                          <a:sym typeface="DejaVu Sans"/>
+                          <a:latin typeface="Arial"/>
+                          <a:cs typeface="Arial"/>
+                          <a:ea typeface="Arial"/>
+                          <a:sym typeface="Arial"/>
                         </a:rPr>
                         <a:t>2</a:t>
                       </a:r>
@@ -13876,10 +13876,10 @@
                               <a:alpha val="100000"/>
                             </a:srgbClr>
                           </a:solidFill>
-                          <a:latin typeface="DejaVu Sans"/>
-                          <a:cs typeface="DejaVu Sans"/>
-                          <a:ea typeface="DejaVu Sans"/>
-                          <a:sym typeface="DejaVu Sans"/>
+                          <a:latin typeface="Arial"/>
+                          <a:cs typeface="Arial"/>
+                          <a:ea typeface="Arial"/>
+                          <a:sym typeface="Arial"/>
                         </a:rPr>
                         <a:t>0.00532</a:t>
                       </a:r>
@@ -13921,7 +13921,7 @@
                   </a:tcPr>
                 </a:tc>
               </a:tr>
-              <a:tr h="366435">
+              <a:tr h="362888">
                 <a:tc>
                   <a:txBody>
                     <a:bodyPr/>
@@ -13946,10 +13946,10 @@
                               <a:alpha val="100000"/>
                             </a:srgbClr>
                           </a:solidFill>
-                          <a:latin typeface="DejaVu Sans"/>
-                          <a:cs typeface="DejaVu Sans"/>
-                          <a:ea typeface="DejaVu Sans"/>
-                          <a:sym typeface="DejaVu Sans"/>
+                          <a:latin typeface="Arial"/>
+                          <a:cs typeface="Arial"/>
+                          <a:ea typeface="Arial"/>
+                          <a:sym typeface="Arial"/>
                         </a:rPr>
                         <a:t>2018</a:t>
                       </a:r>
@@ -14014,10 +14014,10 @@
                               <a:alpha val="100000"/>
                             </a:srgbClr>
                           </a:solidFill>
-                          <a:latin typeface="DejaVu Sans"/>
-                          <a:cs typeface="DejaVu Sans"/>
-                          <a:ea typeface="DejaVu Sans"/>
-                          <a:sym typeface="DejaVu Sans"/>
+                          <a:latin typeface="Arial"/>
+                          <a:cs typeface="Arial"/>
+                          <a:ea typeface="Arial"/>
+                          <a:sym typeface="Arial"/>
                         </a:rPr>
                         <a:t>2</a:t>
                       </a:r>
@@ -14082,10 +14082,10 @@
                               <a:alpha val="100000"/>
                             </a:srgbClr>
                           </a:solidFill>
-                          <a:latin typeface="DejaVu Sans"/>
-                          <a:cs typeface="DejaVu Sans"/>
-                          <a:ea typeface="DejaVu Sans"/>
-                          <a:sym typeface="DejaVu Sans"/>
+                          <a:latin typeface="Arial"/>
+                          <a:cs typeface="Arial"/>
+                          <a:ea typeface="Arial"/>
+                          <a:sym typeface="Arial"/>
                         </a:rPr>
                         <a:t>0.00524</a:t>
                       </a:r>
@@ -14127,7 +14127,7 @@
                   </a:tcPr>
                 </a:tc>
               </a:tr>
-              <a:tr h="366435">
+              <a:tr h="362956">
                 <a:tc>
                   <a:txBody>
                     <a:bodyPr/>
@@ -14152,10 +14152,10 @@
                               <a:alpha val="100000"/>
                             </a:srgbClr>
                           </a:solidFill>
-                          <a:latin typeface="DejaVu Sans"/>
-                          <a:cs typeface="DejaVu Sans"/>
-                          <a:ea typeface="DejaVu Sans"/>
-                          <a:sym typeface="DejaVu Sans"/>
+                          <a:latin typeface="Arial"/>
+                          <a:cs typeface="Arial"/>
+                          <a:ea typeface="Arial"/>
+                          <a:sym typeface="Arial"/>
                         </a:rPr>
                         <a:t>2019</a:t>
                       </a:r>
@@ -14220,10 +14220,10 @@
                               <a:alpha val="100000"/>
                             </a:srgbClr>
                           </a:solidFill>
-                          <a:latin typeface="DejaVu Sans"/>
-                          <a:cs typeface="DejaVu Sans"/>
-                          <a:ea typeface="DejaVu Sans"/>
-                          <a:sym typeface="DejaVu Sans"/>
+                          <a:latin typeface="Arial"/>
+                          <a:cs typeface="Arial"/>
+                          <a:ea typeface="Arial"/>
+                          <a:sym typeface="Arial"/>
                         </a:rPr>
                         <a:t>2</a:t>
                       </a:r>
@@ -14288,10 +14288,10 @@
                               <a:alpha val="100000"/>
                             </a:srgbClr>
                           </a:solidFill>
-                          <a:latin typeface="DejaVu Sans"/>
-                          <a:cs typeface="DejaVu Sans"/>
-                          <a:ea typeface="DejaVu Sans"/>
-                          <a:sym typeface="DejaVu Sans"/>
+                          <a:latin typeface="Arial"/>
+                          <a:cs typeface="Arial"/>
+                          <a:ea typeface="Arial"/>
+                          <a:sym typeface="Arial"/>
                         </a:rPr>
                         <a:t>0.00538</a:t>
                       </a:r>
@@ -14333,7 +14333,7 @@
                   </a:tcPr>
                 </a:tc>
               </a:tr>
-              <a:tr h="366435">
+              <a:tr h="362888">
                 <a:tc>
                   <a:txBody>
                     <a:bodyPr/>
@@ -14358,10 +14358,10 @@
                               <a:alpha val="100000"/>
                             </a:srgbClr>
                           </a:solidFill>
-                          <a:latin typeface="DejaVu Sans"/>
-                          <a:cs typeface="DejaVu Sans"/>
-                          <a:ea typeface="DejaVu Sans"/>
-                          <a:sym typeface="DejaVu Sans"/>
+                          <a:latin typeface="Arial"/>
+                          <a:cs typeface="Arial"/>
+                          <a:ea typeface="Arial"/>
+                          <a:sym typeface="Arial"/>
                         </a:rPr>
                         <a:t>2020</a:t>
                       </a:r>
@@ -14426,10 +14426,10 @@
                               <a:alpha val="100000"/>
                             </a:srgbClr>
                           </a:solidFill>
-                          <a:latin typeface="DejaVu Sans"/>
-                          <a:cs typeface="DejaVu Sans"/>
-                          <a:ea typeface="DejaVu Sans"/>
-                          <a:sym typeface="DejaVu Sans"/>
+                          <a:latin typeface="Arial"/>
+                          <a:cs typeface="Arial"/>
+                          <a:ea typeface="Arial"/>
+                          <a:sym typeface="Arial"/>
                         </a:rPr>
                         <a:t>2</a:t>
                       </a:r>
@@ -14494,10 +14494,10 @@
                               <a:alpha val="100000"/>
                             </a:srgbClr>
                           </a:solidFill>
-                          <a:latin typeface="DejaVu Sans"/>
-                          <a:cs typeface="DejaVu Sans"/>
-                          <a:ea typeface="DejaVu Sans"/>
-                          <a:sym typeface="DejaVu Sans"/>
+                          <a:latin typeface="Arial"/>
+                          <a:cs typeface="Arial"/>
+                          <a:ea typeface="Arial"/>
+                          <a:sym typeface="Arial"/>
                         </a:rPr>
                         <a:t>0.00515</a:t>
                       </a:r>
@@ -14539,7 +14539,7 @@
                   </a:tcPr>
                 </a:tc>
               </a:tr>
-              <a:tr h="366435">
+              <a:tr h="362956">
                 <a:tc>
                   <a:txBody>
                     <a:bodyPr/>
@@ -14564,10 +14564,10 @@
                               <a:alpha val="100000"/>
                             </a:srgbClr>
                           </a:solidFill>
-                          <a:latin typeface="DejaVu Sans"/>
-                          <a:cs typeface="DejaVu Sans"/>
-                          <a:ea typeface="DejaVu Sans"/>
-                          <a:sym typeface="DejaVu Sans"/>
+                          <a:latin typeface="Arial"/>
+                          <a:cs typeface="Arial"/>
+                          <a:ea typeface="Arial"/>
+                          <a:sym typeface="Arial"/>
                         </a:rPr>
                         <a:t>2017</a:t>
                       </a:r>
@@ -14632,10 +14632,10 @@
                               <a:alpha val="100000"/>
                             </a:srgbClr>
                           </a:solidFill>
-                          <a:latin typeface="DejaVu Sans"/>
-                          <a:cs typeface="DejaVu Sans"/>
-                          <a:ea typeface="DejaVu Sans"/>
-                          <a:sym typeface="DejaVu Sans"/>
+                          <a:latin typeface="Arial"/>
+                          <a:cs typeface="Arial"/>
+                          <a:ea typeface="Arial"/>
+                          <a:sym typeface="Arial"/>
                         </a:rPr>
                         <a:t>3</a:t>
                       </a:r>
@@ -14700,10 +14700,10 @@
                               <a:alpha val="100000"/>
                             </a:srgbClr>
                           </a:solidFill>
-                          <a:latin typeface="DejaVu Sans"/>
-                          <a:cs typeface="DejaVu Sans"/>
-                          <a:ea typeface="DejaVu Sans"/>
-                          <a:sym typeface="DejaVu Sans"/>
+                          <a:latin typeface="Arial"/>
+                          <a:cs typeface="Arial"/>
+                          <a:ea typeface="Arial"/>
+                          <a:sym typeface="Arial"/>
                         </a:rPr>
                         <a:t>0.00491</a:t>
                       </a:r>
@@ -14745,7 +14745,7 @@
                   </a:tcPr>
                 </a:tc>
               </a:tr>
-              <a:tr h="366435">
+              <a:tr h="362956">
                 <a:tc>
                   <a:txBody>
                     <a:bodyPr/>
@@ -14770,10 +14770,10 @@
                               <a:alpha val="100000"/>
                             </a:srgbClr>
                           </a:solidFill>
-                          <a:latin typeface="DejaVu Sans"/>
-                          <a:cs typeface="DejaVu Sans"/>
-                          <a:ea typeface="DejaVu Sans"/>
-                          <a:sym typeface="DejaVu Sans"/>
+                          <a:latin typeface="Arial"/>
+                          <a:cs typeface="Arial"/>
+                          <a:ea typeface="Arial"/>
+                          <a:sym typeface="Arial"/>
                         </a:rPr>
                         <a:t>2018</a:t>
                       </a:r>
@@ -14838,10 +14838,10 @@
                               <a:alpha val="100000"/>
                             </a:srgbClr>
                           </a:solidFill>
-                          <a:latin typeface="DejaVu Sans"/>
-                          <a:cs typeface="DejaVu Sans"/>
-                          <a:ea typeface="DejaVu Sans"/>
-                          <a:sym typeface="DejaVu Sans"/>
+                          <a:latin typeface="Arial"/>
+                          <a:cs typeface="Arial"/>
+                          <a:ea typeface="Arial"/>
+                          <a:sym typeface="Arial"/>
                         </a:rPr>
                         <a:t>3</a:t>
                       </a:r>
@@ -14906,10 +14906,10 @@
                               <a:alpha val="100000"/>
                             </a:srgbClr>
                           </a:solidFill>
-                          <a:latin typeface="DejaVu Sans"/>
-                          <a:cs typeface="DejaVu Sans"/>
-                          <a:ea typeface="DejaVu Sans"/>
-                          <a:sym typeface="DejaVu Sans"/>
+                          <a:latin typeface="Arial"/>
+                          <a:cs typeface="Arial"/>
+                          <a:ea typeface="Arial"/>
+                          <a:sym typeface="Arial"/>
                         </a:rPr>
                         <a:t>0.00484</a:t>
                       </a:r>
@@ -14951,7 +14951,7 @@
                   </a:tcPr>
                 </a:tc>
               </a:tr>
-              <a:tr h="366435">
+              <a:tr h="362956">
                 <a:tc>
                   <a:txBody>
                     <a:bodyPr/>
@@ -14976,10 +14976,10 @@
                               <a:alpha val="100000"/>
                             </a:srgbClr>
                           </a:solidFill>
-                          <a:latin typeface="DejaVu Sans"/>
-                          <a:cs typeface="DejaVu Sans"/>
-                          <a:ea typeface="DejaVu Sans"/>
-                          <a:sym typeface="DejaVu Sans"/>
+                          <a:latin typeface="Arial"/>
+                          <a:cs typeface="Arial"/>
+                          <a:ea typeface="Arial"/>
+                          <a:sym typeface="Arial"/>
                         </a:rPr>
                         <a:t>2019</a:t>
                       </a:r>
@@ -15044,10 +15044,10 @@
                               <a:alpha val="100000"/>
                             </a:srgbClr>
                           </a:solidFill>
-                          <a:latin typeface="DejaVu Sans"/>
-                          <a:cs typeface="DejaVu Sans"/>
-                          <a:ea typeface="DejaVu Sans"/>
-                          <a:sym typeface="DejaVu Sans"/>
+                          <a:latin typeface="Arial"/>
+                          <a:cs typeface="Arial"/>
+                          <a:ea typeface="Arial"/>
+                          <a:sym typeface="Arial"/>
                         </a:rPr>
                         <a:t>3</a:t>
                       </a:r>
@@ -15112,10 +15112,10 @@
                               <a:alpha val="100000"/>
                             </a:srgbClr>
                           </a:solidFill>
-                          <a:latin typeface="DejaVu Sans"/>
-                          <a:cs typeface="DejaVu Sans"/>
-                          <a:ea typeface="DejaVu Sans"/>
-                          <a:sym typeface="DejaVu Sans"/>
+                          <a:latin typeface="Arial"/>
+                          <a:cs typeface="Arial"/>
+                          <a:ea typeface="Arial"/>
+                          <a:sym typeface="Arial"/>
                         </a:rPr>
                         <a:t>0.00496</a:t>
                       </a:r>
@@ -15157,7 +15157,7 @@
                   </a:tcPr>
                 </a:tc>
               </a:tr>
-              <a:tr h="366435">
+              <a:tr h="362956">
                 <a:tc>
                   <a:txBody>
                     <a:bodyPr/>
@@ -15182,10 +15182,10 @@
                               <a:alpha val="100000"/>
                             </a:srgbClr>
                           </a:solidFill>
-                          <a:latin typeface="DejaVu Sans"/>
-                          <a:cs typeface="DejaVu Sans"/>
-                          <a:ea typeface="DejaVu Sans"/>
-                          <a:sym typeface="DejaVu Sans"/>
+                          <a:latin typeface="Arial"/>
+                          <a:cs typeface="Arial"/>
+                          <a:ea typeface="Arial"/>
+                          <a:sym typeface="Arial"/>
                         </a:rPr>
                         <a:t>2020</a:t>
                       </a:r>
@@ -15250,10 +15250,10 @@
                               <a:alpha val="100000"/>
                             </a:srgbClr>
                           </a:solidFill>
-                          <a:latin typeface="DejaVu Sans"/>
-                          <a:cs typeface="DejaVu Sans"/>
-                          <a:ea typeface="DejaVu Sans"/>
-                          <a:sym typeface="DejaVu Sans"/>
+                          <a:latin typeface="Arial"/>
+                          <a:cs typeface="Arial"/>
+                          <a:ea typeface="Arial"/>
+                          <a:sym typeface="Arial"/>
                         </a:rPr>
                         <a:t>3</a:t>
                       </a:r>
@@ -15318,10 +15318,10 @@
                               <a:alpha val="100000"/>
                             </a:srgbClr>
                           </a:solidFill>
-                          <a:latin typeface="DejaVu Sans"/>
-                          <a:cs typeface="DejaVu Sans"/>
-                          <a:ea typeface="DejaVu Sans"/>
-                          <a:sym typeface="DejaVu Sans"/>
+                          <a:latin typeface="Arial"/>
+                          <a:cs typeface="Arial"/>
+                          <a:ea typeface="Arial"/>
+                          <a:sym typeface="Arial"/>
                         </a:rPr>
                         <a:t>0.00476</a:t>
                       </a:r>
@@ -15409,11 +15409,11 @@
             <a:tbl>
               <a:tblPr/>
               <a:tblGrid>
-                <a:gridCol w="616299"/>
-                <a:gridCol w="910979"/>
-                <a:gridCol w="1166504"/>
+                <a:gridCol w="571551"/>
+                <a:gridCol w="920528"/>
+                <a:gridCol w="1176804"/>
               </a:tblGrid>
-              <a:tr h="397404">
+              <a:tr h="390241">
                 <a:tc>
                   <a:txBody>
                     <a:bodyPr/>
@@ -15438,10 +15438,10 @@
                               <a:alpha val="100000"/>
                             </a:srgbClr>
                           </a:solidFill>
-                          <a:latin typeface="DejaVu Sans"/>
-                          <a:cs typeface="DejaVu Sans"/>
-                          <a:ea typeface="DejaVu Sans"/>
-                          <a:sym typeface="DejaVu Sans"/>
+                          <a:latin typeface="Arial"/>
+                          <a:cs typeface="Arial"/>
+                          <a:ea typeface="Arial"/>
+                          <a:sym typeface="Arial"/>
                         </a:rPr>
                         <a:t>AÑO</a:t>
                       </a:r>
@@ -15506,10 +15506,10 @@
                               <a:alpha val="100000"/>
                             </a:srgbClr>
                           </a:solidFill>
-                          <a:latin typeface="DejaVu Sans"/>
-                          <a:cs typeface="DejaVu Sans"/>
-                          <a:ea typeface="DejaVu Sans"/>
-                          <a:sym typeface="DejaVu Sans"/>
+                          <a:latin typeface="Arial"/>
+                          <a:cs typeface="Arial"/>
+                          <a:ea typeface="Arial"/>
+                          <a:sym typeface="Arial"/>
                         </a:rPr>
                         <a:t>ESTRATO</a:t>
                       </a:r>
@@ -15574,10 +15574,10 @@
                               <a:alpha val="100000"/>
                             </a:srgbClr>
                           </a:solidFill>
-                          <a:latin typeface="DejaVu Sans"/>
-                          <a:cs typeface="DejaVu Sans"/>
-                          <a:ea typeface="DejaVu Sans"/>
-                          <a:sym typeface="DejaVu Sans"/>
+                          <a:latin typeface="Arial"/>
+                          <a:cs typeface="Arial"/>
+                          <a:ea typeface="Arial"/>
+                          <a:sym typeface="Arial"/>
                         </a:rPr>
                         <a:t>TASA_RENTA</a:t>
                       </a:r>
@@ -15619,7 +15619,7 @@
                   </a:tcPr>
                 </a:tc>
               </a:tr>
-              <a:tr h="366435">
+              <a:tr h="362888">
                 <a:tc>
                   <a:txBody>
                     <a:bodyPr/>
@@ -15644,10 +15644,10 @@
                               <a:alpha val="100000"/>
                             </a:srgbClr>
                           </a:solidFill>
-                          <a:latin typeface="DejaVu Sans"/>
-                          <a:cs typeface="DejaVu Sans"/>
-                          <a:ea typeface="DejaVu Sans"/>
-                          <a:sym typeface="DejaVu Sans"/>
+                          <a:latin typeface="Arial"/>
+                          <a:cs typeface="Arial"/>
+                          <a:ea typeface="Arial"/>
+                          <a:sym typeface="Arial"/>
                         </a:rPr>
                         <a:t>2017</a:t>
                       </a:r>
@@ -15712,10 +15712,10 @@
                               <a:alpha val="100000"/>
                             </a:srgbClr>
                           </a:solidFill>
-                          <a:latin typeface="DejaVu Sans"/>
-                          <a:cs typeface="DejaVu Sans"/>
-                          <a:ea typeface="DejaVu Sans"/>
-                          <a:sym typeface="DejaVu Sans"/>
+                          <a:latin typeface="Arial"/>
+                          <a:cs typeface="Arial"/>
+                          <a:ea typeface="Arial"/>
+                          <a:sym typeface="Arial"/>
                         </a:rPr>
                         <a:t>4</a:t>
                       </a:r>
@@ -15780,10 +15780,10 @@
                               <a:alpha val="100000"/>
                             </a:srgbClr>
                           </a:solidFill>
-                          <a:latin typeface="DejaVu Sans"/>
-                          <a:cs typeface="DejaVu Sans"/>
-                          <a:ea typeface="DejaVu Sans"/>
-                          <a:sym typeface="DejaVu Sans"/>
+                          <a:latin typeface="Arial"/>
+                          <a:cs typeface="Arial"/>
+                          <a:ea typeface="Arial"/>
+                          <a:sym typeface="Arial"/>
                         </a:rPr>
                         <a:t>0.00448</a:t>
                       </a:r>
@@ -15825,7 +15825,7 @@
                   </a:tcPr>
                 </a:tc>
               </a:tr>
-              <a:tr h="366435">
+              <a:tr h="362888">
                 <a:tc>
                   <a:txBody>
                     <a:bodyPr/>
@@ -15850,10 +15850,10 @@
                               <a:alpha val="100000"/>
                             </a:srgbClr>
                           </a:solidFill>
-                          <a:latin typeface="DejaVu Sans"/>
-                          <a:cs typeface="DejaVu Sans"/>
-                          <a:ea typeface="DejaVu Sans"/>
-                          <a:sym typeface="DejaVu Sans"/>
+                          <a:latin typeface="Arial"/>
+                          <a:cs typeface="Arial"/>
+                          <a:ea typeface="Arial"/>
+                          <a:sym typeface="Arial"/>
                         </a:rPr>
                         <a:t>2018</a:t>
                       </a:r>
@@ -15918,10 +15918,10 @@
                               <a:alpha val="100000"/>
                             </a:srgbClr>
                           </a:solidFill>
-                          <a:latin typeface="DejaVu Sans"/>
-                          <a:cs typeface="DejaVu Sans"/>
-                          <a:ea typeface="DejaVu Sans"/>
-                          <a:sym typeface="DejaVu Sans"/>
+                          <a:latin typeface="Arial"/>
+                          <a:cs typeface="Arial"/>
+                          <a:ea typeface="Arial"/>
+                          <a:sym typeface="Arial"/>
                         </a:rPr>
                         <a:t>4</a:t>
                       </a:r>
@@ -15986,10 +15986,10 @@
                               <a:alpha val="100000"/>
                             </a:srgbClr>
                           </a:solidFill>
-                          <a:latin typeface="DejaVu Sans"/>
-                          <a:cs typeface="DejaVu Sans"/>
-                          <a:ea typeface="DejaVu Sans"/>
-                          <a:sym typeface="DejaVu Sans"/>
+                          <a:latin typeface="Arial"/>
+                          <a:cs typeface="Arial"/>
+                          <a:ea typeface="Arial"/>
+                          <a:sym typeface="Arial"/>
                         </a:rPr>
                         <a:t>0.00442</a:t>
                       </a:r>
@@ -16031,7 +16031,7 @@
                   </a:tcPr>
                 </a:tc>
               </a:tr>
-              <a:tr h="366435">
+              <a:tr h="362888">
                 <a:tc>
                   <a:txBody>
                     <a:bodyPr/>
@@ -16056,10 +16056,10 @@
                               <a:alpha val="100000"/>
                             </a:srgbClr>
                           </a:solidFill>
-                          <a:latin typeface="DejaVu Sans"/>
-                          <a:cs typeface="DejaVu Sans"/>
-                          <a:ea typeface="DejaVu Sans"/>
-                          <a:sym typeface="DejaVu Sans"/>
+                          <a:latin typeface="Arial"/>
+                          <a:cs typeface="Arial"/>
+                          <a:ea typeface="Arial"/>
+                          <a:sym typeface="Arial"/>
                         </a:rPr>
                         <a:t>2019</a:t>
                       </a:r>
@@ -16124,10 +16124,10 @@
                               <a:alpha val="100000"/>
                             </a:srgbClr>
                           </a:solidFill>
-                          <a:latin typeface="DejaVu Sans"/>
-                          <a:cs typeface="DejaVu Sans"/>
-                          <a:ea typeface="DejaVu Sans"/>
-                          <a:sym typeface="DejaVu Sans"/>
+                          <a:latin typeface="Arial"/>
+                          <a:cs typeface="Arial"/>
+                          <a:ea typeface="Arial"/>
+                          <a:sym typeface="Arial"/>
                         </a:rPr>
                         <a:t>4</a:t>
                       </a:r>
@@ -16192,10 +16192,10 @@
                               <a:alpha val="100000"/>
                             </a:srgbClr>
                           </a:solidFill>
-                          <a:latin typeface="DejaVu Sans"/>
-                          <a:cs typeface="DejaVu Sans"/>
-                          <a:ea typeface="DejaVu Sans"/>
-                          <a:sym typeface="DejaVu Sans"/>
+                          <a:latin typeface="Arial"/>
+                          <a:cs typeface="Arial"/>
+                          <a:ea typeface="Arial"/>
+                          <a:sym typeface="Arial"/>
                         </a:rPr>
                         <a:t>0.00452</a:t>
                       </a:r>
@@ -16237,7 +16237,7 @@
                   </a:tcPr>
                 </a:tc>
               </a:tr>
-              <a:tr h="366435">
+              <a:tr h="362956">
                 <a:tc>
                   <a:txBody>
                     <a:bodyPr/>
@@ -16262,10 +16262,10 @@
                               <a:alpha val="100000"/>
                             </a:srgbClr>
                           </a:solidFill>
-                          <a:latin typeface="DejaVu Sans"/>
-                          <a:cs typeface="DejaVu Sans"/>
-                          <a:ea typeface="DejaVu Sans"/>
-                          <a:sym typeface="DejaVu Sans"/>
+                          <a:latin typeface="Arial"/>
+                          <a:cs typeface="Arial"/>
+                          <a:ea typeface="Arial"/>
+                          <a:sym typeface="Arial"/>
                         </a:rPr>
                         <a:t>2020</a:t>
                       </a:r>
@@ -16330,10 +16330,10 @@
                               <a:alpha val="100000"/>
                             </a:srgbClr>
                           </a:solidFill>
-                          <a:latin typeface="DejaVu Sans"/>
-                          <a:cs typeface="DejaVu Sans"/>
-                          <a:ea typeface="DejaVu Sans"/>
-                          <a:sym typeface="DejaVu Sans"/>
+                          <a:latin typeface="Arial"/>
+                          <a:cs typeface="Arial"/>
+                          <a:ea typeface="Arial"/>
+                          <a:sym typeface="Arial"/>
                         </a:rPr>
                         <a:t>4</a:t>
                       </a:r>
@@ -16398,10 +16398,10 @@
                               <a:alpha val="100000"/>
                             </a:srgbClr>
                           </a:solidFill>
-                          <a:latin typeface="DejaVu Sans"/>
-                          <a:cs typeface="DejaVu Sans"/>
-                          <a:ea typeface="DejaVu Sans"/>
-                          <a:sym typeface="DejaVu Sans"/>
+                          <a:latin typeface="Arial"/>
+                          <a:cs typeface="Arial"/>
+                          <a:ea typeface="Arial"/>
+                          <a:sym typeface="Arial"/>
                         </a:rPr>
                         <a:t>0.00435</a:t>
                       </a:r>
@@ -16443,7 +16443,7 @@
                   </a:tcPr>
                 </a:tc>
               </a:tr>
-              <a:tr h="366435">
+              <a:tr h="362956">
                 <a:tc>
                   <a:txBody>
                     <a:bodyPr/>
@@ -16468,10 +16468,10 @@
                               <a:alpha val="100000"/>
                             </a:srgbClr>
                           </a:solidFill>
-                          <a:latin typeface="DejaVu Sans"/>
-                          <a:cs typeface="DejaVu Sans"/>
-                          <a:ea typeface="DejaVu Sans"/>
-                          <a:sym typeface="DejaVu Sans"/>
+                          <a:latin typeface="Arial"/>
+                          <a:cs typeface="Arial"/>
+                          <a:ea typeface="Arial"/>
+                          <a:sym typeface="Arial"/>
                         </a:rPr>
                         <a:t>2017</a:t>
                       </a:r>
@@ -16536,10 +16536,10 @@
                               <a:alpha val="100000"/>
                             </a:srgbClr>
                           </a:solidFill>
-                          <a:latin typeface="DejaVu Sans"/>
-                          <a:cs typeface="DejaVu Sans"/>
-                          <a:ea typeface="DejaVu Sans"/>
-                          <a:sym typeface="DejaVu Sans"/>
+                          <a:latin typeface="Arial"/>
+                          <a:cs typeface="Arial"/>
+                          <a:ea typeface="Arial"/>
+                          <a:sym typeface="Arial"/>
                         </a:rPr>
                         <a:t>5</a:t>
                       </a:r>
@@ -16604,10 +16604,10 @@
                               <a:alpha val="100000"/>
                             </a:srgbClr>
                           </a:solidFill>
-                          <a:latin typeface="DejaVu Sans"/>
-                          <a:cs typeface="DejaVu Sans"/>
-                          <a:ea typeface="DejaVu Sans"/>
-                          <a:sym typeface="DejaVu Sans"/>
+                          <a:latin typeface="Arial"/>
+                          <a:cs typeface="Arial"/>
+                          <a:ea typeface="Arial"/>
+                          <a:sym typeface="Arial"/>
                         </a:rPr>
                         <a:t>0.00453</a:t>
                       </a:r>
@@ -16649,7 +16649,7 @@
                   </a:tcPr>
                 </a:tc>
               </a:tr>
-              <a:tr h="366435">
+              <a:tr h="362888">
                 <a:tc>
                   <a:txBody>
                     <a:bodyPr/>
@@ -16674,10 +16674,10 @@
                               <a:alpha val="100000"/>
                             </a:srgbClr>
                           </a:solidFill>
-                          <a:latin typeface="DejaVu Sans"/>
-                          <a:cs typeface="DejaVu Sans"/>
-                          <a:ea typeface="DejaVu Sans"/>
-                          <a:sym typeface="DejaVu Sans"/>
+                          <a:latin typeface="Arial"/>
+                          <a:cs typeface="Arial"/>
+                          <a:ea typeface="Arial"/>
+                          <a:sym typeface="Arial"/>
                         </a:rPr>
                         <a:t>2018</a:t>
                       </a:r>
@@ -16742,10 +16742,10 @@
                               <a:alpha val="100000"/>
                             </a:srgbClr>
                           </a:solidFill>
-                          <a:latin typeface="DejaVu Sans"/>
-                          <a:cs typeface="DejaVu Sans"/>
-                          <a:ea typeface="DejaVu Sans"/>
-                          <a:sym typeface="DejaVu Sans"/>
+                          <a:latin typeface="Arial"/>
+                          <a:cs typeface="Arial"/>
+                          <a:ea typeface="Arial"/>
+                          <a:sym typeface="Arial"/>
                         </a:rPr>
                         <a:t>5</a:t>
                       </a:r>
@@ -16810,10 +16810,10 @@
                               <a:alpha val="100000"/>
                             </a:srgbClr>
                           </a:solidFill>
-                          <a:latin typeface="DejaVu Sans"/>
-                          <a:cs typeface="DejaVu Sans"/>
-                          <a:ea typeface="DejaVu Sans"/>
-                          <a:sym typeface="DejaVu Sans"/>
+                          <a:latin typeface="Arial"/>
+                          <a:cs typeface="Arial"/>
+                          <a:ea typeface="Arial"/>
+                          <a:sym typeface="Arial"/>
                         </a:rPr>
                         <a:t>0.00447</a:t>
                       </a:r>
@@ -16855,7 +16855,7 @@
                   </a:tcPr>
                 </a:tc>
               </a:tr>
-              <a:tr h="366435">
+              <a:tr h="362888">
                 <a:tc>
                   <a:txBody>
                     <a:bodyPr/>
@@ -16880,10 +16880,10 @@
                               <a:alpha val="100000"/>
                             </a:srgbClr>
                           </a:solidFill>
-                          <a:latin typeface="DejaVu Sans"/>
-                          <a:cs typeface="DejaVu Sans"/>
-                          <a:ea typeface="DejaVu Sans"/>
-                          <a:sym typeface="DejaVu Sans"/>
+                          <a:latin typeface="Arial"/>
+                          <a:cs typeface="Arial"/>
+                          <a:ea typeface="Arial"/>
+                          <a:sym typeface="Arial"/>
                         </a:rPr>
                         <a:t>2019</a:t>
                       </a:r>
@@ -16948,10 +16948,10 @@
                               <a:alpha val="100000"/>
                             </a:srgbClr>
                           </a:solidFill>
-                          <a:latin typeface="DejaVu Sans"/>
-                          <a:cs typeface="DejaVu Sans"/>
-                          <a:ea typeface="DejaVu Sans"/>
-                          <a:sym typeface="DejaVu Sans"/>
+                          <a:latin typeface="Arial"/>
+                          <a:cs typeface="Arial"/>
+                          <a:ea typeface="Arial"/>
+                          <a:sym typeface="Arial"/>
                         </a:rPr>
                         <a:t>5</a:t>
                       </a:r>
@@ -17016,10 +17016,10 @@
                               <a:alpha val="100000"/>
                             </a:srgbClr>
                           </a:solidFill>
-                          <a:latin typeface="DejaVu Sans"/>
-                          <a:cs typeface="DejaVu Sans"/>
-                          <a:ea typeface="DejaVu Sans"/>
-                          <a:sym typeface="DejaVu Sans"/>
+                          <a:latin typeface="Arial"/>
+                          <a:cs typeface="Arial"/>
+                          <a:ea typeface="Arial"/>
+                          <a:sym typeface="Arial"/>
                         </a:rPr>
                         <a:t>0.00457</a:t>
                       </a:r>
@@ -17061,7 +17061,7 @@
                   </a:tcPr>
                 </a:tc>
               </a:tr>
-              <a:tr h="366435">
+              <a:tr h="362888">
                 <a:tc>
                   <a:txBody>
                     <a:bodyPr/>
@@ -17086,10 +17086,10 @@
                               <a:alpha val="100000"/>
                             </a:srgbClr>
                           </a:solidFill>
-                          <a:latin typeface="DejaVu Sans"/>
-                          <a:cs typeface="DejaVu Sans"/>
-                          <a:ea typeface="DejaVu Sans"/>
-                          <a:sym typeface="DejaVu Sans"/>
+                          <a:latin typeface="Arial"/>
+                          <a:cs typeface="Arial"/>
+                          <a:ea typeface="Arial"/>
+                          <a:sym typeface="Arial"/>
                         </a:rPr>
                         <a:t>2020</a:t>
                       </a:r>
@@ -17154,10 +17154,10 @@
                               <a:alpha val="100000"/>
                             </a:srgbClr>
                           </a:solidFill>
-                          <a:latin typeface="DejaVu Sans"/>
-                          <a:cs typeface="DejaVu Sans"/>
-                          <a:ea typeface="DejaVu Sans"/>
-                          <a:sym typeface="DejaVu Sans"/>
+                          <a:latin typeface="Arial"/>
+                          <a:cs typeface="Arial"/>
+                          <a:ea typeface="Arial"/>
+                          <a:sym typeface="Arial"/>
                         </a:rPr>
                         <a:t>5</a:t>
                       </a:r>
@@ -17222,10 +17222,10 @@
                               <a:alpha val="100000"/>
                             </a:srgbClr>
                           </a:solidFill>
-                          <a:latin typeface="DejaVu Sans"/>
-                          <a:cs typeface="DejaVu Sans"/>
-                          <a:ea typeface="DejaVu Sans"/>
-                          <a:sym typeface="DejaVu Sans"/>
+                          <a:latin typeface="Arial"/>
+                          <a:cs typeface="Arial"/>
+                          <a:ea typeface="Arial"/>
+                          <a:sym typeface="Arial"/>
                         </a:rPr>
                         <a:t>0.00440</a:t>
                       </a:r>
@@ -17267,7 +17267,7 @@
                   </a:tcPr>
                 </a:tc>
               </a:tr>
-              <a:tr h="366435">
+              <a:tr h="362956">
                 <a:tc>
                   <a:txBody>
                     <a:bodyPr/>
@@ -17292,10 +17292,10 @@
                               <a:alpha val="100000"/>
                             </a:srgbClr>
                           </a:solidFill>
-                          <a:latin typeface="DejaVu Sans"/>
-                          <a:cs typeface="DejaVu Sans"/>
-                          <a:ea typeface="DejaVu Sans"/>
-                          <a:sym typeface="DejaVu Sans"/>
+                          <a:latin typeface="Arial"/>
+                          <a:cs typeface="Arial"/>
+                          <a:ea typeface="Arial"/>
+                          <a:sym typeface="Arial"/>
                         </a:rPr>
                         <a:t>2017</a:t>
                       </a:r>
@@ -17360,10 +17360,10 @@
                               <a:alpha val="100000"/>
                             </a:srgbClr>
                           </a:solidFill>
-                          <a:latin typeface="DejaVu Sans"/>
-                          <a:cs typeface="DejaVu Sans"/>
-                          <a:ea typeface="DejaVu Sans"/>
-                          <a:sym typeface="DejaVu Sans"/>
+                          <a:latin typeface="Arial"/>
+                          <a:cs typeface="Arial"/>
+                          <a:ea typeface="Arial"/>
+                          <a:sym typeface="Arial"/>
                         </a:rPr>
                         <a:t>6</a:t>
                       </a:r>
@@ -17428,10 +17428,10 @@
                               <a:alpha val="100000"/>
                             </a:srgbClr>
                           </a:solidFill>
-                          <a:latin typeface="DejaVu Sans"/>
-                          <a:cs typeface="DejaVu Sans"/>
-                          <a:ea typeface="DejaVu Sans"/>
-                          <a:sym typeface="DejaVu Sans"/>
+                          <a:latin typeface="Arial"/>
+                          <a:cs typeface="Arial"/>
+                          <a:ea typeface="Arial"/>
+                          <a:sym typeface="Arial"/>
                         </a:rPr>
                         <a:t>0.00443</a:t>
                       </a:r>
@@ -17473,7 +17473,7 @@
                   </a:tcPr>
                 </a:tc>
               </a:tr>
-              <a:tr h="366435">
+              <a:tr h="362956">
                 <a:tc>
                   <a:txBody>
                     <a:bodyPr/>
@@ -17498,10 +17498,10 @@
                               <a:alpha val="100000"/>
                             </a:srgbClr>
                           </a:solidFill>
-                          <a:latin typeface="DejaVu Sans"/>
-                          <a:cs typeface="DejaVu Sans"/>
-                          <a:ea typeface="DejaVu Sans"/>
-                          <a:sym typeface="DejaVu Sans"/>
+                          <a:latin typeface="Arial"/>
+                          <a:cs typeface="Arial"/>
+                          <a:ea typeface="Arial"/>
+                          <a:sym typeface="Arial"/>
                         </a:rPr>
                         <a:t>2018</a:t>
                       </a:r>
@@ -17566,10 +17566,10 @@
                               <a:alpha val="100000"/>
                             </a:srgbClr>
                           </a:solidFill>
-                          <a:latin typeface="DejaVu Sans"/>
-                          <a:cs typeface="DejaVu Sans"/>
-                          <a:ea typeface="DejaVu Sans"/>
-                          <a:sym typeface="DejaVu Sans"/>
+                          <a:latin typeface="Arial"/>
+                          <a:cs typeface="Arial"/>
+                          <a:ea typeface="Arial"/>
+                          <a:sym typeface="Arial"/>
                         </a:rPr>
                         <a:t>6</a:t>
                       </a:r>
@@ -17634,10 +17634,10 @@
                               <a:alpha val="100000"/>
                             </a:srgbClr>
                           </a:solidFill>
-                          <a:latin typeface="DejaVu Sans"/>
-                          <a:cs typeface="DejaVu Sans"/>
-                          <a:ea typeface="DejaVu Sans"/>
-                          <a:sym typeface="DejaVu Sans"/>
+                          <a:latin typeface="Arial"/>
+                          <a:cs typeface="Arial"/>
+                          <a:ea typeface="Arial"/>
+                          <a:sym typeface="Arial"/>
                         </a:rPr>
                         <a:t>0.00438</a:t>
                       </a:r>
@@ -17679,7 +17679,7 @@
                   </a:tcPr>
                 </a:tc>
               </a:tr>
-              <a:tr h="366435">
+              <a:tr h="362888">
                 <a:tc>
                   <a:txBody>
                     <a:bodyPr/>
@@ -17704,10 +17704,10 @@
                               <a:alpha val="100000"/>
                             </a:srgbClr>
                           </a:solidFill>
-                          <a:latin typeface="DejaVu Sans"/>
-                          <a:cs typeface="DejaVu Sans"/>
-                          <a:ea typeface="DejaVu Sans"/>
-                          <a:sym typeface="DejaVu Sans"/>
+                          <a:latin typeface="Arial"/>
+                          <a:cs typeface="Arial"/>
+                          <a:ea typeface="Arial"/>
+                          <a:sym typeface="Arial"/>
                         </a:rPr>
                         <a:t>2019</a:t>
                       </a:r>
@@ -17772,10 +17772,10 @@
                               <a:alpha val="100000"/>
                             </a:srgbClr>
                           </a:solidFill>
-                          <a:latin typeface="DejaVu Sans"/>
-                          <a:cs typeface="DejaVu Sans"/>
-                          <a:ea typeface="DejaVu Sans"/>
-                          <a:sym typeface="DejaVu Sans"/>
+                          <a:latin typeface="Arial"/>
+                          <a:cs typeface="Arial"/>
+                          <a:ea typeface="Arial"/>
+                          <a:sym typeface="Arial"/>
                         </a:rPr>
                         <a:t>6</a:t>
                       </a:r>
@@ -17840,10 +17840,10 @@
                               <a:alpha val="100000"/>
                             </a:srgbClr>
                           </a:solidFill>
-                          <a:latin typeface="DejaVu Sans"/>
-                          <a:cs typeface="DejaVu Sans"/>
-                          <a:ea typeface="DejaVu Sans"/>
-                          <a:sym typeface="DejaVu Sans"/>
+                          <a:latin typeface="Arial"/>
+                          <a:cs typeface="Arial"/>
+                          <a:ea typeface="Arial"/>
+                          <a:sym typeface="Arial"/>
                         </a:rPr>
                         <a:t>0.00447</a:t>
                       </a:r>
@@ -17885,7 +17885,7 @@
                   </a:tcPr>
                 </a:tc>
               </a:tr>
-              <a:tr h="366435">
+              <a:tr h="362956">
                 <a:tc>
                   <a:txBody>
                     <a:bodyPr/>
@@ -17910,10 +17910,10 @@
                               <a:alpha val="100000"/>
                             </a:srgbClr>
                           </a:solidFill>
-                          <a:latin typeface="DejaVu Sans"/>
-                          <a:cs typeface="DejaVu Sans"/>
-                          <a:ea typeface="DejaVu Sans"/>
-                          <a:sym typeface="DejaVu Sans"/>
+                          <a:latin typeface="Arial"/>
+                          <a:cs typeface="Arial"/>
+                          <a:ea typeface="Arial"/>
+                          <a:sym typeface="Arial"/>
                         </a:rPr>
                         <a:t>2020</a:t>
                       </a:r>
@@ -17978,10 +17978,10 @@
                               <a:alpha val="100000"/>
                             </a:srgbClr>
                           </a:solidFill>
-                          <a:latin typeface="DejaVu Sans"/>
-                          <a:cs typeface="DejaVu Sans"/>
-                          <a:ea typeface="DejaVu Sans"/>
-                          <a:sym typeface="DejaVu Sans"/>
+                          <a:latin typeface="Arial"/>
+                          <a:cs typeface="Arial"/>
+                          <a:ea typeface="Arial"/>
+                          <a:sym typeface="Arial"/>
                         </a:rPr>
                         <a:t>6</a:t>
                       </a:r>
@@ -18046,10 +18046,10 @@
                               <a:alpha val="100000"/>
                             </a:srgbClr>
                           </a:solidFill>
-                          <a:latin typeface="DejaVu Sans"/>
-                          <a:cs typeface="DejaVu Sans"/>
-                          <a:ea typeface="DejaVu Sans"/>
-                          <a:sym typeface="DejaVu Sans"/>
+                          <a:latin typeface="Arial"/>
+                          <a:cs typeface="Arial"/>
+                          <a:ea typeface="Arial"/>
+                          <a:sym typeface="Arial"/>
                         </a:rPr>
                         <a:t>0.00431</a:t>
                       </a:r>

</xml_diff>